<commit_message>
Introduction - Problem, structure + notes added
</commit_message>
<xml_diff>
--- a/writing/master-thesis/figures/Figures.pptx
+++ b/writing/master-thesis/figures/Figures.pptx
@@ -265,7 +265,7 @@
           <a:p>
             <a:fld id="{32C0DBB3-3265-429B-96D7-56FBE43BBDD2}" type="datetimeFigureOut">
               <a:rPr lang="de-DE" smtClean="0"/>
-              <a:t>09.01.2022</a:t>
+              <a:t>12.01.2022</a:t>
             </a:fld>
             <a:endParaRPr lang="de-DE"/>
           </a:p>
@@ -463,7 +463,7 @@
           <a:p>
             <a:fld id="{32C0DBB3-3265-429B-96D7-56FBE43BBDD2}" type="datetimeFigureOut">
               <a:rPr lang="de-DE" smtClean="0"/>
-              <a:t>09.01.2022</a:t>
+              <a:t>12.01.2022</a:t>
             </a:fld>
             <a:endParaRPr lang="de-DE"/>
           </a:p>
@@ -671,7 +671,7 @@
           <a:p>
             <a:fld id="{32C0DBB3-3265-429B-96D7-56FBE43BBDD2}" type="datetimeFigureOut">
               <a:rPr lang="de-DE" smtClean="0"/>
-              <a:t>09.01.2022</a:t>
+              <a:t>12.01.2022</a:t>
             </a:fld>
             <a:endParaRPr lang="de-DE"/>
           </a:p>
@@ -869,7 +869,7 @@
           <a:p>
             <a:fld id="{32C0DBB3-3265-429B-96D7-56FBE43BBDD2}" type="datetimeFigureOut">
               <a:rPr lang="de-DE" smtClean="0"/>
-              <a:t>09.01.2022</a:t>
+              <a:t>12.01.2022</a:t>
             </a:fld>
             <a:endParaRPr lang="de-DE"/>
           </a:p>
@@ -1144,7 +1144,7 @@
           <a:p>
             <a:fld id="{32C0DBB3-3265-429B-96D7-56FBE43BBDD2}" type="datetimeFigureOut">
               <a:rPr lang="de-DE" smtClean="0"/>
-              <a:t>09.01.2022</a:t>
+              <a:t>12.01.2022</a:t>
             </a:fld>
             <a:endParaRPr lang="de-DE"/>
           </a:p>
@@ -1409,7 +1409,7 @@
           <a:p>
             <a:fld id="{32C0DBB3-3265-429B-96D7-56FBE43BBDD2}" type="datetimeFigureOut">
               <a:rPr lang="de-DE" smtClean="0"/>
-              <a:t>09.01.2022</a:t>
+              <a:t>12.01.2022</a:t>
             </a:fld>
             <a:endParaRPr lang="de-DE"/>
           </a:p>
@@ -1821,7 +1821,7 @@
           <a:p>
             <a:fld id="{32C0DBB3-3265-429B-96D7-56FBE43BBDD2}" type="datetimeFigureOut">
               <a:rPr lang="de-DE" smtClean="0"/>
-              <a:t>09.01.2022</a:t>
+              <a:t>12.01.2022</a:t>
             </a:fld>
             <a:endParaRPr lang="de-DE"/>
           </a:p>
@@ -1962,7 +1962,7 @@
           <a:p>
             <a:fld id="{32C0DBB3-3265-429B-96D7-56FBE43BBDD2}" type="datetimeFigureOut">
               <a:rPr lang="de-DE" smtClean="0"/>
-              <a:t>09.01.2022</a:t>
+              <a:t>12.01.2022</a:t>
             </a:fld>
             <a:endParaRPr lang="de-DE"/>
           </a:p>
@@ -2075,7 +2075,7 @@
           <a:p>
             <a:fld id="{32C0DBB3-3265-429B-96D7-56FBE43BBDD2}" type="datetimeFigureOut">
               <a:rPr lang="de-DE" smtClean="0"/>
-              <a:t>09.01.2022</a:t>
+              <a:t>12.01.2022</a:t>
             </a:fld>
             <a:endParaRPr lang="de-DE"/>
           </a:p>
@@ -2386,7 +2386,7 @@
           <a:p>
             <a:fld id="{32C0DBB3-3265-429B-96D7-56FBE43BBDD2}" type="datetimeFigureOut">
               <a:rPr lang="de-DE" smtClean="0"/>
-              <a:t>09.01.2022</a:t>
+              <a:t>12.01.2022</a:t>
             </a:fld>
             <a:endParaRPr lang="de-DE"/>
           </a:p>
@@ -2674,7 +2674,7 @@
           <a:p>
             <a:fld id="{32C0DBB3-3265-429B-96D7-56FBE43BBDD2}" type="datetimeFigureOut">
               <a:rPr lang="de-DE" smtClean="0"/>
-              <a:t>09.01.2022</a:t>
+              <a:t>12.01.2022</a:t>
             </a:fld>
             <a:endParaRPr lang="de-DE"/>
           </a:p>
@@ -2915,7 +2915,7 @@
           <a:p>
             <a:fld id="{32C0DBB3-3265-429B-96D7-56FBE43BBDD2}" type="datetimeFigureOut">
               <a:rPr lang="de-DE" smtClean="0"/>
-              <a:t>09.01.2022</a:t>
+              <a:t>12.01.2022</a:t>
             </a:fld>
             <a:endParaRPr lang="de-DE"/>
           </a:p>

</xml_diff>

<commit_message>
updated approach sections, added figures
</commit_message>
<xml_diff>
--- a/writing/master-thesis/figures/Figures.pptx
+++ b/writing/master-thesis/figures/Figures.pptx
@@ -7,11 +7,10 @@
   <p:sldIdLst>
     <p:sldId id="261" r:id="rId2"/>
     <p:sldId id="262" r:id="rId3"/>
-    <p:sldId id="256" r:id="rId4"/>
-    <p:sldId id="258" r:id="rId5"/>
-    <p:sldId id="257" r:id="rId6"/>
-    <p:sldId id="259" r:id="rId7"/>
-    <p:sldId id="260" r:id="rId8"/>
+    <p:sldId id="258" r:id="rId4"/>
+    <p:sldId id="257" r:id="rId5"/>
+    <p:sldId id="259" r:id="rId6"/>
+    <p:sldId id="260" r:id="rId7"/>
   </p:sldIdLst>
   <p:sldSz cx="12192000" cy="6858000"/>
   <p:notesSz cx="6858000" cy="9144000"/>
@@ -121,7 +120,7 @@
 <file path=ppt/revisionInfo.xml><?xml version="1.0" encoding="utf-8"?>
 <p1510:revInfo xmlns:a="http://schemas.openxmlformats.org/drawingml/2006/main" xmlns:r="http://schemas.openxmlformats.org/officeDocument/2006/relationships" xmlns:p1510="http://schemas.microsoft.com/office/powerpoint/2015/10/main">
   <p1510:revLst>
-    <p1510:client id="{B2971CB8-DC99-46E1-8F51-F9F5F25F4ACD}" v="11" dt="2022-01-24T17:21:44.032"/>
+    <p1510:client id="{B2971CB8-DC99-46E1-8F51-F9F5F25F4ACD}" v="57" dt="2022-03-21T17:07:16.394"/>
   </p1510:revLst>
 </p1510:revInfo>
 </file>
@@ -130,11 +129,18 @@
 <pc:chgInfo xmlns:a="http://schemas.openxmlformats.org/drawingml/2006/main" xmlns:r="http://schemas.openxmlformats.org/officeDocument/2006/relationships" xmlns:ac="http://schemas.microsoft.com/office/drawing/2013/main/command" xmlns:pc="http://schemas.microsoft.com/office/powerpoint/2013/main/command">
   <pc:docChgLst>
     <pc:chgData name="Christoph Schäfer" userId="ee783fdd-fcc0-44af-b9a3-3dd9a1b6d194" providerId="ADAL" clId="{B2971CB8-DC99-46E1-8F51-F9F5F25F4ACD}"/>
-    <pc:docChg chg="undo custSel modSld">
-      <pc:chgData name="Christoph Schäfer" userId="ee783fdd-fcc0-44af-b9a3-3dd9a1b6d194" providerId="ADAL" clId="{B2971CB8-DC99-46E1-8F51-F9F5F25F4ACD}" dt="2022-01-24T17:23:15.666" v="201" actId="478"/>
+    <pc:docChg chg="undo custSel addSld delSld modSld">
+      <pc:chgData name="Christoph Schäfer" userId="ee783fdd-fcc0-44af-b9a3-3dd9a1b6d194" providerId="ADAL" clId="{B2971CB8-DC99-46E1-8F51-F9F5F25F4ACD}" dt="2022-03-22T08:07:34.754" v="520" actId="47"/>
       <pc:docMkLst>
         <pc:docMk/>
       </pc:docMkLst>
+      <pc:sldChg chg="del">
+        <pc:chgData name="Christoph Schäfer" userId="ee783fdd-fcc0-44af-b9a3-3dd9a1b6d194" providerId="ADAL" clId="{B2971CB8-DC99-46E1-8F51-F9F5F25F4ACD}" dt="2022-03-22T08:07:33.639" v="519" actId="47"/>
+        <pc:sldMkLst>
+          <pc:docMk/>
+          <pc:sldMk cId="357497857" sldId="256"/>
+        </pc:sldMkLst>
+      </pc:sldChg>
       <pc:sldChg chg="addSp delSp modSp mod">
         <pc:chgData name="Christoph Schäfer" userId="ee783fdd-fcc0-44af-b9a3-3dd9a1b6d194" providerId="ADAL" clId="{B2971CB8-DC99-46E1-8F51-F9F5F25F4ACD}" dt="2022-01-24T17:21:27.128" v="127" actId="1076"/>
         <pc:sldMkLst>
@@ -444,6 +450,597 @@
           </ac:cxnSpMkLst>
         </pc:cxnChg>
       </pc:sldChg>
+      <pc:sldChg chg="addSp delSp modSp add del mod">
+        <pc:chgData name="Christoph Schäfer" userId="ee783fdd-fcc0-44af-b9a3-3dd9a1b6d194" providerId="ADAL" clId="{B2971CB8-DC99-46E1-8F51-F9F5F25F4ACD}" dt="2022-03-22T08:07:34.754" v="520" actId="47"/>
+        <pc:sldMkLst>
+          <pc:docMk/>
+          <pc:sldMk cId="3826028550" sldId="263"/>
+        </pc:sldMkLst>
+        <pc:spChg chg="add mod">
+          <ac:chgData name="Christoph Schäfer" userId="ee783fdd-fcc0-44af-b9a3-3dd9a1b6d194" providerId="ADAL" clId="{B2971CB8-DC99-46E1-8F51-F9F5F25F4ACD}" dt="2022-03-22T08:03:43.666" v="518" actId="1076"/>
+          <ac:spMkLst>
+            <pc:docMk/>
+            <pc:sldMk cId="3826028550" sldId="263"/>
+            <ac:spMk id="9" creationId="{291D430E-5F22-4EB5-9007-79F1F490D964}"/>
+          </ac:spMkLst>
+        </pc:spChg>
+        <pc:spChg chg="add mod">
+          <ac:chgData name="Christoph Schäfer" userId="ee783fdd-fcc0-44af-b9a3-3dd9a1b6d194" providerId="ADAL" clId="{B2971CB8-DC99-46E1-8F51-F9F5F25F4ACD}" dt="2022-03-22T08:03:43.666" v="518" actId="1076"/>
+          <ac:spMkLst>
+            <pc:docMk/>
+            <pc:sldMk cId="3826028550" sldId="263"/>
+            <ac:spMk id="10" creationId="{A9E95F56-68E0-462E-9862-2F2F5B23AFB5}"/>
+          </ac:spMkLst>
+        </pc:spChg>
+        <pc:spChg chg="add mod">
+          <ac:chgData name="Christoph Schäfer" userId="ee783fdd-fcc0-44af-b9a3-3dd9a1b6d194" providerId="ADAL" clId="{B2971CB8-DC99-46E1-8F51-F9F5F25F4ACD}" dt="2022-03-22T08:03:43.666" v="518" actId="1076"/>
+          <ac:spMkLst>
+            <pc:docMk/>
+            <pc:sldMk cId="3826028550" sldId="263"/>
+            <ac:spMk id="11" creationId="{F0213C65-3136-4D66-A25B-9C49F93188FA}"/>
+          </ac:spMkLst>
+        </pc:spChg>
+        <pc:spChg chg="add mod">
+          <ac:chgData name="Christoph Schäfer" userId="ee783fdd-fcc0-44af-b9a3-3dd9a1b6d194" providerId="ADAL" clId="{B2971CB8-DC99-46E1-8F51-F9F5F25F4ACD}" dt="2022-03-22T08:03:43.666" v="518" actId="1076"/>
+          <ac:spMkLst>
+            <pc:docMk/>
+            <pc:sldMk cId="3826028550" sldId="263"/>
+            <ac:spMk id="12" creationId="{2A4CC38B-E9D9-4030-887C-C96090D0B1C9}"/>
+          </ac:spMkLst>
+        </pc:spChg>
+        <pc:spChg chg="add mod">
+          <ac:chgData name="Christoph Schäfer" userId="ee783fdd-fcc0-44af-b9a3-3dd9a1b6d194" providerId="ADAL" clId="{B2971CB8-DC99-46E1-8F51-F9F5F25F4ACD}" dt="2022-03-22T08:03:43.666" v="518" actId="1076"/>
+          <ac:spMkLst>
+            <pc:docMk/>
+            <pc:sldMk cId="3826028550" sldId="263"/>
+            <ac:spMk id="13" creationId="{7318C8DE-E0F9-4BAF-B20C-A8808AE97C70}"/>
+          </ac:spMkLst>
+        </pc:spChg>
+        <pc:spChg chg="add mod">
+          <ac:chgData name="Christoph Schäfer" userId="ee783fdd-fcc0-44af-b9a3-3dd9a1b6d194" providerId="ADAL" clId="{B2971CB8-DC99-46E1-8F51-F9F5F25F4ACD}" dt="2022-03-22T08:03:43.666" v="518" actId="1076"/>
+          <ac:spMkLst>
+            <pc:docMk/>
+            <pc:sldMk cId="3826028550" sldId="263"/>
+            <ac:spMk id="18" creationId="{50BF6581-D7E0-4E97-BC41-AC4F7875A09D}"/>
+          </ac:spMkLst>
+        </pc:spChg>
+        <pc:spChg chg="add mod">
+          <ac:chgData name="Christoph Schäfer" userId="ee783fdd-fcc0-44af-b9a3-3dd9a1b6d194" providerId="ADAL" clId="{B2971CB8-DC99-46E1-8F51-F9F5F25F4ACD}" dt="2022-03-22T08:03:43.666" v="518" actId="1076"/>
+          <ac:spMkLst>
+            <pc:docMk/>
+            <pc:sldMk cId="3826028550" sldId="263"/>
+            <ac:spMk id="19" creationId="{CAA9B0D2-2D42-4067-8DB9-E97CA8BAE485}"/>
+          </ac:spMkLst>
+        </pc:spChg>
+        <pc:spChg chg="add mod">
+          <ac:chgData name="Christoph Schäfer" userId="ee783fdd-fcc0-44af-b9a3-3dd9a1b6d194" providerId="ADAL" clId="{B2971CB8-DC99-46E1-8F51-F9F5F25F4ACD}" dt="2022-03-22T08:03:43.666" v="518" actId="1076"/>
+          <ac:spMkLst>
+            <pc:docMk/>
+            <pc:sldMk cId="3826028550" sldId="263"/>
+            <ac:spMk id="22" creationId="{E09E33BD-9B41-418A-93C8-8A8D54144E78}"/>
+          </ac:spMkLst>
+        </pc:spChg>
+        <pc:spChg chg="add mod">
+          <ac:chgData name="Christoph Schäfer" userId="ee783fdd-fcc0-44af-b9a3-3dd9a1b6d194" providerId="ADAL" clId="{B2971CB8-DC99-46E1-8F51-F9F5F25F4ACD}" dt="2022-03-22T08:03:43.666" v="518" actId="1076"/>
+          <ac:spMkLst>
+            <pc:docMk/>
+            <pc:sldMk cId="3826028550" sldId="263"/>
+            <ac:spMk id="23" creationId="{81CCF4D2-E292-454A-AC35-149DAFC9A24B}"/>
+          </ac:spMkLst>
+        </pc:spChg>
+        <pc:spChg chg="add del mod">
+          <ac:chgData name="Christoph Schäfer" userId="ee783fdd-fcc0-44af-b9a3-3dd9a1b6d194" providerId="ADAL" clId="{B2971CB8-DC99-46E1-8F51-F9F5F25F4ACD}" dt="2022-03-21T16:59:11.634" v="409" actId="478"/>
+          <ac:spMkLst>
+            <pc:docMk/>
+            <pc:sldMk cId="3826028550" sldId="263"/>
+            <ac:spMk id="24" creationId="{8C43DBEF-9600-41B5-B4C6-55F1156FB925}"/>
+          </ac:spMkLst>
+        </pc:spChg>
+        <pc:spChg chg="add del mod">
+          <ac:chgData name="Christoph Schäfer" userId="ee783fdd-fcc0-44af-b9a3-3dd9a1b6d194" providerId="ADAL" clId="{B2971CB8-DC99-46E1-8F51-F9F5F25F4ACD}" dt="2022-03-21T17:06:28.647" v="492" actId="478"/>
+          <ac:spMkLst>
+            <pc:docMk/>
+            <pc:sldMk cId="3826028550" sldId="263"/>
+            <ac:spMk id="25" creationId="{9F51CAA9-A11C-4D94-A448-E00B621B171F}"/>
+          </ac:spMkLst>
+        </pc:spChg>
+        <pc:spChg chg="add del mod">
+          <ac:chgData name="Christoph Schäfer" userId="ee783fdd-fcc0-44af-b9a3-3dd9a1b6d194" providerId="ADAL" clId="{B2971CB8-DC99-46E1-8F51-F9F5F25F4ACD}" dt="2022-03-21T17:06:25.584" v="491" actId="478"/>
+          <ac:spMkLst>
+            <pc:docMk/>
+            <pc:sldMk cId="3826028550" sldId="263"/>
+            <ac:spMk id="26" creationId="{830FD7A6-4E8A-40B6-9B91-ABB137F09C21}"/>
+          </ac:spMkLst>
+        </pc:spChg>
+        <pc:spChg chg="add del mod">
+          <ac:chgData name="Christoph Schäfer" userId="ee783fdd-fcc0-44af-b9a3-3dd9a1b6d194" providerId="ADAL" clId="{B2971CB8-DC99-46E1-8F51-F9F5F25F4ACD}" dt="2022-03-21T16:58:51.501" v="402" actId="478"/>
+          <ac:spMkLst>
+            <pc:docMk/>
+            <pc:sldMk cId="3826028550" sldId="263"/>
+            <ac:spMk id="28" creationId="{77CB69F6-7CC9-49CB-BC77-B9028F069916}"/>
+          </ac:spMkLst>
+        </pc:spChg>
+        <pc:spChg chg="add del mod">
+          <ac:chgData name="Christoph Schäfer" userId="ee783fdd-fcc0-44af-b9a3-3dd9a1b6d194" providerId="ADAL" clId="{B2971CB8-DC99-46E1-8F51-F9F5F25F4ACD}" dt="2022-03-21T16:51:39.153" v="287"/>
+          <ac:spMkLst>
+            <pc:docMk/>
+            <pc:sldMk cId="3826028550" sldId="263"/>
+            <ac:spMk id="31" creationId="{0C9101A1-2F0B-418E-AFA5-B70A5904B8C4}"/>
+          </ac:spMkLst>
+        </pc:spChg>
+        <pc:spChg chg="add del mod">
+          <ac:chgData name="Christoph Schäfer" userId="ee783fdd-fcc0-44af-b9a3-3dd9a1b6d194" providerId="ADAL" clId="{B2971CB8-DC99-46E1-8F51-F9F5F25F4ACD}" dt="2022-03-21T16:51:39.153" v="287"/>
+          <ac:spMkLst>
+            <pc:docMk/>
+            <pc:sldMk cId="3826028550" sldId="263"/>
+            <ac:spMk id="32" creationId="{E8103922-239E-420B-BB89-AA0FA31ACE4E}"/>
+          </ac:spMkLst>
+        </pc:spChg>
+        <pc:spChg chg="add del mod">
+          <ac:chgData name="Christoph Schäfer" userId="ee783fdd-fcc0-44af-b9a3-3dd9a1b6d194" providerId="ADAL" clId="{B2971CB8-DC99-46E1-8F51-F9F5F25F4ACD}" dt="2022-03-21T16:51:39.153" v="287"/>
+          <ac:spMkLst>
+            <pc:docMk/>
+            <pc:sldMk cId="3826028550" sldId="263"/>
+            <ac:spMk id="33" creationId="{38BD7996-D421-4DD6-9056-C31944463F27}"/>
+          </ac:spMkLst>
+        </pc:spChg>
+        <pc:spChg chg="add del mod">
+          <ac:chgData name="Christoph Schäfer" userId="ee783fdd-fcc0-44af-b9a3-3dd9a1b6d194" providerId="ADAL" clId="{B2971CB8-DC99-46E1-8F51-F9F5F25F4ACD}" dt="2022-03-21T16:51:39.153" v="287"/>
+          <ac:spMkLst>
+            <pc:docMk/>
+            <pc:sldMk cId="3826028550" sldId="263"/>
+            <ac:spMk id="34" creationId="{F261050A-9DA6-4D28-9F2D-2A633C7DDF7B}"/>
+          </ac:spMkLst>
+        </pc:spChg>
+        <pc:spChg chg="add del mod">
+          <ac:chgData name="Christoph Schäfer" userId="ee783fdd-fcc0-44af-b9a3-3dd9a1b6d194" providerId="ADAL" clId="{B2971CB8-DC99-46E1-8F51-F9F5F25F4ACD}" dt="2022-03-21T16:51:39.153" v="287"/>
+          <ac:spMkLst>
+            <pc:docMk/>
+            <pc:sldMk cId="3826028550" sldId="263"/>
+            <ac:spMk id="35" creationId="{CC133D1C-D9A3-4C0A-832D-053D5E793334}"/>
+          </ac:spMkLst>
+        </pc:spChg>
+        <pc:spChg chg="add del mod">
+          <ac:chgData name="Christoph Schäfer" userId="ee783fdd-fcc0-44af-b9a3-3dd9a1b6d194" providerId="ADAL" clId="{B2971CB8-DC99-46E1-8F51-F9F5F25F4ACD}" dt="2022-03-21T16:51:39.153" v="287"/>
+          <ac:spMkLst>
+            <pc:docMk/>
+            <pc:sldMk cId="3826028550" sldId="263"/>
+            <ac:spMk id="37" creationId="{443F51A1-65AF-4F07-B25B-0948DD651635}"/>
+          </ac:spMkLst>
+        </pc:spChg>
+        <pc:spChg chg="add del mod">
+          <ac:chgData name="Christoph Schäfer" userId="ee783fdd-fcc0-44af-b9a3-3dd9a1b6d194" providerId="ADAL" clId="{B2971CB8-DC99-46E1-8F51-F9F5F25F4ACD}" dt="2022-03-21T16:51:39.153" v="287"/>
+          <ac:spMkLst>
+            <pc:docMk/>
+            <pc:sldMk cId="3826028550" sldId="263"/>
+            <ac:spMk id="38" creationId="{EB5ED13D-C913-4A72-9867-C790EC800C66}"/>
+          </ac:spMkLst>
+        </pc:spChg>
+        <pc:spChg chg="add mod">
+          <ac:chgData name="Christoph Schäfer" userId="ee783fdd-fcc0-44af-b9a3-3dd9a1b6d194" providerId="ADAL" clId="{B2971CB8-DC99-46E1-8F51-F9F5F25F4ACD}" dt="2022-03-22T08:03:43.666" v="518" actId="1076"/>
+          <ac:spMkLst>
+            <pc:docMk/>
+            <pc:sldMk cId="3826028550" sldId="263"/>
+            <ac:spMk id="41" creationId="{CA94829D-BB87-4F60-AFC2-75A386D0E98C}"/>
+          </ac:spMkLst>
+        </pc:spChg>
+        <pc:spChg chg="add del mod">
+          <ac:chgData name="Christoph Schäfer" userId="ee783fdd-fcc0-44af-b9a3-3dd9a1b6d194" providerId="ADAL" clId="{B2971CB8-DC99-46E1-8F51-F9F5F25F4ACD}" dt="2022-03-21T16:54:31.310" v="336" actId="478"/>
+          <ac:spMkLst>
+            <pc:docMk/>
+            <pc:sldMk cId="3826028550" sldId="263"/>
+            <ac:spMk id="42" creationId="{48D437AC-6198-4279-B305-0E5943A0D52A}"/>
+          </ac:spMkLst>
+        </pc:spChg>
+        <pc:spChg chg="add mod">
+          <ac:chgData name="Christoph Schäfer" userId="ee783fdd-fcc0-44af-b9a3-3dd9a1b6d194" providerId="ADAL" clId="{B2971CB8-DC99-46E1-8F51-F9F5F25F4ACD}" dt="2022-03-22T08:03:43.666" v="518" actId="1076"/>
+          <ac:spMkLst>
+            <pc:docMk/>
+            <pc:sldMk cId="3826028550" sldId="263"/>
+            <ac:spMk id="43" creationId="{955102BA-44EA-4F94-BDAC-DABEB5B665B9}"/>
+          </ac:spMkLst>
+        </pc:spChg>
+        <pc:spChg chg="add mod">
+          <ac:chgData name="Christoph Schäfer" userId="ee783fdd-fcc0-44af-b9a3-3dd9a1b6d194" providerId="ADAL" clId="{B2971CB8-DC99-46E1-8F51-F9F5F25F4ACD}" dt="2022-03-22T08:03:43.666" v="518" actId="1076"/>
+          <ac:spMkLst>
+            <pc:docMk/>
+            <pc:sldMk cId="3826028550" sldId="263"/>
+            <ac:spMk id="44" creationId="{82B041F7-680C-4976-A546-EC9104B7278C}"/>
+          </ac:spMkLst>
+        </pc:spChg>
+        <pc:spChg chg="add mod">
+          <ac:chgData name="Christoph Schäfer" userId="ee783fdd-fcc0-44af-b9a3-3dd9a1b6d194" providerId="ADAL" clId="{B2971CB8-DC99-46E1-8F51-F9F5F25F4ACD}" dt="2022-03-22T08:03:43.666" v="518" actId="1076"/>
+          <ac:spMkLst>
+            <pc:docMk/>
+            <pc:sldMk cId="3826028550" sldId="263"/>
+            <ac:spMk id="45" creationId="{32A6C5A7-D260-4755-B42D-EF024CA8E105}"/>
+          </ac:spMkLst>
+        </pc:spChg>
+        <pc:spChg chg="add mod">
+          <ac:chgData name="Christoph Schäfer" userId="ee783fdd-fcc0-44af-b9a3-3dd9a1b6d194" providerId="ADAL" clId="{B2971CB8-DC99-46E1-8F51-F9F5F25F4ACD}" dt="2022-03-22T08:03:43.666" v="518" actId="1076"/>
+          <ac:spMkLst>
+            <pc:docMk/>
+            <pc:sldMk cId="3826028550" sldId="263"/>
+            <ac:spMk id="47" creationId="{0328B232-C904-4ECB-A409-7E4AF412F81F}"/>
+          </ac:spMkLst>
+        </pc:spChg>
+        <pc:spChg chg="add mod">
+          <ac:chgData name="Christoph Schäfer" userId="ee783fdd-fcc0-44af-b9a3-3dd9a1b6d194" providerId="ADAL" clId="{B2971CB8-DC99-46E1-8F51-F9F5F25F4ACD}" dt="2022-03-22T08:03:43.666" v="518" actId="1076"/>
+          <ac:spMkLst>
+            <pc:docMk/>
+            <pc:sldMk cId="3826028550" sldId="263"/>
+            <ac:spMk id="48" creationId="{DECC73AA-00C9-4FCB-89FF-DBA50C06211E}"/>
+          </ac:spMkLst>
+        </pc:spChg>
+        <pc:spChg chg="add mod">
+          <ac:chgData name="Christoph Schäfer" userId="ee783fdd-fcc0-44af-b9a3-3dd9a1b6d194" providerId="ADAL" clId="{B2971CB8-DC99-46E1-8F51-F9F5F25F4ACD}" dt="2022-03-22T08:03:43.666" v="518" actId="1076"/>
+          <ac:spMkLst>
+            <pc:docMk/>
+            <pc:sldMk cId="3826028550" sldId="263"/>
+            <ac:spMk id="49" creationId="{E53D50F3-9ACB-4BF3-ADDB-F3FB5F67D4F1}"/>
+          </ac:spMkLst>
+        </pc:spChg>
+        <pc:spChg chg="add mod">
+          <ac:chgData name="Christoph Schäfer" userId="ee783fdd-fcc0-44af-b9a3-3dd9a1b6d194" providerId="ADAL" clId="{B2971CB8-DC99-46E1-8F51-F9F5F25F4ACD}" dt="2022-03-22T08:03:43.666" v="518" actId="1076"/>
+          <ac:spMkLst>
+            <pc:docMk/>
+            <pc:sldMk cId="3826028550" sldId="263"/>
+            <ac:spMk id="50" creationId="{089928CE-E0B1-40D5-BAB0-D425D0626EBD}"/>
+          </ac:spMkLst>
+        </pc:spChg>
+        <pc:spChg chg="add mod">
+          <ac:chgData name="Christoph Schäfer" userId="ee783fdd-fcc0-44af-b9a3-3dd9a1b6d194" providerId="ADAL" clId="{B2971CB8-DC99-46E1-8F51-F9F5F25F4ACD}" dt="2022-03-22T08:03:43.666" v="518" actId="1076"/>
+          <ac:spMkLst>
+            <pc:docMk/>
+            <pc:sldMk cId="3826028550" sldId="263"/>
+            <ac:spMk id="51" creationId="{27CD38FC-3661-4D39-B63A-A85FB9DF5841}"/>
+          </ac:spMkLst>
+        </pc:spChg>
+        <pc:spChg chg="add mod">
+          <ac:chgData name="Christoph Schäfer" userId="ee783fdd-fcc0-44af-b9a3-3dd9a1b6d194" providerId="ADAL" clId="{B2971CB8-DC99-46E1-8F51-F9F5F25F4ACD}" dt="2022-03-22T08:03:43.666" v="518" actId="1076"/>
+          <ac:spMkLst>
+            <pc:docMk/>
+            <pc:sldMk cId="3826028550" sldId="263"/>
+            <ac:spMk id="52" creationId="{978275FF-953E-4670-B0C1-CE88ACD0D522}"/>
+          </ac:spMkLst>
+        </pc:spChg>
+        <pc:spChg chg="add mod">
+          <ac:chgData name="Christoph Schäfer" userId="ee783fdd-fcc0-44af-b9a3-3dd9a1b6d194" providerId="ADAL" clId="{B2971CB8-DC99-46E1-8F51-F9F5F25F4ACD}" dt="2022-03-22T08:03:43.666" v="518" actId="1076"/>
+          <ac:spMkLst>
+            <pc:docMk/>
+            <pc:sldMk cId="3826028550" sldId="263"/>
+            <ac:spMk id="53" creationId="{FCFCA02F-292C-4E8D-95E2-70AC918BD046}"/>
+          </ac:spMkLst>
+        </pc:spChg>
+        <pc:spChg chg="add del mod">
+          <ac:chgData name="Christoph Schäfer" userId="ee783fdd-fcc0-44af-b9a3-3dd9a1b6d194" providerId="ADAL" clId="{B2971CB8-DC99-46E1-8F51-F9F5F25F4ACD}" dt="2022-03-21T17:05:59.901" v="477" actId="478"/>
+          <ac:spMkLst>
+            <pc:docMk/>
+            <pc:sldMk cId="3826028550" sldId="263"/>
+            <ac:spMk id="67" creationId="{A2A49C42-8FE8-408E-8D77-3224EF3B8482}"/>
+          </ac:spMkLst>
+        </pc:spChg>
+        <pc:spChg chg="add mod">
+          <ac:chgData name="Christoph Schäfer" userId="ee783fdd-fcc0-44af-b9a3-3dd9a1b6d194" providerId="ADAL" clId="{B2971CB8-DC99-46E1-8F51-F9F5F25F4ACD}" dt="2022-03-22T08:03:43.666" v="518" actId="1076"/>
+          <ac:spMkLst>
+            <pc:docMk/>
+            <pc:sldMk cId="3826028550" sldId="263"/>
+            <ac:spMk id="68" creationId="{8B771345-75FA-49C8-806D-F0C6BC3E9D3A}"/>
+          </ac:spMkLst>
+        </pc:spChg>
+        <pc:spChg chg="add mod">
+          <ac:chgData name="Christoph Schäfer" userId="ee783fdd-fcc0-44af-b9a3-3dd9a1b6d194" providerId="ADAL" clId="{B2971CB8-DC99-46E1-8F51-F9F5F25F4ACD}" dt="2022-03-22T08:03:43.666" v="518" actId="1076"/>
+          <ac:spMkLst>
+            <pc:docMk/>
+            <pc:sldMk cId="3826028550" sldId="263"/>
+            <ac:spMk id="69" creationId="{E3186FB9-716F-4834-B588-99AB1724F90A}"/>
+          </ac:spMkLst>
+        </pc:spChg>
+        <pc:spChg chg="add del mod">
+          <ac:chgData name="Christoph Schäfer" userId="ee783fdd-fcc0-44af-b9a3-3dd9a1b6d194" providerId="ADAL" clId="{B2971CB8-DC99-46E1-8F51-F9F5F25F4ACD}" dt="2022-03-21T16:56:45.742" v="374"/>
+          <ac:spMkLst>
+            <pc:docMk/>
+            <pc:sldMk cId="3826028550" sldId="263"/>
+            <ac:spMk id="70" creationId="{CF47C621-AFF7-4012-9D4A-2E5A639C45EE}"/>
+          </ac:spMkLst>
+        </pc:spChg>
+        <pc:spChg chg="add mod">
+          <ac:chgData name="Christoph Schäfer" userId="ee783fdd-fcc0-44af-b9a3-3dd9a1b6d194" providerId="ADAL" clId="{B2971CB8-DC99-46E1-8F51-F9F5F25F4ACD}" dt="2022-03-22T08:03:43.666" v="518" actId="1076"/>
+          <ac:spMkLst>
+            <pc:docMk/>
+            <pc:sldMk cId="3826028550" sldId="263"/>
+            <ac:spMk id="71" creationId="{DE2246E7-3572-4248-91C6-1B1FA73B8C0E}"/>
+          </ac:spMkLst>
+        </pc:spChg>
+        <pc:spChg chg="add mod">
+          <ac:chgData name="Christoph Schäfer" userId="ee783fdd-fcc0-44af-b9a3-3dd9a1b6d194" providerId="ADAL" clId="{B2971CB8-DC99-46E1-8F51-F9F5F25F4ACD}" dt="2022-03-22T08:03:43.666" v="518" actId="1076"/>
+          <ac:spMkLst>
+            <pc:docMk/>
+            <pc:sldMk cId="3826028550" sldId="263"/>
+            <ac:spMk id="72" creationId="{AB965B66-55FF-4B62-A366-82504F59709B}"/>
+          </ac:spMkLst>
+        </pc:spChg>
+        <pc:spChg chg="add mod">
+          <ac:chgData name="Christoph Schäfer" userId="ee783fdd-fcc0-44af-b9a3-3dd9a1b6d194" providerId="ADAL" clId="{B2971CB8-DC99-46E1-8F51-F9F5F25F4ACD}" dt="2022-03-22T08:03:43.666" v="518" actId="1076"/>
+          <ac:spMkLst>
+            <pc:docMk/>
+            <pc:sldMk cId="3826028550" sldId="263"/>
+            <ac:spMk id="73" creationId="{F4F9F9D9-2553-45B2-8953-DB24D6834F82}"/>
+          </ac:spMkLst>
+        </pc:spChg>
+        <pc:spChg chg="add mod">
+          <ac:chgData name="Christoph Schäfer" userId="ee783fdd-fcc0-44af-b9a3-3dd9a1b6d194" providerId="ADAL" clId="{B2971CB8-DC99-46E1-8F51-F9F5F25F4ACD}" dt="2022-03-22T08:03:43.666" v="518" actId="1076"/>
+          <ac:spMkLst>
+            <pc:docMk/>
+            <pc:sldMk cId="3826028550" sldId="263"/>
+            <ac:spMk id="74" creationId="{E36F768A-E382-4CE4-A9B3-25ACDB930B64}"/>
+          </ac:spMkLst>
+        </pc:spChg>
+        <pc:spChg chg="add mod">
+          <ac:chgData name="Christoph Schäfer" userId="ee783fdd-fcc0-44af-b9a3-3dd9a1b6d194" providerId="ADAL" clId="{B2971CB8-DC99-46E1-8F51-F9F5F25F4ACD}" dt="2022-03-22T08:03:43.666" v="518" actId="1076"/>
+          <ac:spMkLst>
+            <pc:docMk/>
+            <pc:sldMk cId="3826028550" sldId="263"/>
+            <ac:spMk id="75" creationId="{13C21F48-9614-4E1E-83FD-AC2A1DB51740}"/>
+          </ac:spMkLst>
+        </pc:spChg>
+        <pc:spChg chg="add mod">
+          <ac:chgData name="Christoph Schäfer" userId="ee783fdd-fcc0-44af-b9a3-3dd9a1b6d194" providerId="ADAL" clId="{B2971CB8-DC99-46E1-8F51-F9F5F25F4ACD}" dt="2022-03-22T08:03:43.666" v="518" actId="1076"/>
+          <ac:spMkLst>
+            <pc:docMk/>
+            <pc:sldMk cId="3826028550" sldId="263"/>
+            <ac:spMk id="77" creationId="{661FCACF-4350-4E9B-AC3F-5A2C35E3808D}"/>
+          </ac:spMkLst>
+        </pc:spChg>
+        <pc:spChg chg="add mod">
+          <ac:chgData name="Christoph Schäfer" userId="ee783fdd-fcc0-44af-b9a3-3dd9a1b6d194" providerId="ADAL" clId="{B2971CB8-DC99-46E1-8F51-F9F5F25F4ACD}" dt="2022-03-22T08:03:43.666" v="518" actId="1076"/>
+          <ac:spMkLst>
+            <pc:docMk/>
+            <pc:sldMk cId="3826028550" sldId="263"/>
+            <ac:spMk id="79" creationId="{6330D77C-1B08-4405-BEBF-1D73F167D875}"/>
+          </ac:spMkLst>
+        </pc:spChg>
+        <pc:spChg chg="add mod">
+          <ac:chgData name="Christoph Schäfer" userId="ee783fdd-fcc0-44af-b9a3-3dd9a1b6d194" providerId="ADAL" clId="{B2971CB8-DC99-46E1-8F51-F9F5F25F4ACD}" dt="2022-03-22T08:03:43.666" v="518" actId="1076"/>
+          <ac:spMkLst>
+            <pc:docMk/>
+            <pc:sldMk cId="3826028550" sldId="263"/>
+            <ac:spMk id="81" creationId="{FAF697EF-AD08-4575-90C1-69C2DA63A7D1}"/>
+          </ac:spMkLst>
+        </pc:spChg>
+        <pc:spChg chg="add mod">
+          <ac:chgData name="Christoph Schäfer" userId="ee783fdd-fcc0-44af-b9a3-3dd9a1b6d194" providerId="ADAL" clId="{B2971CB8-DC99-46E1-8F51-F9F5F25F4ACD}" dt="2022-03-22T08:03:43.666" v="518" actId="1076"/>
+          <ac:spMkLst>
+            <pc:docMk/>
+            <pc:sldMk cId="3826028550" sldId="263"/>
+            <ac:spMk id="82" creationId="{EB34645F-F954-4448-96A8-C82C0E6364D6}"/>
+          </ac:spMkLst>
+        </pc:spChg>
+        <pc:spChg chg="add mod">
+          <ac:chgData name="Christoph Schäfer" userId="ee783fdd-fcc0-44af-b9a3-3dd9a1b6d194" providerId="ADAL" clId="{B2971CB8-DC99-46E1-8F51-F9F5F25F4ACD}" dt="2022-03-22T08:03:43.666" v="518" actId="1076"/>
+          <ac:spMkLst>
+            <pc:docMk/>
+            <pc:sldMk cId="3826028550" sldId="263"/>
+            <ac:spMk id="83" creationId="{B05A3900-4A50-426B-9059-997E4FEDE0D9}"/>
+          </ac:spMkLst>
+        </pc:spChg>
+        <pc:spChg chg="add del mod">
+          <ac:chgData name="Christoph Schäfer" userId="ee783fdd-fcc0-44af-b9a3-3dd9a1b6d194" providerId="ADAL" clId="{B2971CB8-DC99-46E1-8F51-F9F5F25F4ACD}" dt="2022-03-21T17:00:39.577" v="425"/>
+          <ac:spMkLst>
+            <pc:docMk/>
+            <pc:sldMk cId="3826028550" sldId="263"/>
+            <ac:spMk id="84" creationId="{5F62FC89-18A2-4F2E-9105-CD51C81FBDB3}"/>
+          </ac:spMkLst>
+        </pc:spChg>
+        <pc:spChg chg="add mod">
+          <ac:chgData name="Christoph Schäfer" userId="ee783fdd-fcc0-44af-b9a3-3dd9a1b6d194" providerId="ADAL" clId="{B2971CB8-DC99-46E1-8F51-F9F5F25F4ACD}" dt="2022-03-22T08:03:43.666" v="518" actId="1076"/>
+          <ac:spMkLst>
+            <pc:docMk/>
+            <pc:sldMk cId="3826028550" sldId="263"/>
+            <ac:spMk id="90" creationId="{7A267B77-928C-42A1-94BE-D99AAB277933}"/>
+          </ac:spMkLst>
+        </pc:spChg>
+        <pc:spChg chg="add mod">
+          <ac:chgData name="Christoph Schäfer" userId="ee783fdd-fcc0-44af-b9a3-3dd9a1b6d194" providerId="ADAL" clId="{B2971CB8-DC99-46E1-8F51-F9F5F25F4ACD}" dt="2022-03-22T08:03:43.666" v="518" actId="1076"/>
+          <ac:spMkLst>
+            <pc:docMk/>
+            <pc:sldMk cId="3826028550" sldId="263"/>
+            <ac:spMk id="91" creationId="{764F1546-EA85-4EC8-8471-BE2F988939C6}"/>
+          </ac:spMkLst>
+        </pc:spChg>
+        <pc:spChg chg="add mod">
+          <ac:chgData name="Christoph Schäfer" userId="ee783fdd-fcc0-44af-b9a3-3dd9a1b6d194" providerId="ADAL" clId="{B2971CB8-DC99-46E1-8F51-F9F5F25F4ACD}" dt="2022-03-22T08:03:43.666" v="518" actId="1076"/>
+          <ac:spMkLst>
+            <pc:docMk/>
+            <pc:sldMk cId="3826028550" sldId="263"/>
+            <ac:spMk id="92" creationId="{4D7EC356-0D82-4D35-9B37-53EE454C0D66}"/>
+          </ac:spMkLst>
+        </pc:spChg>
+        <pc:spChg chg="add mod">
+          <ac:chgData name="Christoph Schäfer" userId="ee783fdd-fcc0-44af-b9a3-3dd9a1b6d194" providerId="ADAL" clId="{B2971CB8-DC99-46E1-8F51-F9F5F25F4ACD}" dt="2022-03-22T08:03:43.666" v="518" actId="1076"/>
+          <ac:spMkLst>
+            <pc:docMk/>
+            <pc:sldMk cId="3826028550" sldId="263"/>
+            <ac:spMk id="93" creationId="{7BCEF306-77C4-402B-A67A-1D1FCED0CDCB}"/>
+          </ac:spMkLst>
+        </pc:spChg>
+        <pc:spChg chg="add mod">
+          <ac:chgData name="Christoph Schäfer" userId="ee783fdd-fcc0-44af-b9a3-3dd9a1b6d194" providerId="ADAL" clId="{B2971CB8-DC99-46E1-8F51-F9F5F25F4ACD}" dt="2022-03-22T08:03:43.666" v="518" actId="1076"/>
+          <ac:spMkLst>
+            <pc:docMk/>
+            <pc:sldMk cId="3826028550" sldId="263"/>
+            <ac:spMk id="94" creationId="{BCB3A1C6-6FD2-4783-966F-F938965DE2B7}"/>
+          </ac:spMkLst>
+        </pc:spChg>
+        <pc:spChg chg="add mod">
+          <ac:chgData name="Christoph Schäfer" userId="ee783fdd-fcc0-44af-b9a3-3dd9a1b6d194" providerId="ADAL" clId="{B2971CB8-DC99-46E1-8F51-F9F5F25F4ACD}" dt="2022-03-22T08:03:43.666" v="518" actId="1076"/>
+          <ac:spMkLst>
+            <pc:docMk/>
+            <pc:sldMk cId="3826028550" sldId="263"/>
+            <ac:spMk id="95" creationId="{F8CADBC6-D5D1-4491-BFEC-0C0805B7A46E}"/>
+          </ac:spMkLst>
+        </pc:spChg>
+        <pc:spChg chg="add mod">
+          <ac:chgData name="Christoph Schäfer" userId="ee783fdd-fcc0-44af-b9a3-3dd9a1b6d194" providerId="ADAL" clId="{B2971CB8-DC99-46E1-8F51-F9F5F25F4ACD}" dt="2022-03-22T08:03:43.666" v="518" actId="1076"/>
+          <ac:spMkLst>
+            <pc:docMk/>
+            <pc:sldMk cId="3826028550" sldId="263"/>
+            <ac:spMk id="96" creationId="{EDE6DD9F-F603-4DC8-8EC7-2523C24EE814}"/>
+          </ac:spMkLst>
+        </pc:spChg>
+        <pc:spChg chg="add mod">
+          <ac:chgData name="Christoph Schäfer" userId="ee783fdd-fcc0-44af-b9a3-3dd9a1b6d194" providerId="ADAL" clId="{B2971CB8-DC99-46E1-8F51-F9F5F25F4ACD}" dt="2022-03-22T08:03:43.666" v="518" actId="1076"/>
+          <ac:spMkLst>
+            <pc:docMk/>
+            <pc:sldMk cId="3826028550" sldId="263"/>
+            <ac:spMk id="97" creationId="{6CB14047-7373-45F8-A411-B25134458BDB}"/>
+          </ac:spMkLst>
+        </pc:spChg>
+        <pc:picChg chg="del mod">
+          <ac:chgData name="Christoph Schäfer" userId="ee783fdd-fcc0-44af-b9a3-3dd9a1b6d194" providerId="ADAL" clId="{B2971CB8-DC99-46E1-8F51-F9F5F25F4ACD}" dt="2022-03-21T16:50:43.818" v="268" actId="478"/>
+          <ac:picMkLst>
+            <pc:docMk/>
+            <pc:sldMk cId="3826028550" sldId="263"/>
+            <ac:picMk id="5" creationId="{140BB564-8EEB-41A9-8FCA-71DD54B30566}"/>
+          </ac:picMkLst>
+        </pc:picChg>
+        <pc:picChg chg="del mod">
+          <ac:chgData name="Christoph Schäfer" userId="ee783fdd-fcc0-44af-b9a3-3dd9a1b6d194" providerId="ADAL" clId="{B2971CB8-DC99-46E1-8F51-F9F5F25F4ACD}" dt="2022-03-21T17:08:07.988" v="516" actId="478"/>
+          <ac:picMkLst>
+            <pc:docMk/>
+            <pc:sldMk cId="3826028550" sldId="263"/>
+            <ac:picMk id="7" creationId="{9B9CEC79-62FE-43D7-9E51-8DFF4A015AEC}"/>
+          </ac:picMkLst>
+        </pc:picChg>
+        <pc:cxnChg chg="add mod">
+          <ac:chgData name="Christoph Schäfer" userId="ee783fdd-fcc0-44af-b9a3-3dd9a1b6d194" providerId="ADAL" clId="{B2971CB8-DC99-46E1-8F51-F9F5F25F4ACD}" dt="2022-03-22T08:03:43.666" v="518" actId="1076"/>
+          <ac:cxnSpMkLst>
+            <pc:docMk/>
+            <pc:sldMk cId="3826028550" sldId="263"/>
+            <ac:cxnSpMk id="3" creationId="{E1FAF594-CC3F-4434-9E08-0883C5FE547C}"/>
+          </ac:cxnSpMkLst>
+        </pc:cxnChg>
+        <pc:cxnChg chg="add mod">
+          <ac:chgData name="Christoph Schäfer" userId="ee783fdd-fcc0-44af-b9a3-3dd9a1b6d194" providerId="ADAL" clId="{B2971CB8-DC99-46E1-8F51-F9F5F25F4ACD}" dt="2022-03-22T08:03:43.666" v="518" actId="1076"/>
+          <ac:cxnSpMkLst>
+            <pc:docMk/>
+            <pc:sldMk cId="3826028550" sldId="263"/>
+            <ac:cxnSpMk id="8" creationId="{2930F374-32C0-49C7-8902-E4B7A2BB2EB8}"/>
+          </ac:cxnSpMkLst>
+        </pc:cxnChg>
+        <pc:cxnChg chg="add mod">
+          <ac:chgData name="Christoph Schäfer" userId="ee783fdd-fcc0-44af-b9a3-3dd9a1b6d194" providerId="ADAL" clId="{B2971CB8-DC99-46E1-8F51-F9F5F25F4ACD}" dt="2022-03-22T08:03:43.666" v="518" actId="1076"/>
+          <ac:cxnSpMkLst>
+            <pc:docMk/>
+            <pc:sldMk cId="3826028550" sldId="263"/>
+            <ac:cxnSpMk id="14" creationId="{DB834585-80CD-4E06-9E2F-6B4166ABBC7F}"/>
+          </ac:cxnSpMkLst>
+        </pc:cxnChg>
+        <pc:cxnChg chg="add mod">
+          <ac:chgData name="Christoph Schäfer" userId="ee783fdd-fcc0-44af-b9a3-3dd9a1b6d194" providerId="ADAL" clId="{B2971CB8-DC99-46E1-8F51-F9F5F25F4ACD}" dt="2022-03-22T08:03:43.666" v="518" actId="1076"/>
+          <ac:cxnSpMkLst>
+            <pc:docMk/>
+            <pc:sldMk cId="3826028550" sldId="263"/>
+            <ac:cxnSpMk id="20" creationId="{31F3AB1F-035F-4233-BF1F-D19EC20B25D4}"/>
+          </ac:cxnSpMkLst>
+        </pc:cxnChg>
+        <pc:cxnChg chg="add mod">
+          <ac:chgData name="Christoph Schäfer" userId="ee783fdd-fcc0-44af-b9a3-3dd9a1b6d194" providerId="ADAL" clId="{B2971CB8-DC99-46E1-8F51-F9F5F25F4ACD}" dt="2022-03-22T08:03:43.666" v="518" actId="1076"/>
+          <ac:cxnSpMkLst>
+            <pc:docMk/>
+            <pc:sldMk cId="3826028550" sldId="263"/>
+            <ac:cxnSpMk id="21" creationId="{AD3D999C-F440-4B98-B6FE-326E0C1D5395}"/>
+          </ac:cxnSpMkLst>
+        </pc:cxnChg>
+        <pc:cxnChg chg="add del mod">
+          <ac:chgData name="Christoph Schäfer" userId="ee783fdd-fcc0-44af-b9a3-3dd9a1b6d194" providerId="ADAL" clId="{B2971CB8-DC99-46E1-8F51-F9F5F25F4ACD}" dt="2022-03-21T16:58:47.668" v="401" actId="478"/>
+          <ac:cxnSpMkLst>
+            <pc:docMk/>
+            <pc:sldMk cId="3826028550" sldId="263"/>
+            <ac:cxnSpMk id="27" creationId="{BE619E13-8E8A-4CE1-B867-7FCEB3F34376}"/>
+          </ac:cxnSpMkLst>
+        </pc:cxnChg>
+        <pc:cxnChg chg="add del mod">
+          <ac:chgData name="Christoph Schäfer" userId="ee783fdd-fcc0-44af-b9a3-3dd9a1b6d194" providerId="ADAL" clId="{B2971CB8-DC99-46E1-8F51-F9F5F25F4ACD}" dt="2022-03-21T16:51:39.153" v="287"/>
+          <ac:cxnSpMkLst>
+            <pc:docMk/>
+            <pc:sldMk cId="3826028550" sldId="263"/>
+            <ac:cxnSpMk id="29" creationId="{B80DB528-EC0C-4A3E-B1F5-2A9B8FDAFD59}"/>
+          </ac:cxnSpMkLst>
+        </pc:cxnChg>
+        <pc:cxnChg chg="add del mod">
+          <ac:chgData name="Christoph Schäfer" userId="ee783fdd-fcc0-44af-b9a3-3dd9a1b6d194" providerId="ADAL" clId="{B2971CB8-DC99-46E1-8F51-F9F5F25F4ACD}" dt="2022-03-21T16:51:39.153" v="287"/>
+          <ac:cxnSpMkLst>
+            <pc:docMk/>
+            <pc:sldMk cId="3826028550" sldId="263"/>
+            <ac:cxnSpMk id="30" creationId="{38BD8EBA-1F71-454A-87FE-1A36C7056AD4}"/>
+          </ac:cxnSpMkLst>
+        </pc:cxnChg>
+        <pc:cxnChg chg="add del mod">
+          <ac:chgData name="Christoph Schäfer" userId="ee783fdd-fcc0-44af-b9a3-3dd9a1b6d194" providerId="ADAL" clId="{B2971CB8-DC99-46E1-8F51-F9F5F25F4ACD}" dt="2022-03-21T16:51:39.153" v="287"/>
+          <ac:cxnSpMkLst>
+            <pc:docMk/>
+            <pc:sldMk cId="3826028550" sldId="263"/>
+            <ac:cxnSpMk id="36" creationId="{966A638E-DE59-41B0-8072-993B02533287}"/>
+          </ac:cxnSpMkLst>
+        </pc:cxnChg>
+        <pc:cxnChg chg="add mod">
+          <ac:chgData name="Christoph Schäfer" userId="ee783fdd-fcc0-44af-b9a3-3dd9a1b6d194" providerId="ADAL" clId="{B2971CB8-DC99-46E1-8F51-F9F5F25F4ACD}" dt="2022-03-22T08:03:43.666" v="518" actId="1076"/>
+          <ac:cxnSpMkLst>
+            <pc:docMk/>
+            <pc:sldMk cId="3826028550" sldId="263"/>
+            <ac:cxnSpMk id="39" creationId="{F57A06C1-EC89-4C84-B553-27C99D326611}"/>
+          </ac:cxnSpMkLst>
+        </pc:cxnChg>
+        <pc:cxnChg chg="add mod">
+          <ac:chgData name="Christoph Schäfer" userId="ee783fdd-fcc0-44af-b9a3-3dd9a1b6d194" providerId="ADAL" clId="{B2971CB8-DC99-46E1-8F51-F9F5F25F4ACD}" dt="2022-03-22T08:03:43.666" v="518" actId="1076"/>
+          <ac:cxnSpMkLst>
+            <pc:docMk/>
+            <pc:sldMk cId="3826028550" sldId="263"/>
+            <ac:cxnSpMk id="40" creationId="{E5DA4E36-9202-4B35-B2ED-1E73792706D3}"/>
+          </ac:cxnSpMkLst>
+        </pc:cxnChg>
+        <pc:cxnChg chg="add mod">
+          <ac:chgData name="Christoph Schäfer" userId="ee783fdd-fcc0-44af-b9a3-3dd9a1b6d194" providerId="ADAL" clId="{B2971CB8-DC99-46E1-8F51-F9F5F25F4ACD}" dt="2022-03-22T08:03:43.666" v="518" actId="1076"/>
+          <ac:cxnSpMkLst>
+            <pc:docMk/>
+            <pc:sldMk cId="3826028550" sldId="263"/>
+            <ac:cxnSpMk id="46" creationId="{5765F4CE-A334-4058-8C26-689164C14C83}"/>
+          </ac:cxnSpMkLst>
+        </pc:cxnChg>
+        <pc:cxnChg chg="add mod">
+          <ac:chgData name="Christoph Schäfer" userId="ee783fdd-fcc0-44af-b9a3-3dd9a1b6d194" providerId="ADAL" clId="{B2971CB8-DC99-46E1-8F51-F9F5F25F4ACD}" dt="2022-03-22T08:03:43.666" v="518" actId="1076"/>
+          <ac:cxnSpMkLst>
+            <pc:docMk/>
+            <pc:sldMk cId="3826028550" sldId="263"/>
+            <ac:cxnSpMk id="61" creationId="{54BF6B29-7698-4AA3-902C-ABFCC1845E5E}"/>
+          </ac:cxnSpMkLst>
+        </pc:cxnChg>
+        <pc:cxnChg chg="add mod">
+          <ac:chgData name="Christoph Schäfer" userId="ee783fdd-fcc0-44af-b9a3-3dd9a1b6d194" providerId="ADAL" clId="{B2971CB8-DC99-46E1-8F51-F9F5F25F4ACD}" dt="2022-03-22T08:03:43.666" v="518" actId="1076"/>
+          <ac:cxnSpMkLst>
+            <pc:docMk/>
+            <pc:sldMk cId="3826028550" sldId="263"/>
+            <ac:cxnSpMk id="64" creationId="{E1D49C6A-ED3D-4C1F-8FD1-4D3D59983A91}"/>
+          </ac:cxnSpMkLst>
+        </pc:cxnChg>
+        <pc:cxnChg chg="add mod">
+          <ac:chgData name="Christoph Schäfer" userId="ee783fdd-fcc0-44af-b9a3-3dd9a1b6d194" providerId="ADAL" clId="{B2971CB8-DC99-46E1-8F51-F9F5F25F4ACD}" dt="2022-03-22T08:03:43.666" v="518" actId="1076"/>
+          <ac:cxnSpMkLst>
+            <pc:docMk/>
+            <pc:sldMk cId="3826028550" sldId="263"/>
+            <ac:cxnSpMk id="85" creationId="{3E54135C-18A4-4DC1-9003-F8F7D1E39BEB}"/>
+          </ac:cxnSpMkLst>
+        </pc:cxnChg>
+        <pc:cxnChg chg="add mod">
+          <ac:chgData name="Christoph Schäfer" userId="ee783fdd-fcc0-44af-b9a3-3dd9a1b6d194" providerId="ADAL" clId="{B2971CB8-DC99-46E1-8F51-F9F5F25F4ACD}" dt="2022-03-22T08:03:43.666" v="518" actId="1076"/>
+          <ac:cxnSpMkLst>
+            <pc:docMk/>
+            <pc:sldMk cId="3826028550" sldId="263"/>
+            <ac:cxnSpMk id="89" creationId="{271D86D9-5997-4DF9-B3FA-4A0BC59D090C}"/>
+          </ac:cxnSpMkLst>
+        </pc:cxnChg>
+      </pc:sldChg>
     </pc:docChg>
   </pc:docChgLst>
 </pc:chgInfo>
@@ -596,7 +1193,7 @@
           <a:p>
             <a:fld id="{32C0DBB3-3265-429B-96D7-56FBE43BBDD2}" type="datetimeFigureOut">
               <a:rPr lang="de-DE" smtClean="0"/>
-              <a:t>24.01.2022</a:t>
+              <a:t>23.03.2022</a:t>
             </a:fld>
             <a:endParaRPr lang="de-DE"/>
           </a:p>
@@ -794,7 +1391,7 @@
           <a:p>
             <a:fld id="{32C0DBB3-3265-429B-96D7-56FBE43BBDD2}" type="datetimeFigureOut">
               <a:rPr lang="de-DE" smtClean="0"/>
-              <a:t>24.01.2022</a:t>
+              <a:t>23.03.2022</a:t>
             </a:fld>
             <a:endParaRPr lang="de-DE"/>
           </a:p>
@@ -1002,7 +1599,7 @@
           <a:p>
             <a:fld id="{32C0DBB3-3265-429B-96D7-56FBE43BBDD2}" type="datetimeFigureOut">
               <a:rPr lang="de-DE" smtClean="0"/>
-              <a:t>24.01.2022</a:t>
+              <a:t>23.03.2022</a:t>
             </a:fld>
             <a:endParaRPr lang="de-DE"/>
           </a:p>
@@ -1200,7 +1797,7 @@
           <a:p>
             <a:fld id="{32C0DBB3-3265-429B-96D7-56FBE43BBDD2}" type="datetimeFigureOut">
               <a:rPr lang="de-DE" smtClean="0"/>
-              <a:t>24.01.2022</a:t>
+              <a:t>23.03.2022</a:t>
             </a:fld>
             <a:endParaRPr lang="de-DE"/>
           </a:p>
@@ -1475,7 +2072,7 @@
           <a:p>
             <a:fld id="{32C0DBB3-3265-429B-96D7-56FBE43BBDD2}" type="datetimeFigureOut">
               <a:rPr lang="de-DE" smtClean="0"/>
-              <a:t>24.01.2022</a:t>
+              <a:t>23.03.2022</a:t>
             </a:fld>
             <a:endParaRPr lang="de-DE"/>
           </a:p>
@@ -1740,7 +2337,7 @@
           <a:p>
             <a:fld id="{32C0DBB3-3265-429B-96D7-56FBE43BBDD2}" type="datetimeFigureOut">
               <a:rPr lang="de-DE" smtClean="0"/>
-              <a:t>24.01.2022</a:t>
+              <a:t>23.03.2022</a:t>
             </a:fld>
             <a:endParaRPr lang="de-DE"/>
           </a:p>
@@ -2152,7 +2749,7 @@
           <a:p>
             <a:fld id="{32C0DBB3-3265-429B-96D7-56FBE43BBDD2}" type="datetimeFigureOut">
               <a:rPr lang="de-DE" smtClean="0"/>
-              <a:t>24.01.2022</a:t>
+              <a:t>23.03.2022</a:t>
             </a:fld>
             <a:endParaRPr lang="de-DE"/>
           </a:p>
@@ -2293,7 +2890,7 @@
           <a:p>
             <a:fld id="{32C0DBB3-3265-429B-96D7-56FBE43BBDD2}" type="datetimeFigureOut">
               <a:rPr lang="de-DE" smtClean="0"/>
-              <a:t>24.01.2022</a:t>
+              <a:t>23.03.2022</a:t>
             </a:fld>
             <a:endParaRPr lang="de-DE"/>
           </a:p>
@@ -2406,7 +3003,7 @@
           <a:p>
             <a:fld id="{32C0DBB3-3265-429B-96D7-56FBE43BBDD2}" type="datetimeFigureOut">
               <a:rPr lang="de-DE" smtClean="0"/>
-              <a:t>24.01.2022</a:t>
+              <a:t>23.03.2022</a:t>
             </a:fld>
             <a:endParaRPr lang="de-DE"/>
           </a:p>
@@ -2717,7 +3314,7 @@
           <a:p>
             <a:fld id="{32C0DBB3-3265-429B-96D7-56FBE43BBDD2}" type="datetimeFigureOut">
               <a:rPr lang="de-DE" smtClean="0"/>
-              <a:t>24.01.2022</a:t>
+              <a:t>23.03.2022</a:t>
             </a:fld>
             <a:endParaRPr lang="de-DE"/>
           </a:p>
@@ -3005,7 +3602,7 @@
           <a:p>
             <a:fld id="{32C0DBB3-3265-429B-96D7-56FBE43BBDD2}" type="datetimeFigureOut">
               <a:rPr lang="de-DE" smtClean="0"/>
-              <a:t>24.01.2022</a:t>
+              <a:t>23.03.2022</a:t>
             </a:fld>
             <a:endParaRPr lang="de-DE"/>
           </a:p>
@@ -3246,7 +3843,7 @@
           <a:p>
             <a:fld id="{32C0DBB3-3265-429B-96D7-56FBE43BBDD2}" type="datetimeFigureOut">
               <a:rPr lang="de-DE" smtClean="0"/>
-              <a:t>24.01.2022</a:t>
+              <a:t>23.03.2022</a:t>
             </a:fld>
             <a:endParaRPr lang="de-DE"/>
           </a:p>
@@ -7056,70 +7653,1557 @@
           <a:chExt cx="0" cy="0"/>
         </a:xfrm>
       </p:grpSpPr>
-      <p:pic>
-        <p:nvPicPr>
-          <p:cNvPr id="5" name="Grafik 4">
-            <a:extLst>
-              <a:ext uri="{FF2B5EF4-FFF2-40B4-BE49-F238E27FC236}">
-                <a16:creationId xmlns:a16="http://schemas.microsoft.com/office/drawing/2014/main" id="{140BB564-8EEB-41A9-8FCA-71DD54B30566}"/>
-              </a:ext>
-            </a:extLst>
-          </p:cNvPr>
-          <p:cNvPicPr>
-            <a:picLocks noChangeAspect="1"/>
-          </p:cNvPicPr>
-          <p:nvPr/>
-        </p:nvPicPr>
-        <p:blipFill>
-          <a:blip r:embed="rId2"/>
-          <a:stretch>
-            <a:fillRect/>
-          </a:stretch>
-        </p:blipFill>
-        <p:spPr>
-          <a:xfrm>
-            <a:off x="230386" y="762000"/>
-            <a:ext cx="3865364" cy="4834852"/>
+      <p:cxnSp>
+        <p:nvCxnSpPr>
+          <p:cNvPr id="3" name="Gerade Verbindung mit Pfeil 2">
+            <a:extLst>
+              <a:ext uri="{FF2B5EF4-FFF2-40B4-BE49-F238E27FC236}">
+                <a16:creationId xmlns:a16="http://schemas.microsoft.com/office/drawing/2014/main" id="{6FC20D49-B8C4-4820-83D1-6EBC70C1A0BB}"/>
+              </a:ext>
+            </a:extLst>
+          </p:cNvPr>
+          <p:cNvCxnSpPr>
+            <a:cxnSpLocks/>
+          </p:cNvCxnSpPr>
+          <p:nvPr/>
+        </p:nvCxnSpPr>
+        <p:spPr>
+          <a:xfrm>
+            <a:off x="2781300" y="3582824"/>
+            <a:ext cx="6731659" cy="0"/>
+          </a:xfrm>
+          <a:prstGeom prst="straightConnector1">
+            <a:avLst/>
+          </a:prstGeom>
+          <a:ln w="19050">
+            <a:solidFill>
+              <a:schemeClr val="tx1"/>
+            </a:solidFill>
+            <a:headEnd type="triangle"/>
+            <a:tailEnd type="triangle"/>
+          </a:ln>
+        </p:spPr>
+        <p:style>
+          <a:lnRef idx="1">
+            <a:schemeClr val="accent1"/>
+          </a:lnRef>
+          <a:fillRef idx="0">
+            <a:schemeClr val="accent1"/>
+          </a:fillRef>
+          <a:effectRef idx="0">
+            <a:schemeClr val="accent1"/>
+          </a:effectRef>
+          <a:fontRef idx="minor">
+            <a:schemeClr val="tx1"/>
+          </a:fontRef>
+        </p:style>
+      </p:cxnSp>
+      <p:cxnSp>
+        <p:nvCxnSpPr>
+          <p:cNvPr id="7" name="Gerader Verbinder 6">
+            <a:extLst>
+              <a:ext uri="{FF2B5EF4-FFF2-40B4-BE49-F238E27FC236}">
+                <a16:creationId xmlns:a16="http://schemas.microsoft.com/office/drawing/2014/main" id="{31BA32BF-8160-4CA0-8F63-EBD912671EE7}"/>
+              </a:ext>
+            </a:extLst>
+          </p:cNvPr>
+          <p:cNvCxnSpPr>
+            <a:cxnSpLocks/>
+          </p:cNvCxnSpPr>
+          <p:nvPr/>
+        </p:nvCxnSpPr>
+        <p:spPr>
+          <a:xfrm>
+            <a:off x="3572142" y="3462114"/>
+            <a:ext cx="0" cy="241419"/>
+          </a:xfrm>
+          <a:prstGeom prst="line">
+            <a:avLst/>
+          </a:prstGeom>
+          <a:ln w="19050">
+            <a:solidFill>
+              <a:schemeClr val="tx1"/>
+            </a:solidFill>
+          </a:ln>
+        </p:spPr>
+        <p:style>
+          <a:lnRef idx="1">
+            <a:schemeClr val="accent1"/>
+          </a:lnRef>
+          <a:fillRef idx="0">
+            <a:schemeClr val="accent1"/>
+          </a:fillRef>
+          <a:effectRef idx="0">
+            <a:schemeClr val="accent1"/>
+          </a:effectRef>
+          <a:fontRef idx="minor">
+            <a:schemeClr val="tx1"/>
+          </a:fontRef>
+        </p:style>
+      </p:cxnSp>
+      <p:sp>
+        <p:nvSpPr>
+          <p:cNvPr id="11" name="Textfeld 10">
+            <a:extLst>
+              <a:ext uri="{FF2B5EF4-FFF2-40B4-BE49-F238E27FC236}">
+                <a16:creationId xmlns:a16="http://schemas.microsoft.com/office/drawing/2014/main" id="{B2565338-039D-40AF-990D-CDCEBB0DDEAE}"/>
+              </a:ext>
+            </a:extLst>
+          </p:cNvPr>
+          <p:cNvSpPr txBox="1"/>
+          <p:nvPr/>
+        </p:nvSpPr>
+        <p:spPr>
+          <a:xfrm>
+            <a:off x="3327524" y="3696822"/>
+            <a:ext cx="489236" cy="369332"/>
           </a:xfrm>
           <a:prstGeom prst="rect">
             <a:avLst/>
           </a:prstGeom>
-        </p:spPr>
-      </p:pic>
-      <p:pic>
-        <p:nvPicPr>
-          <p:cNvPr id="7" name="Grafik 6">
-            <a:extLst>
-              <a:ext uri="{FF2B5EF4-FFF2-40B4-BE49-F238E27FC236}">
-                <a16:creationId xmlns:a16="http://schemas.microsoft.com/office/drawing/2014/main" id="{9B9CEC79-62FE-43D7-9E51-8DFF4A015AEC}"/>
-              </a:ext>
-            </a:extLst>
-          </p:cNvPr>
-          <p:cNvPicPr>
-            <a:picLocks noChangeAspect="1"/>
-          </p:cNvPicPr>
-          <p:nvPr/>
-        </p:nvPicPr>
-        <p:blipFill>
-          <a:blip r:embed="rId3"/>
-          <a:stretch>
-            <a:fillRect/>
-          </a:stretch>
-        </p:blipFill>
-        <p:spPr>
-          <a:xfrm>
-            <a:off x="5172074" y="1343025"/>
-            <a:ext cx="6562725" cy="4169718"/>
+          <a:noFill/>
+        </p:spPr>
+        <p:txBody>
+          <a:bodyPr wrap="none" rtlCol="0">
+            <a:spAutoFit/>
+          </a:bodyPr>
+          <a:lstStyle/>
+          <a:p>
+            <a:r>
+              <a:rPr lang="de-DE" dirty="0"/>
+              <a:t>-10</a:t>
+            </a:r>
+          </a:p>
+        </p:txBody>
+      </p:sp>
+      <p:cxnSp>
+        <p:nvCxnSpPr>
+          <p:cNvPr id="13" name="Gerader Verbinder 12">
+            <a:extLst>
+              <a:ext uri="{FF2B5EF4-FFF2-40B4-BE49-F238E27FC236}">
+                <a16:creationId xmlns:a16="http://schemas.microsoft.com/office/drawing/2014/main" id="{420CFC0B-F7D2-447A-80E6-13AC8841018F}"/>
+              </a:ext>
+            </a:extLst>
+          </p:cNvPr>
+          <p:cNvCxnSpPr>
+            <a:cxnSpLocks/>
+          </p:cNvCxnSpPr>
+          <p:nvPr/>
+        </p:nvCxnSpPr>
+        <p:spPr>
+          <a:xfrm>
+            <a:off x="4093435" y="3462114"/>
+            <a:ext cx="0" cy="241419"/>
+          </a:xfrm>
+          <a:prstGeom prst="line">
+            <a:avLst/>
+          </a:prstGeom>
+          <a:ln w="19050">
+            <a:solidFill>
+              <a:schemeClr val="tx1"/>
+            </a:solidFill>
+          </a:ln>
+        </p:spPr>
+        <p:style>
+          <a:lnRef idx="1">
+            <a:schemeClr val="accent1"/>
+          </a:lnRef>
+          <a:fillRef idx="0">
+            <a:schemeClr val="accent1"/>
+          </a:fillRef>
+          <a:effectRef idx="0">
+            <a:schemeClr val="accent1"/>
+          </a:effectRef>
+          <a:fontRef idx="minor">
+            <a:schemeClr val="tx1"/>
+          </a:fontRef>
+        </p:style>
+      </p:cxnSp>
+      <p:sp>
+        <p:nvSpPr>
+          <p:cNvPr id="14" name="Textfeld 13">
+            <a:extLst>
+              <a:ext uri="{FF2B5EF4-FFF2-40B4-BE49-F238E27FC236}">
+                <a16:creationId xmlns:a16="http://schemas.microsoft.com/office/drawing/2014/main" id="{6044D833-CA14-4288-82A2-2AF2BA8D54C9}"/>
+              </a:ext>
+            </a:extLst>
+          </p:cNvPr>
+          <p:cNvSpPr txBox="1"/>
+          <p:nvPr/>
+        </p:nvSpPr>
+        <p:spPr>
+          <a:xfrm>
+            <a:off x="3848817" y="3703533"/>
+            <a:ext cx="372218" cy="369332"/>
           </a:xfrm>
           <a:prstGeom prst="rect">
             <a:avLst/>
           </a:prstGeom>
-        </p:spPr>
-      </p:pic>
+          <a:noFill/>
+        </p:spPr>
+        <p:txBody>
+          <a:bodyPr wrap="none" rtlCol="0">
+            <a:spAutoFit/>
+          </a:bodyPr>
+          <a:lstStyle/>
+          <a:p>
+            <a:r>
+              <a:rPr lang="de-DE" dirty="0"/>
+              <a:t>-8</a:t>
+            </a:r>
+          </a:p>
+        </p:txBody>
+      </p:sp>
+      <p:cxnSp>
+        <p:nvCxnSpPr>
+          <p:cNvPr id="17" name="Gerader Verbinder 16">
+            <a:extLst>
+              <a:ext uri="{FF2B5EF4-FFF2-40B4-BE49-F238E27FC236}">
+                <a16:creationId xmlns:a16="http://schemas.microsoft.com/office/drawing/2014/main" id="{3505F748-B0AA-445F-948C-B2EA78721FDC}"/>
+              </a:ext>
+            </a:extLst>
+          </p:cNvPr>
+          <p:cNvCxnSpPr>
+            <a:cxnSpLocks/>
+          </p:cNvCxnSpPr>
+          <p:nvPr/>
+        </p:nvCxnSpPr>
+        <p:spPr>
+          <a:xfrm>
+            <a:off x="4614727" y="3462114"/>
+            <a:ext cx="0" cy="241419"/>
+          </a:xfrm>
+          <a:prstGeom prst="line">
+            <a:avLst/>
+          </a:prstGeom>
+          <a:ln w="19050">
+            <a:solidFill>
+              <a:schemeClr val="tx1"/>
+            </a:solidFill>
+          </a:ln>
+        </p:spPr>
+        <p:style>
+          <a:lnRef idx="1">
+            <a:schemeClr val="accent1"/>
+          </a:lnRef>
+          <a:fillRef idx="0">
+            <a:schemeClr val="accent1"/>
+          </a:fillRef>
+          <a:effectRef idx="0">
+            <a:schemeClr val="accent1"/>
+          </a:effectRef>
+          <a:fontRef idx="minor">
+            <a:schemeClr val="tx1"/>
+          </a:fontRef>
+        </p:style>
+      </p:cxnSp>
+      <p:sp>
+        <p:nvSpPr>
+          <p:cNvPr id="18" name="Textfeld 17">
+            <a:extLst>
+              <a:ext uri="{FF2B5EF4-FFF2-40B4-BE49-F238E27FC236}">
+                <a16:creationId xmlns:a16="http://schemas.microsoft.com/office/drawing/2014/main" id="{1E84328A-5CBD-48AF-9182-C0F1A1D2530A}"/>
+              </a:ext>
+            </a:extLst>
+          </p:cNvPr>
+          <p:cNvSpPr txBox="1"/>
+          <p:nvPr/>
+        </p:nvSpPr>
+        <p:spPr>
+          <a:xfrm>
+            <a:off x="4370109" y="3703533"/>
+            <a:ext cx="372218" cy="369332"/>
+          </a:xfrm>
+          <a:prstGeom prst="rect">
+            <a:avLst/>
+          </a:prstGeom>
+          <a:noFill/>
+        </p:spPr>
+        <p:txBody>
+          <a:bodyPr wrap="none" rtlCol="0">
+            <a:spAutoFit/>
+          </a:bodyPr>
+          <a:lstStyle/>
+          <a:p>
+            <a:r>
+              <a:rPr lang="de-DE" dirty="0"/>
+              <a:t>-6</a:t>
+            </a:r>
+          </a:p>
+        </p:txBody>
+      </p:sp>
+      <p:cxnSp>
+        <p:nvCxnSpPr>
+          <p:cNvPr id="19" name="Gerader Verbinder 18">
+            <a:extLst>
+              <a:ext uri="{FF2B5EF4-FFF2-40B4-BE49-F238E27FC236}">
+                <a16:creationId xmlns:a16="http://schemas.microsoft.com/office/drawing/2014/main" id="{C6533A49-9795-4804-9B55-31A06AD2394C}"/>
+              </a:ext>
+            </a:extLst>
+          </p:cNvPr>
+          <p:cNvCxnSpPr>
+            <a:cxnSpLocks/>
+          </p:cNvCxnSpPr>
+          <p:nvPr/>
+        </p:nvCxnSpPr>
+        <p:spPr>
+          <a:xfrm>
+            <a:off x="5136019" y="3462114"/>
+            <a:ext cx="0" cy="241419"/>
+          </a:xfrm>
+          <a:prstGeom prst="line">
+            <a:avLst/>
+          </a:prstGeom>
+          <a:ln w="19050">
+            <a:solidFill>
+              <a:schemeClr val="tx1"/>
+            </a:solidFill>
+          </a:ln>
+        </p:spPr>
+        <p:style>
+          <a:lnRef idx="1">
+            <a:schemeClr val="accent1"/>
+          </a:lnRef>
+          <a:fillRef idx="0">
+            <a:schemeClr val="accent1"/>
+          </a:fillRef>
+          <a:effectRef idx="0">
+            <a:schemeClr val="accent1"/>
+          </a:effectRef>
+          <a:fontRef idx="minor">
+            <a:schemeClr val="tx1"/>
+          </a:fontRef>
+        </p:style>
+      </p:cxnSp>
+      <p:sp>
+        <p:nvSpPr>
+          <p:cNvPr id="20" name="Textfeld 19">
+            <a:extLst>
+              <a:ext uri="{FF2B5EF4-FFF2-40B4-BE49-F238E27FC236}">
+                <a16:creationId xmlns:a16="http://schemas.microsoft.com/office/drawing/2014/main" id="{0243DAED-6B54-42D4-9F8F-96B54D5C177A}"/>
+              </a:ext>
+            </a:extLst>
+          </p:cNvPr>
+          <p:cNvSpPr txBox="1"/>
+          <p:nvPr/>
+        </p:nvSpPr>
+        <p:spPr>
+          <a:xfrm>
+            <a:off x="4891401" y="3703533"/>
+            <a:ext cx="372218" cy="369332"/>
+          </a:xfrm>
+          <a:prstGeom prst="rect">
+            <a:avLst/>
+          </a:prstGeom>
+          <a:noFill/>
+        </p:spPr>
+        <p:txBody>
+          <a:bodyPr wrap="none" rtlCol="0">
+            <a:spAutoFit/>
+          </a:bodyPr>
+          <a:lstStyle/>
+          <a:p>
+            <a:r>
+              <a:rPr lang="de-DE" dirty="0"/>
+              <a:t>-4</a:t>
+            </a:r>
+          </a:p>
+        </p:txBody>
+      </p:sp>
+      <p:cxnSp>
+        <p:nvCxnSpPr>
+          <p:cNvPr id="21" name="Gerader Verbinder 20">
+            <a:extLst>
+              <a:ext uri="{FF2B5EF4-FFF2-40B4-BE49-F238E27FC236}">
+                <a16:creationId xmlns:a16="http://schemas.microsoft.com/office/drawing/2014/main" id="{E345DB36-3855-4E03-8479-A4FC78C45352}"/>
+              </a:ext>
+            </a:extLst>
+          </p:cNvPr>
+          <p:cNvCxnSpPr>
+            <a:cxnSpLocks/>
+          </p:cNvCxnSpPr>
+          <p:nvPr/>
+        </p:nvCxnSpPr>
+        <p:spPr>
+          <a:xfrm>
+            <a:off x="5657310" y="3462114"/>
+            <a:ext cx="0" cy="241419"/>
+          </a:xfrm>
+          <a:prstGeom prst="line">
+            <a:avLst/>
+          </a:prstGeom>
+          <a:ln w="19050">
+            <a:solidFill>
+              <a:schemeClr val="tx1"/>
+            </a:solidFill>
+          </a:ln>
+        </p:spPr>
+        <p:style>
+          <a:lnRef idx="1">
+            <a:schemeClr val="accent1"/>
+          </a:lnRef>
+          <a:fillRef idx="0">
+            <a:schemeClr val="accent1"/>
+          </a:fillRef>
+          <a:effectRef idx="0">
+            <a:schemeClr val="accent1"/>
+          </a:effectRef>
+          <a:fontRef idx="minor">
+            <a:schemeClr val="tx1"/>
+          </a:fontRef>
+        </p:style>
+      </p:cxnSp>
+      <p:sp>
+        <p:nvSpPr>
+          <p:cNvPr id="22" name="Textfeld 21">
+            <a:extLst>
+              <a:ext uri="{FF2B5EF4-FFF2-40B4-BE49-F238E27FC236}">
+                <a16:creationId xmlns:a16="http://schemas.microsoft.com/office/drawing/2014/main" id="{4772F9F2-2F74-4F54-9AF3-D05AE44E2553}"/>
+              </a:ext>
+            </a:extLst>
+          </p:cNvPr>
+          <p:cNvSpPr txBox="1"/>
+          <p:nvPr/>
+        </p:nvSpPr>
+        <p:spPr>
+          <a:xfrm>
+            <a:off x="5412692" y="3703533"/>
+            <a:ext cx="372218" cy="369332"/>
+          </a:xfrm>
+          <a:prstGeom prst="rect">
+            <a:avLst/>
+          </a:prstGeom>
+          <a:noFill/>
+        </p:spPr>
+        <p:txBody>
+          <a:bodyPr wrap="none" rtlCol="0">
+            <a:spAutoFit/>
+          </a:bodyPr>
+          <a:lstStyle/>
+          <a:p>
+            <a:r>
+              <a:rPr lang="de-DE" dirty="0"/>
+              <a:t>-2</a:t>
+            </a:r>
+          </a:p>
+        </p:txBody>
+      </p:sp>
+      <p:cxnSp>
+        <p:nvCxnSpPr>
+          <p:cNvPr id="23" name="Gerader Verbinder 22">
+            <a:extLst>
+              <a:ext uri="{FF2B5EF4-FFF2-40B4-BE49-F238E27FC236}">
+                <a16:creationId xmlns:a16="http://schemas.microsoft.com/office/drawing/2014/main" id="{8ECDF321-6C63-4C14-A1BC-40F865EE3CE1}"/>
+              </a:ext>
+            </a:extLst>
+          </p:cNvPr>
+          <p:cNvCxnSpPr>
+            <a:cxnSpLocks/>
+          </p:cNvCxnSpPr>
+          <p:nvPr/>
+        </p:nvCxnSpPr>
+        <p:spPr>
+          <a:xfrm>
+            <a:off x="6178601" y="3462114"/>
+            <a:ext cx="0" cy="241419"/>
+          </a:xfrm>
+          <a:prstGeom prst="line">
+            <a:avLst/>
+          </a:prstGeom>
+          <a:ln w="19050">
+            <a:solidFill>
+              <a:schemeClr val="tx1"/>
+            </a:solidFill>
+          </a:ln>
+        </p:spPr>
+        <p:style>
+          <a:lnRef idx="1">
+            <a:schemeClr val="accent1"/>
+          </a:lnRef>
+          <a:fillRef idx="0">
+            <a:schemeClr val="accent1"/>
+          </a:fillRef>
+          <a:effectRef idx="0">
+            <a:schemeClr val="accent1"/>
+          </a:effectRef>
+          <a:fontRef idx="minor">
+            <a:schemeClr val="tx1"/>
+          </a:fontRef>
+        </p:style>
+      </p:cxnSp>
+      <p:sp>
+        <p:nvSpPr>
+          <p:cNvPr id="24" name="Textfeld 23">
+            <a:extLst>
+              <a:ext uri="{FF2B5EF4-FFF2-40B4-BE49-F238E27FC236}">
+                <a16:creationId xmlns:a16="http://schemas.microsoft.com/office/drawing/2014/main" id="{9D42CB0C-5A3A-4111-9FB0-E2814AEB4195}"/>
+              </a:ext>
+            </a:extLst>
+          </p:cNvPr>
+          <p:cNvSpPr txBox="1"/>
+          <p:nvPr/>
+        </p:nvSpPr>
+        <p:spPr>
+          <a:xfrm>
+            <a:off x="5993563" y="3619878"/>
+            <a:ext cx="367408" cy="523220"/>
+          </a:xfrm>
+          <a:prstGeom prst="rect">
+            <a:avLst/>
+          </a:prstGeom>
+          <a:noFill/>
+        </p:spPr>
+        <p:txBody>
+          <a:bodyPr wrap="none" rtlCol="0">
+            <a:spAutoFit/>
+          </a:bodyPr>
+          <a:lstStyle/>
+          <a:p>
+            <a:r>
+              <a:rPr lang="de-DE" sz="2800" dirty="0"/>
+              <a:t>0</a:t>
+            </a:r>
+          </a:p>
+        </p:txBody>
+      </p:sp>
+      <p:cxnSp>
+        <p:nvCxnSpPr>
+          <p:cNvPr id="25" name="Gerader Verbinder 24">
+            <a:extLst>
+              <a:ext uri="{FF2B5EF4-FFF2-40B4-BE49-F238E27FC236}">
+                <a16:creationId xmlns:a16="http://schemas.microsoft.com/office/drawing/2014/main" id="{57CB361C-5E07-4BB2-8D7F-D2DED3F3C21B}"/>
+              </a:ext>
+            </a:extLst>
+          </p:cNvPr>
+          <p:cNvCxnSpPr>
+            <a:cxnSpLocks/>
+          </p:cNvCxnSpPr>
+          <p:nvPr/>
+        </p:nvCxnSpPr>
+        <p:spPr>
+          <a:xfrm>
+            <a:off x="6699892" y="3462114"/>
+            <a:ext cx="0" cy="241419"/>
+          </a:xfrm>
+          <a:prstGeom prst="line">
+            <a:avLst/>
+          </a:prstGeom>
+          <a:ln w="19050">
+            <a:solidFill>
+              <a:schemeClr val="tx1"/>
+            </a:solidFill>
+          </a:ln>
+        </p:spPr>
+        <p:style>
+          <a:lnRef idx="1">
+            <a:schemeClr val="accent1"/>
+          </a:lnRef>
+          <a:fillRef idx="0">
+            <a:schemeClr val="accent1"/>
+          </a:fillRef>
+          <a:effectRef idx="0">
+            <a:schemeClr val="accent1"/>
+          </a:effectRef>
+          <a:fontRef idx="minor">
+            <a:schemeClr val="tx1"/>
+          </a:fontRef>
+        </p:style>
+      </p:cxnSp>
+      <p:sp>
+        <p:nvSpPr>
+          <p:cNvPr id="26" name="Textfeld 25">
+            <a:extLst>
+              <a:ext uri="{FF2B5EF4-FFF2-40B4-BE49-F238E27FC236}">
+                <a16:creationId xmlns:a16="http://schemas.microsoft.com/office/drawing/2014/main" id="{5FEF4E6A-0982-4BFC-B756-EB61D219CFE2}"/>
+              </a:ext>
+            </a:extLst>
+          </p:cNvPr>
+          <p:cNvSpPr txBox="1"/>
+          <p:nvPr/>
+        </p:nvSpPr>
+        <p:spPr>
+          <a:xfrm>
+            <a:off x="6549046" y="3698329"/>
+            <a:ext cx="301686" cy="369332"/>
+          </a:xfrm>
+          <a:prstGeom prst="rect">
+            <a:avLst/>
+          </a:prstGeom>
+          <a:noFill/>
+        </p:spPr>
+        <p:txBody>
+          <a:bodyPr wrap="none" rtlCol="0">
+            <a:spAutoFit/>
+          </a:bodyPr>
+          <a:lstStyle/>
+          <a:p>
+            <a:r>
+              <a:rPr lang="de-DE" dirty="0"/>
+              <a:t>2</a:t>
+            </a:r>
+          </a:p>
+        </p:txBody>
+      </p:sp>
+      <p:cxnSp>
+        <p:nvCxnSpPr>
+          <p:cNvPr id="27" name="Gerader Verbinder 26">
+            <a:extLst>
+              <a:ext uri="{FF2B5EF4-FFF2-40B4-BE49-F238E27FC236}">
+                <a16:creationId xmlns:a16="http://schemas.microsoft.com/office/drawing/2014/main" id="{C904FDE5-0332-4DD1-9428-C7095C65A35F}"/>
+              </a:ext>
+            </a:extLst>
+          </p:cNvPr>
+          <p:cNvCxnSpPr>
+            <a:cxnSpLocks/>
+          </p:cNvCxnSpPr>
+          <p:nvPr/>
+        </p:nvCxnSpPr>
+        <p:spPr>
+          <a:xfrm>
+            <a:off x="7221182" y="3462114"/>
+            <a:ext cx="0" cy="241419"/>
+          </a:xfrm>
+          <a:prstGeom prst="line">
+            <a:avLst/>
+          </a:prstGeom>
+          <a:ln w="19050">
+            <a:solidFill>
+              <a:schemeClr val="tx1"/>
+            </a:solidFill>
+          </a:ln>
+        </p:spPr>
+        <p:style>
+          <a:lnRef idx="1">
+            <a:schemeClr val="accent1"/>
+          </a:lnRef>
+          <a:fillRef idx="0">
+            <a:schemeClr val="accent1"/>
+          </a:fillRef>
+          <a:effectRef idx="0">
+            <a:schemeClr val="accent1"/>
+          </a:effectRef>
+          <a:fontRef idx="minor">
+            <a:schemeClr val="tx1"/>
+          </a:fontRef>
+        </p:style>
+      </p:cxnSp>
+      <p:sp>
+        <p:nvSpPr>
+          <p:cNvPr id="28" name="Textfeld 27">
+            <a:extLst>
+              <a:ext uri="{FF2B5EF4-FFF2-40B4-BE49-F238E27FC236}">
+                <a16:creationId xmlns:a16="http://schemas.microsoft.com/office/drawing/2014/main" id="{0CED7DAF-5B8E-426F-817F-D04AE90AE967}"/>
+              </a:ext>
+            </a:extLst>
+          </p:cNvPr>
+          <p:cNvSpPr txBox="1"/>
+          <p:nvPr/>
+        </p:nvSpPr>
+        <p:spPr>
+          <a:xfrm>
+            <a:off x="7059818" y="3706738"/>
+            <a:ext cx="301686" cy="369332"/>
+          </a:xfrm>
+          <a:prstGeom prst="rect">
+            <a:avLst/>
+          </a:prstGeom>
+          <a:noFill/>
+        </p:spPr>
+        <p:txBody>
+          <a:bodyPr wrap="none" rtlCol="0">
+            <a:spAutoFit/>
+          </a:bodyPr>
+          <a:lstStyle/>
+          <a:p>
+            <a:r>
+              <a:rPr lang="de-DE" dirty="0"/>
+              <a:t>4</a:t>
+            </a:r>
+          </a:p>
+        </p:txBody>
+      </p:sp>
+      <p:cxnSp>
+        <p:nvCxnSpPr>
+          <p:cNvPr id="29" name="Gerader Verbinder 28">
+            <a:extLst>
+              <a:ext uri="{FF2B5EF4-FFF2-40B4-BE49-F238E27FC236}">
+                <a16:creationId xmlns:a16="http://schemas.microsoft.com/office/drawing/2014/main" id="{5E6033E7-1632-418F-BD1F-72E513DEDB36}"/>
+              </a:ext>
+            </a:extLst>
+          </p:cNvPr>
+          <p:cNvCxnSpPr>
+            <a:cxnSpLocks/>
+          </p:cNvCxnSpPr>
+          <p:nvPr/>
+        </p:nvCxnSpPr>
+        <p:spPr>
+          <a:xfrm>
+            <a:off x="7742472" y="3462114"/>
+            <a:ext cx="0" cy="241419"/>
+          </a:xfrm>
+          <a:prstGeom prst="line">
+            <a:avLst/>
+          </a:prstGeom>
+          <a:ln w="19050">
+            <a:solidFill>
+              <a:schemeClr val="tx1"/>
+            </a:solidFill>
+          </a:ln>
+        </p:spPr>
+        <p:style>
+          <a:lnRef idx="1">
+            <a:schemeClr val="accent1"/>
+          </a:lnRef>
+          <a:fillRef idx="0">
+            <a:schemeClr val="accent1"/>
+          </a:fillRef>
+          <a:effectRef idx="0">
+            <a:schemeClr val="accent1"/>
+          </a:effectRef>
+          <a:fontRef idx="minor">
+            <a:schemeClr val="tx1"/>
+          </a:fontRef>
+        </p:style>
+      </p:cxnSp>
+      <p:sp>
+        <p:nvSpPr>
+          <p:cNvPr id="30" name="Textfeld 29">
+            <a:extLst>
+              <a:ext uri="{FF2B5EF4-FFF2-40B4-BE49-F238E27FC236}">
+                <a16:creationId xmlns:a16="http://schemas.microsoft.com/office/drawing/2014/main" id="{4996C665-1585-4F1C-8951-AAA2C0B8F3F5}"/>
+              </a:ext>
+            </a:extLst>
+          </p:cNvPr>
+          <p:cNvSpPr txBox="1"/>
+          <p:nvPr/>
+        </p:nvSpPr>
+        <p:spPr>
+          <a:xfrm>
+            <a:off x="7627859" y="3698055"/>
+            <a:ext cx="301686" cy="369332"/>
+          </a:xfrm>
+          <a:prstGeom prst="rect">
+            <a:avLst/>
+          </a:prstGeom>
+          <a:noFill/>
+        </p:spPr>
+        <p:txBody>
+          <a:bodyPr wrap="none" rtlCol="0">
+            <a:spAutoFit/>
+          </a:bodyPr>
+          <a:lstStyle/>
+          <a:p>
+            <a:r>
+              <a:rPr lang="de-DE" dirty="0"/>
+              <a:t>6</a:t>
+            </a:r>
+          </a:p>
+        </p:txBody>
+      </p:sp>
+      <p:cxnSp>
+        <p:nvCxnSpPr>
+          <p:cNvPr id="31" name="Gerader Verbinder 30">
+            <a:extLst>
+              <a:ext uri="{FF2B5EF4-FFF2-40B4-BE49-F238E27FC236}">
+                <a16:creationId xmlns:a16="http://schemas.microsoft.com/office/drawing/2014/main" id="{5C34B414-2795-43A0-A404-C35347CAC28B}"/>
+              </a:ext>
+            </a:extLst>
+          </p:cNvPr>
+          <p:cNvCxnSpPr>
+            <a:cxnSpLocks/>
+          </p:cNvCxnSpPr>
+          <p:nvPr/>
+        </p:nvCxnSpPr>
+        <p:spPr>
+          <a:xfrm>
+            <a:off x="8263761" y="3462114"/>
+            <a:ext cx="0" cy="241419"/>
+          </a:xfrm>
+          <a:prstGeom prst="line">
+            <a:avLst/>
+          </a:prstGeom>
+          <a:ln w="19050">
+            <a:solidFill>
+              <a:schemeClr val="tx1"/>
+            </a:solidFill>
+          </a:ln>
+        </p:spPr>
+        <p:style>
+          <a:lnRef idx="1">
+            <a:schemeClr val="accent1"/>
+          </a:lnRef>
+          <a:fillRef idx="0">
+            <a:schemeClr val="accent1"/>
+          </a:fillRef>
+          <a:effectRef idx="0">
+            <a:schemeClr val="accent1"/>
+          </a:effectRef>
+          <a:fontRef idx="minor">
+            <a:schemeClr val="tx1"/>
+          </a:fontRef>
+        </p:style>
+      </p:cxnSp>
+      <p:sp>
+        <p:nvSpPr>
+          <p:cNvPr id="32" name="Textfeld 31">
+            <a:extLst>
+              <a:ext uri="{FF2B5EF4-FFF2-40B4-BE49-F238E27FC236}">
+                <a16:creationId xmlns:a16="http://schemas.microsoft.com/office/drawing/2014/main" id="{61071AB3-E7DA-4F5F-AE6D-A3B9EAC8D22C}"/>
+              </a:ext>
+            </a:extLst>
+          </p:cNvPr>
+          <p:cNvSpPr txBox="1"/>
+          <p:nvPr/>
+        </p:nvSpPr>
+        <p:spPr>
+          <a:xfrm>
+            <a:off x="8103692" y="3704463"/>
+            <a:ext cx="301686" cy="369332"/>
+          </a:xfrm>
+          <a:prstGeom prst="rect">
+            <a:avLst/>
+          </a:prstGeom>
+          <a:noFill/>
+        </p:spPr>
+        <p:txBody>
+          <a:bodyPr wrap="none" rtlCol="0">
+            <a:spAutoFit/>
+          </a:bodyPr>
+          <a:lstStyle/>
+          <a:p>
+            <a:r>
+              <a:rPr lang="de-DE" dirty="0"/>
+              <a:t>8</a:t>
+            </a:r>
+          </a:p>
+        </p:txBody>
+      </p:sp>
+      <p:cxnSp>
+        <p:nvCxnSpPr>
+          <p:cNvPr id="33" name="Gerader Verbinder 32">
+            <a:extLst>
+              <a:ext uri="{FF2B5EF4-FFF2-40B4-BE49-F238E27FC236}">
+                <a16:creationId xmlns:a16="http://schemas.microsoft.com/office/drawing/2014/main" id="{CFB73687-D8C4-4731-AA25-63A0C9BDEC48}"/>
+              </a:ext>
+            </a:extLst>
+          </p:cNvPr>
+          <p:cNvCxnSpPr>
+            <a:cxnSpLocks/>
+          </p:cNvCxnSpPr>
+          <p:nvPr/>
+        </p:nvCxnSpPr>
+        <p:spPr>
+          <a:xfrm>
+            <a:off x="8779692" y="3462114"/>
+            <a:ext cx="0" cy="241419"/>
+          </a:xfrm>
+          <a:prstGeom prst="line">
+            <a:avLst/>
+          </a:prstGeom>
+          <a:ln w="19050">
+            <a:solidFill>
+              <a:schemeClr val="tx1"/>
+            </a:solidFill>
+          </a:ln>
+        </p:spPr>
+        <p:style>
+          <a:lnRef idx="1">
+            <a:schemeClr val="accent1"/>
+          </a:lnRef>
+          <a:fillRef idx="0">
+            <a:schemeClr val="accent1"/>
+          </a:fillRef>
+          <a:effectRef idx="0">
+            <a:schemeClr val="accent1"/>
+          </a:effectRef>
+          <a:fontRef idx="minor">
+            <a:schemeClr val="tx1"/>
+          </a:fontRef>
+        </p:style>
+      </p:cxnSp>
+      <p:sp>
+        <p:nvSpPr>
+          <p:cNvPr id="34" name="Textfeld 33">
+            <a:extLst>
+              <a:ext uri="{FF2B5EF4-FFF2-40B4-BE49-F238E27FC236}">
+                <a16:creationId xmlns:a16="http://schemas.microsoft.com/office/drawing/2014/main" id="{E264B5F4-9CD4-41D3-ACF2-784012E2A0AF}"/>
+              </a:ext>
+            </a:extLst>
+          </p:cNvPr>
+          <p:cNvSpPr txBox="1"/>
+          <p:nvPr/>
+        </p:nvSpPr>
+        <p:spPr>
+          <a:xfrm>
+            <a:off x="8578327" y="3697644"/>
+            <a:ext cx="418704" cy="369332"/>
+          </a:xfrm>
+          <a:prstGeom prst="rect">
+            <a:avLst/>
+          </a:prstGeom>
+          <a:noFill/>
+        </p:spPr>
+        <p:txBody>
+          <a:bodyPr wrap="none" rtlCol="0">
+            <a:spAutoFit/>
+          </a:bodyPr>
+          <a:lstStyle/>
+          <a:p>
+            <a:r>
+              <a:rPr lang="de-DE" dirty="0"/>
+              <a:t>10</a:t>
+            </a:r>
+          </a:p>
+        </p:txBody>
+      </p:sp>
+      <p:cxnSp>
+        <p:nvCxnSpPr>
+          <p:cNvPr id="35" name="Gerader Verbinder 34">
+            <a:extLst>
+              <a:ext uri="{FF2B5EF4-FFF2-40B4-BE49-F238E27FC236}">
+                <a16:creationId xmlns:a16="http://schemas.microsoft.com/office/drawing/2014/main" id="{F74DC8C8-AD78-42EB-B6E8-26881A4C5262}"/>
+              </a:ext>
+            </a:extLst>
+          </p:cNvPr>
+          <p:cNvCxnSpPr>
+            <a:cxnSpLocks/>
+          </p:cNvCxnSpPr>
+          <p:nvPr/>
+        </p:nvCxnSpPr>
+        <p:spPr>
+          <a:xfrm>
+            <a:off x="9295623" y="3462114"/>
+            <a:ext cx="0" cy="241419"/>
+          </a:xfrm>
+          <a:prstGeom prst="line">
+            <a:avLst/>
+          </a:prstGeom>
+          <a:ln w="19050">
+            <a:solidFill>
+              <a:schemeClr val="tx1"/>
+            </a:solidFill>
+          </a:ln>
+        </p:spPr>
+        <p:style>
+          <a:lnRef idx="1">
+            <a:schemeClr val="accent1"/>
+          </a:lnRef>
+          <a:fillRef idx="0">
+            <a:schemeClr val="accent1"/>
+          </a:fillRef>
+          <a:effectRef idx="0">
+            <a:schemeClr val="accent1"/>
+          </a:effectRef>
+          <a:fontRef idx="minor">
+            <a:schemeClr val="tx1"/>
+          </a:fontRef>
+        </p:style>
+      </p:cxnSp>
+      <p:sp>
+        <p:nvSpPr>
+          <p:cNvPr id="36" name="Textfeld 35">
+            <a:extLst>
+              <a:ext uri="{FF2B5EF4-FFF2-40B4-BE49-F238E27FC236}">
+                <a16:creationId xmlns:a16="http://schemas.microsoft.com/office/drawing/2014/main" id="{8F8C83E5-D19B-4CED-AAA8-32ACB71C0844}"/>
+              </a:ext>
+            </a:extLst>
+          </p:cNvPr>
+          <p:cNvSpPr txBox="1"/>
+          <p:nvPr/>
+        </p:nvSpPr>
+        <p:spPr>
+          <a:xfrm>
+            <a:off x="9094255" y="3696822"/>
+            <a:ext cx="418704" cy="369332"/>
+          </a:xfrm>
+          <a:prstGeom prst="rect">
+            <a:avLst/>
+          </a:prstGeom>
+          <a:noFill/>
+        </p:spPr>
+        <p:txBody>
+          <a:bodyPr wrap="none" rtlCol="0">
+            <a:spAutoFit/>
+          </a:bodyPr>
+          <a:lstStyle/>
+          <a:p>
+            <a:r>
+              <a:rPr lang="de-DE" dirty="0"/>
+              <a:t>12</a:t>
+            </a:r>
+          </a:p>
+        </p:txBody>
+      </p:sp>
+      <p:sp>
+        <p:nvSpPr>
+          <p:cNvPr id="53" name="Geschweifte Klammer links 52">
+            <a:extLst>
+              <a:ext uri="{FF2B5EF4-FFF2-40B4-BE49-F238E27FC236}">
+                <a16:creationId xmlns:a16="http://schemas.microsoft.com/office/drawing/2014/main" id="{E7D0473B-7C7D-47BD-9E51-92219D004A3C}"/>
+              </a:ext>
+            </a:extLst>
+          </p:cNvPr>
+          <p:cNvSpPr/>
+          <p:nvPr/>
+        </p:nvSpPr>
+        <p:spPr>
+          <a:xfrm rot="5400000">
+            <a:off x="4455618" y="823676"/>
+            <a:ext cx="284027" cy="2153534"/>
+          </a:xfrm>
+          <a:prstGeom prst="leftBrace">
+            <a:avLst/>
+          </a:prstGeom>
+          <a:noFill/>
+          <a:ln w="28575">
+            <a:solidFill>
+              <a:schemeClr val="accent6"/>
+            </a:solidFill>
+          </a:ln>
+        </p:spPr>
+        <p:style>
+          <a:lnRef idx="1">
+            <a:schemeClr val="accent1"/>
+          </a:lnRef>
+          <a:fillRef idx="0">
+            <a:schemeClr val="accent1"/>
+          </a:fillRef>
+          <a:effectRef idx="0">
+            <a:schemeClr val="accent1"/>
+          </a:effectRef>
+          <a:fontRef idx="minor">
+            <a:schemeClr val="tx1"/>
+          </a:fontRef>
+        </p:style>
+        <p:txBody>
+          <a:bodyPr rtlCol="0" anchor="ctr"/>
+          <a:lstStyle/>
+          <a:p>
+            <a:pPr algn="ctr"/>
+            <a:endParaRPr lang="de-DE"/>
+          </a:p>
+        </p:txBody>
+      </p:sp>
+      <p:sp>
+        <p:nvSpPr>
+          <p:cNvPr id="54" name="Geschweifte Klammer links 53">
+            <a:extLst>
+              <a:ext uri="{FF2B5EF4-FFF2-40B4-BE49-F238E27FC236}">
+                <a16:creationId xmlns:a16="http://schemas.microsoft.com/office/drawing/2014/main" id="{810A42CF-8CCC-4BAA-802C-63FE97B636CA}"/>
+              </a:ext>
+            </a:extLst>
+          </p:cNvPr>
+          <p:cNvSpPr/>
+          <p:nvPr/>
+        </p:nvSpPr>
+        <p:spPr>
+          <a:xfrm rot="5400000">
+            <a:off x="6078187" y="905218"/>
+            <a:ext cx="284027" cy="4370341"/>
+          </a:xfrm>
+          <a:prstGeom prst="leftBrace">
+            <a:avLst/>
+          </a:prstGeom>
+          <a:noFill/>
+          <a:ln w="28575">
+            <a:solidFill>
+              <a:srgbClr val="C00000"/>
+            </a:solidFill>
+          </a:ln>
+        </p:spPr>
+        <p:style>
+          <a:lnRef idx="1">
+            <a:schemeClr val="accent1"/>
+          </a:lnRef>
+          <a:fillRef idx="0">
+            <a:schemeClr val="accent1"/>
+          </a:fillRef>
+          <a:effectRef idx="0">
+            <a:schemeClr val="accent1"/>
+          </a:effectRef>
+          <a:fontRef idx="minor">
+            <a:schemeClr val="tx1"/>
+          </a:fontRef>
+        </p:style>
+        <p:txBody>
+          <a:bodyPr rtlCol="0" anchor="ctr"/>
+          <a:lstStyle/>
+          <a:p>
+            <a:pPr algn="ctr"/>
+            <a:endParaRPr lang="de-DE"/>
+          </a:p>
+        </p:txBody>
+      </p:sp>
+      <p:cxnSp>
+        <p:nvCxnSpPr>
+          <p:cNvPr id="56" name="Gerader Verbinder 55">
+            <a:extLst>
+              <a:ext uri="{FF2B5EF4-FFF2-40B4-BE49-F238E27FC236}">
+                <a16:creationId xmlns:a16="http://schemas.microsoft.com/office/drawing/2014/main" id="{84BCEBC4-A8BB-4C04-BF5D-093EC4F3B5F2}"/>
+              </a:ext>
+            </a:extLst>
+          </p:cNvPr>
+          <p:cNvCxnSpPr/>
+          <p:nvPr/>
+        </p:nvCxnSpPr>
+        <p:spPr>
+          <a:xfrm flipV="1">
+            <a:off x="3520864" y="1183728"/>
+            <a:ext cx="0" cy="4546363"/>
+          </a:xfrm>
+          <a:prstGeom prst="line">
+            <a:avLst/>
+          </a:prstGeom>
+          <a:ln w="28575">
+            <a:solidFill>
+              <a:schemeClr val="tx1">
+                <a:lumMod val="65000"/>
+                <a:lumOff val="35000"/>
+              </a:schemeClr>
+            </a:solidFill>
+          </a:ln>
+        </p:spPr>
+        <p:style>
+          <a:lnRef idx="1">
+            <a:schemeClr val="accent1"/>
+          </a:lnRef>
+          <a:fillRef idx="0">
+            <a:schemeClr val="accent1"/>
+          </a:fillRef>
+          <a:effectRef idx="0">
+            <a:schemeClr val="accent1"/>
+          </a:effectRef>
+          <a:fontRef idx="minor">
+            <a:schemeClr val="tx1"/>
+          </a:fontRef>
+        </p:style>
+      </p:cxnSp>
+      <p:sp>
+        <p:nvSpPr>
+          <p:cNvPr id="57" name="Textfeld 56">
+            <a:extLst>
+              <a:ext uri="{FF2B5EF4-FFF2-40B4-BE49-F238E27FC236}">
+                <a16:creationId xmlns:a16="http://schemas.microsoft.com/office/drawing/2014/main" id="{3A4AA01C-C171-4E42-8D74-76822AC95FF5}"/>
+              </a:ext>
+            </a:extLst>
+          </p:cNvPr>
+          <p:cNvSpPr txBox="1"/>
+          <p:nvPr/>
+        </p:nvSpPr>
+        <p:spPr>
+          <a:xfrm>
+            <a:off x="2967651" y="5775136"/>
+            <a:ext cx="1253384" cy="369332"/>
+          </a:xfrm>
+          <a:prstGeom prst="rect">
+            <a:avLst/>
+          </a:prstGeom>
+          <a:noFill/>
+        </p:spPr>
+        <p:txBody>
+          <a:bodyPr wrap="square" rtlCol="0">
+            <a:spAutoFit/>
+          </a:bodyPr>
+          <a:lstStyle/>
+          <a:p>
+            <a:r>
+              <a:rPr lang="de-DE" dirty="0"/>
+              <a:t>min_score</a:t>
+            </a:r>
+          </a:p>
+        </p:txBody>
+      </p:sp>
+      <p:sp>
+        <p:nvSpPr>
+          <p:cNvPr id="58" name="Textfeld 57">
+            <a:extLst>
+              <a:ext uri="{FF2B5EF4-FFF2-40B4-BE49-F238E27FC236}">
+                <a16:creationId xmlns:a16="http://schemas.microsoft.com/office/drawing/2014/main" id="{D104A0AE-BFD3-44BA-AEDB-630B4893CB76}"/>
+              </a:ext>
+            </a:extLst>
+          </p:cNvPr>
+          <p:cNvSpPr txBox="1"/>
+          <p:nvPr/>
+        </p:nvSpPr>
+        <p:spPr>
+          <a:xfrm>
+            <a:off x="7929545" y="5783998"/>
+            <a:ext cx="1253384" cy="369332"/>
+          </a:xfrm>
+          <a:prstGeom prst="rect">
+            <a:avLst/>
+          </a:prstGeom>
+          <a:noFill/>
+        </p:spPr>
+        <p:txBody>
+          <a:bodyPr wrap="square" rtlCol="0">
+            <a:spAutoFit/>
+          </a:bodyPr>
+          <a:lstStyle/>
+          <a:p>
+            <a:r>
+              <a:rPr lang="de-DE" dirty="0"/>
+              <a:t>max_score</a:t>
+            </a:r>
+          </a:p>
+        </p:txBody>
+      </p:sp>
+      <p:cxnSp>
+        <p:nvCxnSpPr>
+          <p:cNvPr id="59" name="Gerader Verbinder 58">
+            <a:extLst>
+              <a:ext uri="{FF2B5EF4-FFF2-40B4-BE49-F238E27FC236}">
+                <a16:creationId xmlns:a16="http://schemas.microsoft.com/office/drawing/2014/main" id="{74114C73-180A-4F17-9F02-C575B2AB4078}"/>
+              </a:ext>
+            </a:extLst>
+          </p:cNvPr>
+          <p:cNvCxnSpPr/>
+          <p:nvPr/>
+        </p:nvCxnSpPr>
+        <p:spPr>
+          <a:xfrm flipV="1">
+            <a:off x="8438968" y="1269802"/>
+            <a:ext cx="0" cy="4546363"/>
+          </a:xfrm>
+          <a:prstGeom prst="line">
+            <a:avLst/>
+          </a:prstGeom>
+          <a:ln w="28575">
+            <a:solidFill>
+              <a:schemeClr val="tx1">
+                <a:lumMod val="65000"/>
+                <a:lumOff val="35000"/>
+              </a:schemeClr>
+            </a:solidFill>
+          </a:ln>
+        </p:spPr>
+        <p:style>
+          <a:lnRef idx="1">
+            <a:schemeClr val="accent1"/>
+          </a:lnRef>
+          <a:fillRef idx="0">
+            <a:schemeClr val="accent1"/>
+          </a:fillRef>
+          <a:effectRef idx="0">
+            <a:schemeClr val="accent1"/>
+          </a:effectRef>
+          <a:fontRef idx="minor">
+            <a:schemeClr val="tx1"/>
+          </a:fontRef>
+        </p:style>
+      </p:cxnSp>
+      <p:cxnSp>
+        <p:nvCxnSpPr>
+          <p:cNvPr id="60" name="Gerader Verbinder 59">
+            <a:extLst>
+              <a:ext uri="{FF2B5EF4-FFF2-40B4-BE49-F238E27FC236}">
+                <a16:creationId xmlns:a16="http://schemas.microsoft.com/office/drawing/2014/main" id="{AB643EA7-3380-4F61-9CE1-0823E3991EDA}"/>
+              </a:ext>
+            </a:extLst>
+          </p:cNvPr>
+          <p:cNvCxnSpPr/>
+          <p:nvPr/>
+        </p:nvCxnSpPr>
+        <p:spPr>
+          <a:xfrm flipV="1">
+            <a:off x="5916534" y="1097201"/>
+            <a:ext cx="0" cy="4546363"/>
+          </a:xfrm>
+          <a:prstGeom prst="line">
+            <a:avLst/>
+          </a:prstGeom>
+          <a:ln w="28575">
+            <a:solidFill>
+              <a:schemeClr val="tx1">
+                <a:lumMod val="65000"/>
+                <a:lumOff val="35000"/>
+              </a:schemeClr>
+            </a:solidFill>
+            <a:prstDash val="sysDash"/>
+          </a:ln>
+        </p:spPr>
+        <p:style>
+          <a:lnRef idx="1">
+            <a:schemeClr val="accent1"/>
+          </a:lnRef>
+          <a:fillRef idx="0">
+            <a:schemeClr val="accent1"/>
+          </a:fillRef>
+          <a:effectRef idx="0">
+            <a:schemeClr val="accent1"/>
+          </a:effectRef>
+          <a:fontRef idx="minor">
+            <a:schemeClr val="tx1"/>
+          </a:fontRef>
+        </p:style>
+      </p:cxnSp>
+      <p:sp>
+        <p:nvSpPr>
+          <p:cNvPr id="61" name="Textfeld 60">
+            <a:extLst>
+              <a:ext uri="{FF2B5EF4-FFF2-40B4-BE49-F238E27FC236}">
+                <a16:creationId xmlns:a16="http://schemas.microsoft.com/office/drawing/2014/main" id="{BAC26B20-CD9A-4B64-B63C-1EA6B80B27D8}"/>
+              </a:ext>
+            </a:extLst>
+          </p:cNvPr>
+          <p:cNvSpPr txBox="1"/>
+          <p:nvPr/>
+        </p:nvSpPr>
+        <p:spPr>
+          <a:xfrm>
+            <a:off x="4953160" y="5624653"/>
+            <a:ext cx="2446810" cy="369332"/>
+          </a:xfrm>
+          <a:prstGeom prst="rect">
+            <a:avLst/>
+          </a:prstGeom>
+          <a:noFill/>
+        </p:spPr>
+        <p:txBody>
+          <a:bodyPr wrap="square" rtlCol="0">
+            <a:spAutoFit/>
+          </a:bodyPr>
+          <a:lstStyle/>
+          <a:p>
+            <a:r>
+              <a:rPr lang="de-DE" dirty="0"/>
+              <a:t>P(y = negative) = 0.5</a:t>
+            </a:r>
+          </a:p>
+        </p:txBody>
+      </p:sp>
+      <p:sp>
+        <p:nvSpPr>
+          <p:cNvPr id="62" name="Textfeld 61">
+            <a:extLst>
+              <a:ext uri="{FF2B5EF4-FFF2-40B4-BE49-F238E27FC236}">
+                <a16:creationId xmlns:a16="http://schemas.microsoft.com/office/drawing/2014/main" id="{09FB7557-25C2-423E-B721-EBEE0BDD0E8E}"/>
+              </a:ext>
+            </a:extLst>
+          </p:cNvPr>
+          <p:cNvSpPr txBox="1"/>
+          <p:nvPr/>
+        </p:nvSpPr>
+        <p:spPr>
+          <a:xfrm>
+            <a:off x="7636054" y="6016831"/>
+            <a:ext cx="2446810" cy="369332"/>
+          </a:xfrm>
+          <a:prstGeom prst="rect">
+            <a:avLst/>
+          </a:prstGeom>
+          <a:noFill/>
+        </p:spPr>
+        <p:txBody>
+          <a:bodyPr wrap="square" rtlCol="0">
+            <a:spAutoFit/>
+          </a:bodyPr>
+          <a:lstStyle/>
+          <a:p>
+            <a:r>
+              <a:rPr lang="de-DE" dirty="0"/>
+              <a:t>P(y = negative) = 1</a:t>
+            </a:r>
+          </a:p>
+        </p:txBody>
+      </p:sp>
+      <p:sp>
+        <p:nvSpPr>
+          <p:cNvPr id="63" name="Textfeld 62">
+            <a:extLst>
+              <a:ext uri="{FF2B5EF4-FFF2-40B4-BE49-F238E27FC236}">
+                <a16:creationId xmlns:a16="http://schemas.microsoft.com/office/drawing/2014/main" id="{1B5BEDCC-B764-419C-9FC5-044EE0A4B917}"/>
+              </a:ext>
+            </a:extLst>
+          </p:cNvPr>
+          <p:cNvSpPr txBox="1"/>
+          <p:nvPr/>
+        </p:nvSpPr>
+        <p:spPr>
+          <a:xfrm>
+            <a:off x="2689209" y="6050635"/>
+            <a:ext cx="2446810" cy="369332"/>
+          </a:xfrm>
+          <a:prstGeom prst="rect">
+            <a:avLst/>
+          </a:prstGeom>
+          <a:noFill/>
+        </p:spPr>
+        <p:txBody>
+          <a:bodyPr wrap="square" rtlCol="0">
+            <a:spAutoFit/>
+          </a:bodyPr>
+          <a:lstStyle/>
+          <a:p>
+            <a:r>
+              <a:rPr lang="de-DE" dirty="0"/>
+              <a:t>P(y = negative) = 0</a:t>
+            </a:r>
+          </a:p>
+        </p:txBody>
+      </p:sp>
+      <p:sp>
+        <p:nvSpPr>
+          <p:cNvPr id="64" name="Textfeld 63">
+            <a:extLst>
+              <a:ext uri="{FF2B5EF4-FFF2-40B4-BE49-F238E27FC236}">
+                <a16:creationId xmlns:a16="http://schemas.microsoft.com/office/drawing/2014/main" id="{E743B758-9649-469C-A7FB-B1E1D04358B5}"/>
+              </a:ext>
+            </a:extLst>
+          </p:cNvPr>
+          <p:cNvSpPr txBox="1"/>
+          <p:nvPr/>
+        </p:nvSpPr>
+        <p:spPr>
+          <a:xfrm>
+            <a:off x="4077891" y="1420286"/>
+            <a:ext cx="1138473" cy="369332"/>
+          </a:xfrm>
+          <a:prstGeom prst="rect">
+            <a:avLst/>
+          </a:prstGeom>
+          <a:noFill/>
+        </p:spPr>
+        <p:txBody>
+          <a:bodyPr wrap="square" rtlCol="0">
+            <a:spAutoFit/>
+          </a:bodyPr>
+          <a:lstStyle/>
+          <a:p>
+            <a:r>
+              <a:rPr lang="de-DE" dirty="0">
+                <a:solidFill>
+                  <a:schemeClr val="accent6">
+                    <a:lumMod val="75000"/>
+                  </a:schemeClr>
+                </a:solidFill>
+              </a:rPr>
+              <a:t>positives</a:t>
+            </a:r>
+          </a:p>
+        </p:txBody>
+      </p:sp>
+      <p:sp>
+        <p:nvSpPr>
+          <p:cNvPr id="65" name="Textfeld 64">
+            <a:extLst>
+              <a:ext uri="{FF2B5EF4-FFF2-40B4-BE49-F238E27FC236}">
+                <a16:creationId xmlns:a16="http://schemas.microsoft.com/office/drawing/2014/main" id="{6685FBF5-16C3-4B2F-BD4A-9B81A6624B44}"/>
+              </a:ext>
+            </a:extLst>
+          </p:cNvPr>
+          <p:cNvSpPr txBox="1"/>
+          <p:nvPr/>
+        </p:nvSpPr>
+        <p:spPr>
+          <a:xfrm>
+            <a:off x="5861721" y="2588220"/>
+            <a:ext cx="1138473" cy="369332"/>
+          </a:xfrm>
+          <a:prstGeom prst="rect">
+            <a:avLst/>
+          </a:prstGeom>
+          <a:noFill/>
+        </p:spPr>
+        <p:txBody>
+          <a:bodyPr wrap="square" rtlCol="0">
+            <a:spAutoFit/>
+          </a:bodyPr>
+          <a:lstStyle/>
+          <a:p>
+            <a:r>
+              <a:rPr lang="de-DE" dirty="0">
+                <a:solidFill>
+                  <a:srgbClr val="C00000"/>
+                </a:solidFill>
+              </a:rPr>
+              <a:t>negatives</a:t>
+            </a:r>
+          </a:p>
+        </p:txBody>
+      </p:sp>
+      <p:sp>
+        <p:nvSpPr>
+          <p:cNvPr id="40" name="Textfeld 39">
+            <a:extLst>
+              <a:ext uri="{FF2B5EF4-FFF2-40B4-BE49-F238E27FC236}">
+                <a16:creationId xmlns:a16="http://schemas.microsoft.com/office/drawing/2014/main" id="{56D228F6-127D-4ECB-A525-FC4AE0916C3A}"/>
+              </a:ext>
+            </a:extLst>
+          </p:cNvPr>
+          <p:cNvSpPr txBox="1"/>
+          <p:nvPr/>
+        </p:nvSpPr>
+        <p:spPr>
+          <a:xfrm>
+            <a:off x="2817971" y="3703533"/>
+            <a:ext cx="489236" cy="369332"/>
+          </a:xfrm>
+          <a:prstGeom prst="rect">
+            <a:avLst/>
+          </a:prstGeom>
+          <a:noFill/>
+        </p:spPr>
+        <p:txBody>
+          <a:bodyPr wrap="none" rtlCol="0">
+            <a:spAutoFit/>
+          </a:bodyPr>
+          <a:lstStyle/>
+          <a:p>
+            <a:r>
+              <a:rPr lang="de-DE" dirty="0"/>
+              <a:t>-12</a:t>
+            </a:r>
+          </a:p>
+        </p:txBody>
+      </p:sp>
+      <p:cxnSp>
+        <p:nvCxnSpPr>
+          <p:cNvPr id="41" name="Gerader Verbinder 40">
+            <a:extLst>
+              <a:ext uri="{FF2B5EF4-FFF2-40B4-BE49-F238E27FC236}">
+                <a16:creationId xmlns:a16="http://schemas.microsoft.com/office/drawing/2014/main" id="{0A51AD6A-7B1D-4D9E-8DC1-64CB8BEADD04}"/>
+              </a:ext>
+            </a:extLst>
+          </p:cNvPr>
+          <p:cNvCxnSpPr>
+            <a:cxnSpLocks/>
+          </p:cNvCxnSpPr>
+          <p:nvPr/>
+        </p:nvCxnSpPr>
+        <p:spPr>
+          <a:xfrm>
+            <a:off x="3058092" y="3467254"/>
+            <a:ext cx="0" cy="241419"/>
+          </a:xfrm>
+          <a:prstGeom prst="line">
+            <a:avLst/>
+          </a:prstGeom>
+          <a:ln w="19050">
+            <a:solidFill>
+              <a:schemeClr val="tx1"/>
+            </a:solidFill>
+          </a:ln>
+        </p:spPr>
+        <p:style>
+          <a:lnRef idx="1">
+            <a:schemeClr val="accent1"/>
+          </a:lnRef>
+          <a:fillRef idx="0">
+            <a:schemeClr val="accent1"/>
+          </a:fillRef>
+          <a:effectRef idx="0">
+            <a:schemeClr val="accent1"/>
+          </a:effectRef>
+          <a:fontRef idx="minor">
+            <a:schemeClr val="tx1"/>
+          </a:fontRef>
+        </p:style>
+      </p:cxnSp>
     </p:spTree>
     <p:extLst>
       <p:ext uri="{BB962C8B-B14F-4D97-AF65-F5344CB8AC3E}">
-        <p14:creationId xmlns:p14="http://schemas.microsoft.com/office/powerpoint/2010/main" val="357497857"/>
+        <p14:creationId xmlns:p14="http://schemas.microsoft.com/office/powerpoint/2010/main" val="3162949285"/>
       </p:ext>
     </p:extLst>
   </p:cSld>
@@ -7146,100 +9230,258 @@
           <a:chExt cx="0" cy="0"/>
         </a:xfrm>
       </p:grpSpPr>
-      <p:cxnSp>
-        <p:nvCxnSpPr>
-          <p:cNvPr id="3" name="Gerade Verbindung mit Pfeil 2">
-            <a:extLst>
-              <a:ext uri="{FF2B5EF4-FFF2-40B4-BE49-F238E27FC236}">
-                <a16:creationId xmlns:a16="http://schemas.microsoft.com/office/drawing/2014/main" id="{6FC20D49-B8C4-4820-83D1-6EBC70C1A0BB}"/>
-              </a:ext>
-            </a:extLst>
-          </p:cNvPr>
-          <p:cNvCxnSpPr>
-            <a:cxnSpLocks/>
-          </p:cNvCxnSpPr>
-          <p:nvPr/>
-        </p:nvCxnSpPr>
-        <p:spPr>
-          <a:xfrm>
-            <a:off x="2781300" y="3582824"/>
-            <a:ext cx="6731659" cy="0"/>
-          </a:xfrm>
-          <a:prstGeom prst="straightConnector1">
-            <a:avLst/>
-          </a:prstGeom>
-          <a:ln w="19050">
-            <a:solidFill>
-              <a:schemeClr val="tx1"/>
-            </a:solidFill>
-            <a:headEnd type="triangle"/>
-            <a:tailEnd type="triangle"/>
+      <p:pic>
+        <p:nvPicPr>
+          <p:cNvPr id="4" name="Grafik 3">
+            <a:extLst>
+              <a:ext uri="{FF2B5EF4-FFF2-40B4-BE49-F238E27FC236}">
+                <a16:creationId xmlns:a16="http://schemas.microsoft.com/office/drawing/2014/main" id="{7BDD63E6-8771-410B-8D20-131A76CB0B6E}"/>
+              </a:ext>
+            </a:extLst>
+          </p:cNvPr>
+          <p:cNvPicPr>
+            <a:picLocks noChangeAspect="1"/>
+          </p:cNvPicPr>
+          <p:nvPr/>
+        </p:nvPicPr>
+        <p:blipFill>
+          <a:blip r:embed="rId2"/>
+          <a:stretch>
+            <a:fillRect/>
+          </a:stretch>
+        </p:blipFill>
+        <p:spPr>
+          <a:xfrm>
+            <a:off x="1293091" y="904465"/>
+            <a:ext cx="5668961" cy="5634447"/>
+          </a:xfrm>
+          <a:prstGeom prst="rect">
+            <a:avLst/>
+          </a:prstGeom>
+        </p:spPr>
+      </p:pic>
+      <p:sp>
+        <p:nvSpPr>
+          <p:cNvPr id="5" name="Rechteck 4">
+            <a:extLst>
+              <a:ext uri="{FF2B5EF4-FFF2-40B4-BE49-F238E27FC236}">
+                <a16:creationId xmlns:a16="http://schemas.microsoft.com/office/drawing/2014/main" id="{4E165C4D-DCBE-4ADB-A7DA-6C72BE52A55D}"/>
+              </a:ext>
+            </a:extLst>
+          </p:cNvPr>
+          <p:cNvSpPr/>
+          <p:nvPr/>
+        </p:nvSpPr>
+        <p:spPr>
+          <a:xfrm>
+            <a:off x="5500307" y="1840433"/>
+            <a:ext cx="845075" cy="173093"/>
+          </a:xfrm>
+          <a:prstGeom prst="rect">
+            <a:avLst/>
+          </a:prstGeom>
+          <a:solidFill>
+            <a:srgbClr val="FFFF00">
+              <a:alpha val="50000"/>
+            </a:srgbClr>
+          </a:solidFill>
+          <a:ln>
+            <a:noFill/>
           </a:ln>
         </p:spPr>
         <p:style>
-          <a:lnRef idx="1">
-            <a:schemeClr val="accent1"/>
+          <a:lnRef idx="2">
+            <a:schemeClr val="accent1">
+              <a:shade val="50000"/>
+            </a:schemeClr>
           </a:lnRef>
-          <a:fillRef idx="0">
+          <a:fillRef idx="1">
             <a:schemeClr val="accent1"/>
           </a:fillRef>
           <a:effectRef idx="0">
             <a:schemeClr val="accent1"/>
           </a:effectRef>
           <a:fontRef idx="minor">
-            <a:schemeClr val="tx1"/>
+            <a:schemeClr val="lt1"/>
           </a:fontRef>
         </p:style>
-      </p:cxnSp>
-      <p:cxnSp>
-        <p:nvCxnSpPr>
-          <p:cNvPr id="7" name="Gerader Verbinder 6">
-            <a:extLst>
-              <a:ext uri="{FF2B5EF4-FFF2-40B4-BE49-F238E27FC236}">
-                <a16:creationId xmlns:a16="http://schemas.microsoft.com/office/drawing/2014/main" id="{31BA32BF-8160-4CA0-8F63-EBD912671EE7}"/>
-              </a:ext>
-            </a:extLst>
-          </p:cNvPr>
-          <p:cNvCxnSpPr>
-            <a:cxnSpLocks/>
-          </p:cNvCxnSpPr>
-          <p:nvPr/>
-        </p:nvCxnSpPr>
-        <p:spPr>
-          <a:xfrm>
-            <a:off x="3572142" y="3462114"/>
-            <a:ext cx="0" cy="241419"/>
-          </a:xfrm>
-          <a:prstGeom prst="line">
-            <a:avLst/>
-          </a:prstGeom>
-          <a:ln w="19050">
-            <a:solidFill>
-              <a:schemeClr val="tx1"/>
-            </a:solidFill>
+        <p:txBody>
+          <a:bodyPr rtlCol="0" anchor="ctr"/>
+          <a:lstStyle/>
+          <a:p>
+            <a:pPr algn="ctr"/>
+            <a:endParaRPr lang="de-DE"/>
+          </a:p>
+        </p:txBody>
+      </p:sp>
+      <p:sp>
+        <p:nvSpPr>
+          <p:cNvPr id="6" name="Rechteck 5">
+            <a:extLst>
+              <a:ext uri="{FF2B5EF4-FFF2-40B4-BE49-F238E27FC236}">
+                <a16:creationId xmlns:a16="http://schemas.microsoft.com/office/drawing/2014/main" id="{DD628238-58D4-4D6A-BB9B-FC4468E28300}"/>
+              </a:ext>
+            </a:extLst>
+          </p:cNvPr>
+          <p:cNvSpPr/>
+          <p:nvPr/>
+        </p:nvSpPr>
+        <p:spPr>
+          <a:xfrm>
+            <a:off x="4700332" y="4180167"/>
+            <a:ext cx="435086" cy="160924"/>
+          </a:xfrm>
+          <a:prstGeom prst="rect">
+            <a:avLst/>
+          </a:prstGeom>
+          <a:solidFill>
+            <a:srgbClr val="FFFF00">
+              <a:alpha val="50000"/>
+            </a:srgbClr>
+          </a:solidFill>
+          <a:ln>
+            <a:noFill/>
           </a:ln>
         </p:spPr>
         <p:style>
-          <a:lnRef idx="1">
-            <a:schemeClr val="accent1"/>
+          <a:lnRef idx="2">
+            <a:schemeClr val="accent1">
+              <a:shade val="50000"/>
+            </a:schemeClr>
           </a:lnRef>
-          <a:fillRef idx="0">
+          <a:fillRef idx="1">
             <a:schemeClr val="accent1"/>
           </a:fillRef>
           <a:effectRef idx="0">
             <a:schemeClr val="accent1"/>
           </a:effectRef>
           <a:fontRef idx="minor">
-            <a:schemeClr val="tx1"/>
+            <a:schemeClr val="lt1"/>
           </a:fontRef>
         </p:style>
-      </p:cxnSp>
-      <p:sp>
-        <p:nvSpPr>
-          <p:cNvPr id="11" name="Textfeld 10">
-            <a:extLst>
-              <a:ext uri="{FF2B5EF4-FFF2-40B4-BE49-F238E27FC236}">
-                <a16:creationId xmlns:a16="http://schemas.microsoft.com/office/drawing/2014/main" id="{B2565338-039D-40AF-990D-CDCEBB0DDEAE}"/>
+        <p:txBody>
+          <a:bodyPr rtlCol="0" anchor="ctr"/>
+          <a:lstStyle/>
+          <a:p>
+            <a:pPr algn="ctr"/>
+            <a:endParaRPr lang="de-DE"/>
+          </a:p>
+        </p:txBody>
+      </p:sp>
+      <p:sp>
+        <p:nvSpPr>
+          <p:cNvPr id="7" name="Rechteck 6">
+            <a:extLst>
+              <a:ext uri="{FF2B5EF4-FFF2-40B4-BE49-F238E27FC236}">
+                <a16:creationId xmlns:a16="http://schemas.microsoft.com/office/drawing/2014/main" id="{E716070A-56DB-4374-A0DB-700838ABE61C}"/>
+              </a:ext>
+            </a:extLst>
+          </p:cNvPr>
+          <p:cNvSpPr/>
+          <p:nvPr/>
+        </p:nvSpPr>
+        <p:spPr>
+          <a:xfrm>
+            <a:off x="2275595" y="6040342"/>
+            <a:ext cx="288662" cy="148561"/>
+          </a:xfrm>
+          <a:prstGeom prst="rect">
+            <a:avLst/>
+          </a:prstGeom>
+          <a:solidFill>
+            <a:srgbClr val="FFFF00">
+              <a:alpha val="50000"/>
+            </a:srgbClr>
+          </a:solidFill>
+          <a:ln>
+            <a:noFill/>
+          </a:ln>
+        </p:spPr>
+        <p:style>
+          <a:lnRef idx="2">
+            <a:schemeClr val="accent1">
+              <a:shade val="50000"/>
+            </a:schemeClr>
+          </a:lnRef>
+          <a:fillRef idx="1">
+            <a:schemeClr val="accent1"/>
+          </a:fillRef>
+          <a:effectRef idx="0">
+            <a:schemeClr val="accent1"/>
+          </a:effectRef>
+          <a:fontRef idx="minor">
+            <a:schemeClr val="lt1"/>
+          </a:fontRef>
+        </p:style>
+        <p:txBody>
+          <a:bodyPr rtlCol="0" anchor="ctr"/>
+          <a:lstStyle/>
+          <a:p>
+            <a:pPr algn="ctr"/>
+            <a:endParaRPr lang="de-DE"/>
+          </a:p>
+        </p:txBody>
+      </p:sp>
+      <p:sp>
+        <p:nvSpPr>
+          <p:cNvPr id="8" name="Rechteck 7">
+            <a:extLst>
+              <a:ext uri="{FF2B5EF4-FFF2-40B4-BE49-F238E27FC236}">
+                <a16:creationId xmlns:a16="http://schemas.microsoft.com/office/drawing/2014/main" id="{645C727E-5E66-47CB-B45F-E7C831636597}"/>
+              </a:ext>
+            </a:extLst>
+          </p:cNvPr>
+          <p:cNvSpPr/>
+          <p:nvPr/>
+        </p:nvSpPr>
+        <p:spPr>
+          <a:xfrm>
+            <a:off x="2451764" y="6202983"/>
+            <a:ext cx="435086" cy="160924"/>
+          </a:xfrm>
+          <a:prstGeom prst="rect">
+            <a:avLst/>
+          </a:prstGeom>
+          <a:solidFill>
+            <a:srgbClr val="FFFF00">
+              <a:alpha val="50000"/>
+            </a:srgbClr>
+          </a:solidFill>
+          <a:ln>
+            <a:noFill/>
+          </a:ln>
+        </p:spPr>
+        <p:style>
+          <a:lnRef idx="2">
+            <a:schemeClr val="accent1">
+              <a:shade val="50000"/>
+            </a:schemeClr>
+          </a:lnRef>
+          <a:fillRef idx="1">
+            <a:schemeClr val="accent1"/>
+          </a:fillRef>
+          <a:effectRef idx="0">
+            <a:schemeClr val="accent1"/>
+          </a:effectRef>
+          <a:fontRef idx="minor">
+            <a:schemeClr val="lt1"/>
+          </a:fontRef>
+        </p:style>
+        <p:txBody>
+          <a:bodyPr rtlCol="0" anchor="ctr"/>
+          <a:lstStyle/>
+          <a:p>
+            <a:pPr algn="ctr"/>
+            <a:endParaRPr lang="de-DE"/>
+          </a:p>
+        </p:txBody>
+      </p:sp>
+      <p:sp>
+        <p:nvSpPr>
+          <p:cNvPr id="9" name="Textfeld 8">
+            <a:extLst>
+              <a:ext uri="{FF2B5EF4-FFF2-40B4-BE49-F238E27FC236}">
+                <a16:creationId xmlns:a16="http://schemas.microsoft.com/office/drawing/2014/main" id="{8773FFF6-6C8C-4022-8C91-2ED9B8EEB77B}"/>
               </a:ext>
             </a:extLst>
           </p:cNvPr>
@@ -7248,8 +9490,8 @@
         </p:nvSpPr>
         <p:spPr>
           <a:xfrm>
-            <a:off x="3327524" y="3696822"/>
-            <a:ext cx="489236" cy="369332"/>
+            <a:off x="311945" y="170927"/>
+            <a:ext cx="4215962" cy="646331"/>
           </a:xfrm>
           <a:prstGeom prst="rect">
             <a:avLst/>
@@ -7264,60 +9506,28 @@
           <a:p>
             <a:r>
               <a:rPr lang="de-DE" dirty="0"/>
-              <a:t>-10</a:t>
-            </a:r>
-          </a:p>
-        </p:txBody>
-      </p:sp>
-      <p:cxnSp>
-        <p:nvCxnSpPr>
-          <p:cNvPr id="13" name="Gerader Verbinder 12">
-            <a:extLst>
-              <a:ext uri="{FF2B5EF4-FFF2-40B4-BE49-F238E27FC236}">
-                <a16:creationId xmlns:a16="http://schemas.microsoft.com/office/drawing/2014/main" id="{420CFC0B-F7D2-447A-80E6-13AC8841018F}"/>
-              </a:ext>
-            </a:extLst>
-          </p:cNvPr>
-          <p:cNvCxnSpPr>
-            <a:cxnSpLocks/>
-          </p:cNvCxnSpPr>
-          <p:nvPr/>
-        </p:nvCxnSpPr>
-        <p:spPr>
-          <a:xfrm>
-            <a:off x="4093435" y="3462114"/>
-            <a:ext cx="0" cy="241419"/>
-          </a:xfrm>
-          <a:prstGeom prst="line">
-            <a:avLst/>
-          </a:prstGeom>
-          <a:ln w="19050">
-            <a:solidFill>
-              <a:schemeClr val="tx1"/>
-            </a:solidFill>
-          </a:ln>
-        </p:spPr>
-        <p:style>
-          <a:lnRef idx="1">
-            <a:schemeClr val="accent1"/>
-          </a:lnRef>
-          <a:fillRef idx="0">
-            <a:schemeClr val="accent1"/>
-          </a:fillRef>
-          <a:effectRef idx="0">
-            <a:schemeClr val="accent1"/>
-          </a:effectRef>
-          <a:fontRef idx="minor">
-            <a:schemeClr val="tx1"/>
-          </a:fontRef>
-        </p:style>
-      </p:cxnSp>
-      <p:sp>
-        <p:nvSpPr>
-          <p:cNvPr id="14" name="Textfeld 13">
-            <a:extLst>
-              <a:ext uri="{FF2B5EF4-FFF2-40B4-BE49-F238E27FC236}">
-                <a16:creationId xmlns:a16="http://schemas.microsoft.com/office/drawing/2014/main" id="{6044D833-CA14-4288-82A2-2AF2BA8D54C9}"/>
+              <a:t>Uncertainty Sampling </a:t>
+            </a:r>
+            <a:r>
+              <a:rPr lang="de-DE" dirty="0" err="1"/>
+              <a:t>Example</a:t>
+            </a:r>
+            <a:endParaRPr lang="de-DE" dirty="0"/>
+          </a:p>
+          <a:p>
+            <a:r>
+              <a:rPr lang="de-DE" dirty="0"/>
+              <a:t>Min Positive Score and Max Negative Score</a:t>
+            </a:r>
+          </a:p>
+        </p:txBody>
+      </p:sp>
+      <p:sp>
+        <p:nvSpPr>
+          <p:cNvPr id="10" name="Textfeld 9">
+            <a:extLst>
+              <a:ext uri="{FF2B5EF4-FFF2-40B4-BE49-F238E27FC236}">
+                <a16:creationId xmlns:a16="http://schemas.microsoft.com/office/drawing/2014/main" id="{7F23CF1A-FB53-444F-95D7-196C4B3896C6}"/>
               </a:ext>
             </a:extLst>
           </p:cNvPr>
@@ -7326,8 +9536,8 @@
         </p:nvSpPr>
         <p:spPr>
           <a:xfrm>
-            <a:off x="3848817" y="3703533"/>
-            <a:ext cx="372218" cy="369332"/>
+            <a:off x="5652655" y="956951"/>
+            <a:ext cx="1636089" cy="276999"/>
           </a:xfrm>
           <a:prstGeom prst="rect">
             <a:avLst/>
@@ -7341,1362 +9551,32 @@
           <a:lstStyle/>
           <a:p>
             <a:r>
-              <a:rPr lang="de-DE" dirty="0"/>
-              <a:t>-8</a:t>
-            </a:r>
-          </a:p>
-        </p:txBody>
-      </p:sp>
-      <p:cxnSp>
-        <p:nvCxnSpPr>
-          <p:cNvPr id="17" name="Gerader Verbinder 16">
-            <a:extLst>
-              <a:ext uri="{FF2B5EF4-FFF2-40B4-BE49-F238E27FC236}">
-                <a16:creationId xmlns:a16="http://schemas.microsoft.com/office/drawing/2014/main" id="{3505F748-B0AA-445F-948C-B2EA78721FDC}"/>
-              </a:ext>
-            </a:extLst>
-          </p:cNvPr>
-          <p:cNvCxnSpPr>
-            <a:cxnSpLocks/>
-          </p:cNvCxnSpPr>
-          <p:nvPr/>
-        </p:nvCxnSpPr>
-        <p:spPr>
-          <a:xfrm>
-            <a:off x="4614727" y="3462114"/>
-            <a:ext cx="0" cy="241419"/>
-          </a:xfrm>
-          <a:prstGeom prst="line">
-            <a:avLst/>
-          </a:prstGeom>
-          <a:ln w="19050">
-            <a:solidFill>
-              <a:schemeClr val="tx1"/>
-            </a:solidFill>
-          </a:ln>
-        </p:spPr>
-        <p:style>
-          <a:lnRef idx="1">
-            <a:schemeClr val="accent1"/>
-          </a:lnRef>
-          <a:fillRef idx="0">
-            <a:schemeClr val="accent1"/>
-          </a:fillRef>
-          <a:effectRef idx="0">
-            <a:schemeClr val="accent1"/>
-          </a:effectRef>
-          <a:fontRef idx="minor">
-            <a:schemeClr val="tx1"/>
-          </a:fontRef>
-        </p:style>
-      </p:cxnSp>
-      <p:sp>
-        <p:nvSpPr>
-          <p:cNvPr id="18" name="Textfeld 17">
-            <a:extLst>
-              <a:ext uri="{FF2B5EF4-FFF2-40B4-BE49-F238E27FC236}">
-                <a16:creationId xmlns:a16="http://schemas.microsoft.com/office/drawing/2014/main" id="{1E84328A-5CBD-48AF-9182-C0F1A1D2530A}"/>
-              </a:ext>
-            </a:extLst>
-          </p:cNvPr>
-          <p:cNvSpPr txBox="1"/>
-          <p:nvPr/>
-        </p:nvSpPr>
-        <p:spPr>
-          <a:xfrm>
-            <a:off x="4370109" y="3703533"/>
-            <a:ext cx="372218" cy="369332"/>
-          </a:xfrm>
-          <a:prstGeom prst="rect">
-            <a:avLst/>
-          </a:prstGeom>
-          <a:noFill/>
-        </p:spPr>
-        <p:txBody>
-          <a:bodyPr wrap="none" rtlCol="0">
-            <a:spAutoFit/>
-          </a:bodyPr>
-          <a:lstStyle/>
-          <a:p>
-            <a:r>
-              <a:rPr lang="de-DE" dirty="0"/>
-              <a:t>-6</a:t>
-            </a:r>
-          </a:p>
-        </p:txBody>
-      </p:sp>
-      <p:cxnSp>
-        <p:nvCxnSpPr>
-          <p:cNvPr id="19" name="Gerader Verbinder 18">
-            <a:extLst>
-              <a:ext uri="{FF2B5EF4-FFF2-40B4-BE49-F238E27FC236}">
-                <a16:creationId xmlns:a16="http://schemas.microsoft.com/office/drawing/2014/main" id="{C6533A49-9795-4804-9B55-31A06AD2394C}"/>
-              </a:ext>
-            </a:extLst>
-          </p:cNvPr>
-          <p:cNvCxnSpPr>
-            <a:cxnSpLocks/>
-          </p:cNvCxnSpPr>
-          <p:nvPr/>
-        </p:nvCxnSpPr>
-        <p:spPr>
-          <a:xfrm>
-            <a:off x="5136019" y="3462114"/>
-            <a:ext cx="0" cy="241419"/>
-          </a:xfrm>
-          <a:prstGeom prst="line">
-            <a:avLst/>
-          </a:prstGeom>
-          <a:ln w="19050">
-            <a:solidFill>
-              <a:schemeClr val="tx1"/>
-            </a:solidFill>
-          </a:ln>
-        </p:spPr>
-        <p:style>
-          <a:lnRef idx="1">
-            <a:schemeClr val="accent1"/>
-          </a:lnRef>
-          <a:fillRef idx="0">
-            <a:schemeClr val="accent1"/>
-          </a:fillRef>
-          <a:effectRef idx="0">
-            <a:schemeClr val="accent1"/>
-          </a:effectRef>
-          <a:fontRef idx="minor">
-            <a:schemeClr val="tx1"/>
-          </a:fontRef>
-        </p:style>
-      </p:cxnSp>
-      <p:sp>
-        <p:nvSpPr>
-          <p:cNvPr id="20" name="Textfeld 19">
-            <a:extLst>
-              <a:ext uri="{FF2B5EF4-FFF2-40B4-BE49-F238E27FC236}">
-                <a16:creationId xmlns:a16="http://schemas.microsoft.com/office/drawing/2014/main" id="{0243DAED-6B54-42D4-9F8F-96B54D5C177A}"/>
-              </a:ext>
-            </a:extLst>
-          </p:cNvPr>
-          <p:cNvSpPr txBox="1"/>
-          <p:nvPr/>
-        </p:nvSpPr>
-        <p:spPr>
-          <a:xfrm>
-            <a:off x="4891401" y="3703533"/>
-            <a:ext cx="372218" cy="369332"/>
-          </a:xfrm>
-          <a:prstGeom prst="rect">
-            <a:avLst/>
-          </a:prstGeom>
-          <a:noFill/>
-        </p:spPr>
-        <p:txBody>
-          <a:bodyPr wrap="none" rtlCol="0">
-            <a:spAutoFit/>
-          </a:bodyPr>
-          <a:lstStyle/>
-          <a:p>
-            <a:r>
-              <a:rPr lang="de-DE" dirty="0"/>
-              <a:t>-4</a:t>
-            </a:r>
-          </a:p>
-        </p:txBody>
-      </p:sp>
-      <p:cxnSp>
-        <p:nvCxnSpPr>
-          <p:cNvPr id="21" name="Gerader Verbinder 20">
-            <a:extLst>
-              <a:ext uri="{FF2B5EF4-FFF2-40B4-BE49-F238E27FC236}">
-                <a16:creationId xmlns:a16="http://schemas.microsoft.com/office/drawing/2014/main" id="{E345DB36-3855-4E03-8479-A4FC78C45352}"/>
-              </a:ext>
-            </a:extLst>
-          </p:cNvPr>
-          <p:cNvCxnSpPr>
-            <a:cxnSpLocks/>
-          </p:cNvCxnSpPr>
-          <p:nvPr/>
-        </p:nvCxnSpPr>
-        <p:spPr>
-          <a:xfrm>
-            <a:off x="5657310" y="3462114"/>
-            <a:ext cx="0" cy="241419"/>
-          </a:xfrm>
-          <a:prstGeom prst="line">
-            <a:avLst/>
-          </a:prstGeom>
-          <a:ln w="19050">
-            <a:solidFill>
-              <a:schemeClr val="tx1"/>
-            </a:solidFill>
-          </a:ln>
-        </p:spPr>
-        <p:style>
-          <a:lnRef idx="1">
-            <a:schemeClr val="accent1"/>
-          </a:lnRef>
-          <a:fillRef idx="0">
-            <a:schemeClr val="accent1"/>
-          </a:fillRef>
-          <a:effectRef idx="0">
-            <a:schemeClr val="accent1"/>
-          </a:effectRef>
-          <a:fontRef idx="minor">
-            <a:schemeClr val="tx1"/>
-          </a:fontRef>
-        </p:style>
-      </p:cxnSp>
-      <p:sp>
-        <p:nvSpPr>
-          <p:cNvPr id="22" name="Textfeld 21">
-            <a:extLst>
-              <a:ext uri="{FF2B5EF4-FFF2-40B4-BE49-F238E27FC236}">
-                <a16:creationId xmlns:a16="http://schemas.microsoft.com/office/drawing/2014/main" id="{4772F9F2-2F74-4F54-9AF3-D05AE44E2553}"/>
-              </a:ext>
-            </a:extLst>
-          </p:cNvPr>
-          <p:cNvSpPr txBox="1"/>
-          <p:nvPr/>
-        </p:nvSpPr>
-        <p:spPr>
-          <a:xfrm>
-            <a:off x="5412692" y="3703533"/>
-            <a:ext cx="372218" cy="369332"/>
-          </a:xfrm>
-          <a:prstGeom prst="rect">
-            <a:avLst/>
-          </a:prstGeom>
-          <a:noFill/>
-        </p:spPr>
-        <p:txBody>
-          <a:bodyPr wrap="none" rtlCol="0">
-            <a:spAutoFit/>
-          </a:bodyPr>
-          <a:lstStyle/>
-          <a:p>
-            <a:r>
-              <a:rPr lang="de-DE" dirty="0"/>
-              <a:t>-2</a:t>
-            </a:r>
-          </a:p>
-        </p:txBody>
-      </p:sp>
-      <p:cxnSp>
-        <p:nvCxnSpPr>
-          <p:cNvPr id="23" name="Gerader Verbinder 22">
-            <a:extLst>
-              <a:ext uri="{FF2B5EF4-FFF2-40B4-BE49-F238E27FC236}">
-                <a16:creationId xmlns:a16="http://schemas.microsoft.com/office/drawing/2014/main" id="{8ECDF321-6C63-4C14-A1BC-40F865EE3CE1}"/>
-              </a:ext>
-            </a:extLst>
-          </p:cNvPr>
-          <p:cNvCxnSpPr>
-            <a:cxnSpLocks/>
-          </p:cNvCxnSpPr>
-          <p:nvPr/>
-        </p:nvCxnSpPr>
-        <p:spPr>
-          <a:xfrm>
-            <a:off x="6178601" y="3462114"/>
-            <a:ext cx="0" cy="241419"/>
-          </a:xfrm>
-          <a:prstGeom prst="line">
-            <a:avLst/>
-          </a:prstGeom>
-          <a:ln w="19050">
-            <a:solidFill>
-              <a:schemeClr val="tx1"/>
-            </a:solidFill>
-          </a:ln>
-        </p:spPr>
-        <p:style>
-          <a:lnRef idx="1">
-            <a:schemeClr val="accent1"/>
-          </a:lnRef>
-          <a:fillRef idx="0">
-            <a:schemeClr val="accent1"/>
-          </a:fillRef>
-          <a:effectRef idx="0">
-            <a:schemeClr val="accent1"/>
-          </a:effectRef>
-          <a:fontRef idx="minor">
-            <a:schemeClr val="tx1"/>
-          </a:fontRef>
-        </p:style>
-      </p:cxnSp>
-      <p:sp>
-        <p:nvSpPr>
-          <p:cNvPr id="24" name="Textfeld 23">
-            <a:extLst>
-              <a:ext uri="{FF2B5EF4-FFF2-40B4-BE49-F238E27FC236}">
-                <a16:creationId xmlns:a16="http://schemas.microsoft.com/office/drawing/2014/main" id="{9D42CB0C-5A3A-4111-9FB0-E2814AEB4195}"/>
-              </a:ext>
-            </a:extLst>
-          </p:cNvPr>
-          <p:cNvSpPr txBox="1"/>
-          <p:nvPr/>
-        </p:nvSpPr>
-        <p:spPr>
-          <a:xfrm>
-            <a:off x="5993563" y="3619878"/>
-            <a:ext cx="367408" cy="523220"/>
-          </a:xfrm>
-          <a:prstGeom prst="rect">
-            <a:avLst/>
-          </a:prstGeom>
-          <a:noFill/>
-        </p:spPr>
-        <p:txBody>
-          <a:bodyPr wrap="none" rtlCol="0">
-            <a:spAutoFit/>
-          </a:bodyPr>
-          <a:lstStyle/>
-          <a:p>
-            <a:r>
-              <a:rPr lang="de-DE" sz="2800" dirty="0"/>
-              <a:t>0</a:t>
-            </a:r>
-          </a:p>
-        </p:txBody>
-      </p:sp>
-      <p:cxnSp>
-        <p:nvCxnSpPr>
-          <p:cNvPr id="25" name="Gerader Verbinder 24">
-            <a:extLst>
-              <a:ext uri="{FF2B5EF4-FFF2-40B4-BE49-F238E27FC236}">
-                <a16:creationId xmlns:a16="http://schemas.microsoft.com/office/drawing/2014/main" id="{57CB361C-5E07-4BB2-8D7F-D2DED3F3C21B}"/>
-              </a:ext>
-            </a:extLst>
-          </p:cNvPr>
-          <p:cNvCxnSpPr>
-            <a:cxnSpLocks/>
-          </p:cNvCxnSpPr>
-          <p:nvPr/>
-        </p:nvCxnSpPr>
-        <p:spPr>
-          <a:xfrm>
-            <a:off x="6699892" y="3462114"/>
-            <a:ext cx="0" cy="241419"/>
-          </a:xfrm>
-          <a:prstGeom prst="line">
-            <a:avLst/>
-          </a:prstGeom>
-          <a:ln w="19050">
-            <a:solidFill>
-              <a:schemeClr val="tx1"/>
-            </a:solidFill>
-          </a:ln>
-        </p:spPr>
-        <p:style>
-          <a:lnRef idx="1">
-            <a:schemeClr val="accent1"/>
-          </a:lnRef>
-          <a:fillRef idx="0">
-            <a:schemeClr val="accent1"/>
-          </a:fillRef>
-          <a:effectRef idx="0">
-            <a:schemeClr val="accent1"/>
-          </a:effectRef>
-          <a:fontRef idx="minor">
-            <a:schemeClr val="tx1"/>
-          </a:fontRef>
-        </p:style>
-      </p:cxnSp>
-      <p:sp>
-        <p:nvSpPr>
-          <p:cNvPr id="26" name="Textfeld 25">
-            <a:extLst>
-              <a:ext uri="{FF2B5EF4-FFF2-40B4-BE49-F238E27FC236}">
-                <a16:creationId xmlns:a16="http://schemas.microsoft.com/office/drawing/2014/main" id="{5FEF4E6A-0982-4BFC-B756-EB61D219CFE2}"/>
-              </a:ext>
-            </a:extLst>
-          </p:cNvPr>
-          <p:cNvSpPr txBox="1"/>
-          <p:nvPr/>
-        </p:nvSpPr>
-        <p:spPr>
-          <a:xfrm>
-            <a:off x="6549046" y="3698329"/>
-            <a:ext cx="301686" cy="369332"/>
-          </a:xfrm>
-          <a:prstGeom prst="rect">
-            <a:avLst/>
-          </a:prstGeom>
-          <a:noFill/>
-        </p:spPr>
-        <p:txBody>
-          <a:bodyPr wrap="none" rtlCol="0">
-            <a:spAutoFit/>
-          </a:bodyPr>
-          <a:lstStyle/>
-          <a:p>
-            <a:r>
-              <a:rPr lang="de-DE" dirty="0"/>
-              <a:t>2</a:t>
-            </a:r>
-          </a:p>
-        </p:txBody>
-      </p:sp>
-      <p:cxnSp>
-        <p:nvCxnSpPr>
-          <p:cNvPr id="27" name="Gerader Verbinder 26">
-            <a:extLst>
-              <a:ext uri="{FF2B5EF4-FFF2-40B4-BE49-F238E27FC236}">
-                <a16:creationId xmlns:a16="http://schemas.microsoft.com/office/drawing/2014/main" id="{C904FDE5-0332-4DD1-9428-C7095C65A35F}"/>
-              </a:ext>
-            </a:extLst>
-          </p:cNvPr>
-          <p:cNvCxnSpPr>
-            <a:cxnSpLocks/>
-          </p:cNvCxnSpPr>
-          <p:nvPr/>
-        </p:nvCxnSpPr>
-        <p:spPr>
-          <a:xfrm>
-            <a:off x="7221182" y="3462114"/>
-            <a:ext cx="0" cy="241419"/>
-          </a:xfrm>
-          <a:prstGeom prst="line">
-            <a:avLst/>
-          </a:prstGeom>
-          <a:ln w="19050">
-            <a:solidFill>
-              <a:schemeClr val="tx1"/>
-            </a:solidFill>
-          </a:ln>
-        </p:spPr>
-        <p:style>
-          <a:lnRef idx="1">
-            <a:schemeClr val="accent1"/>
-          </a:lnRef>
-          <a:fillRef idx="0">
-            <a:schemeClr val="accent1"/>
-          </a:fillRef>
-          <a:effectRef idx="0">
-            <a:schemeClr val="accent1"/>
-          </a:effectRef>
-          <a:fontRef idx="minor">
-            <a:schemeClr val="tx1"/>
-          </a:fontRef>
-        </p:style>
-      </p:cxnSp>
-      <p:sp>
-        <p:nvSpPr>
-          <p:cNvPr id="28" name="Textfeld 27">
-            <a:extLst>
-              <a:ext uri="{FF2B5EF4-FFF2-40B4-BE49-F238E27FC236}">
-                <a16:creationId xmlns:a16="http://schemas.microsoft.com/office/drawing/2014/main" id="{0CED7DAF-5B8E-426F-817F-D04AE90AE967}"/>
-              </a:ext>
-            </a:extLst>
-          </p:cNvPr>
-          <p:cNvSpPr txBox="1"/>
-          <p:nvPr/>
-        </p:nvSpPr>
-        <p:spPr>
-          <a:xfrm>
-            <a:off x="7059818" y="3706738"/>
-            <a:ext cx="301686" cy="369332"/>
-          </a:xfrm>
-          <a:prstGeom prst="rect">
-            <a:avLst/>
-          </a:prstGeom>
-          <a:noFill/>
-        </p:spPr>
-        <p:txBody>
-          <a:bodyPr wrap="none" rtlCol="0">
-            <a:spAutoFit/>
-          </a:bodyPr>
-          <a:lstStyle/>
-          <a:p>
-            <a:r>
-              <a:rPr lang="de-DE" dirty="0"/>
-              <a:t>4</a:t>
-            </a:r>
-          </a:p>
-        </p:txBody>
-      </p:sp>
-      <p:cxnSp>
-        <p:nvCxnSpPr>
-          <p:cNvPr id="29" name="Gerader Verbinder 28">
-            <a:extLst>
-              <a:ext uri="{FF2B5EF4-FFF2-40B4-BE49-F238E27FC236}">
-                <a16:creationId xmlns:a16="http://schemas.microsoft.com/office/drawing/2014/main" id="{5E6033E7-1632-418F-BD1F-72E513DEDB36}"/>
-              </a:ext>
-            </a:extLst>
-          </p:cNvPr>
-          <p:cNvCxnSpPr>
-            <a:cxnSpLocks/>
-          </p:cNvCxnSpPr>
-          <p:nvPr/>
-        </p:nvCxnSpPr>
-        <p:spPr>
-          <a:xfrm>
-            <a:off x="7742472" y="3462114"/>
-            <a:ext cx="0" cy="241419"/>
-          </a:xfrm>
-          <a:prstGeom prst="line">
-            <a:avLst/>
-          </a:prstGeom>
-          <a:ln w="19050">
-            <a:solidFill>
-              <a:schemeClr val="tx1"/>
-            </a:solidFill>
-          </a:ln>
-        </p:spPr>
-        <p:style>
-          <a:lnRef idx="1">
-            <a:schemeClr val="accent1"/>
-          </a:lnRef>
-          <a:fillRef idx="0">
-            <a:schemeClr val="accent1"/>
-          </a:fillRef>
-          <a:effectRef idx="0">
-            <a:schemeClr val="accent1"/>
-          </a:effectRef>
-          <a:fontRef idx="minor">
-            <a:schemeClr val="tx1"/>
-          </a:fontRef>
-        </p:style>
-      </p:cxnSp>
-      <p:sp>
-        <p:nvSpPr>
-          <p:cNvPr id="30" name="Textfeld 29">
-            <a:extLst>
-              <a:ext uri="{FF2B5EF4-FFF2-40B4-BE49-F238E27FC236}">
-                <a16:creationId xmlns:a16="http://schemas.microsoft.com/office/drawing/2014/main" id="{4996C665-1585-4F1C-8951-AAA2C0B8F3F5}"/>
-              </a:ext>
-            </a:extLst>
-          </p:cNvPr>
-          <p:cNvSpPr txBox="1"/>
-          <p:nvPr/>
-        </p:nvSpPr>
-        <p:spPr>
-          <a:xfrm>
-            <a:off x="7627859" y="3698055"/>
-            <a:ext cx="301686" cy="369332"/>
-          </a:xfrm>
-          <a:prstGeom prst="rect">
-            <a:avLst/>
-          </a:prstGeom>
-          <a:noFill/>
-        </p:spPr>
-        <p:txBody>
-          <a:bodyPr wrap="none" rtlCol="0">
-            <a:spAutoFit/>
-          </a:bodyPr>
-          <a:lstStyle/>
-          <a:p>
-            <a:r>
-              <a:rPr lang="de-DE" dirty="0"/>
-              <a:t>6</a:t>
-            </a:r>
-          </a:p>
-        </p:txBody>
-      </p:sp>
-      <p:cxnSp>
-        <p:nvCxnSpPr>
-          <p:cNvPr id="31" name="Gerader Verbinder 30">
-            <a:extLst>
-              <a:ext uri="{FF2B5EF4-FFF2-40B4-BE49-F238E27FC236}">
-                <a16:creationId xmlns:a16="http://schemas.microsoft.com/office/drawing/2014/main" id="{5C34B414-2795-43A0-A404-C35347CAC28B}"/>
-              </a:ext>
-            </a:extLst>
-          </p:cNvPr>
-          <p:cNvCxnSpPr>
-            <a:cxnSpLocks/>
-          </p:cNvCxnSpPr>
-          <p:nvPr/>
-        </p:nvCxnSpPr>
-        <p:spPr>
-          <a:xfrm>
-            <a:off x="8263761" y="3462114"/>
-            <a:ext cx="0" cy="241419"/>
-          </a:xfrm>
-          <a:prstGeom prst="line">
-            <a:avLst/>
-          </a:prstGeom>
-          <a:ln w="19050">
-            <a:solidFill>
-              <a:schemeClr val="tx1"/>
-            </a:solidFill>
-          </a:ln>
-        </p:spPr>
-        <p:style>
-          <a:lnRef idx="1">
-            <a:schemeClr val="accent1"/>
-          </a:lnRef>
-          <a:fillRef idx="0">
-            <a:schemeClr val="accent1"/>
-          </a:fillRef>
-          <a:effectRef idx="0">
-            <a:schemeClr val="accent1"/>
-          </a:effectRef>
-          <a:fontRef idx="minor">
-            <a:schemeClr val="tx1"/>
-          </a:fontRef>
-        </p:style>
-      </p:cxnSp>
-      <p:sp>
-        <p:nvSpPr>
-          <p:cNvPr id="32" name="Textfeld 31">
-            <a:extLst>
-              <a:ext uri="{FF2B5EF4-FFF2-40B4-BE49-F238E27FC236}">
-                <a16:creationId xmlns:a16="http://schemas.microsoft.com/office/drawing/2014/main" id="{61071AB3-E7DA-4F5F-AE6D-A3B9EAC8D22C}"/>
-              </a:ext>
-            </a:extLst>
-          </p:cNvPr>
-          <p:cNvSpPr txBox="1"/>
-          <p:nvPr/>
-        </p:nvSpPr>
-        <p:spPr>
-          <a:xfrm>
-            <a:off x="8103692" y="3704463"/>
-            <a:ext cx="301686" cy="369332"/>
-          </a:xfrm>
-          <a:prstGeom prst="rect">
-            <a:avLst/>
-          </a:prstGeom>
-          <a:noFill/>
-        </p:spPr>
-        <p:txBody>
-          <a:bodyPr wrap="none" rtlCol="0">
-            <a:spAutoFit/>
-          </a:bodyPr>
-          <a:lstStyle/>
-          <a:p>
-            <a:r>
-              <a:rPr lang="de-DE" dirty="0"/>
-              <a:t>8</a:t>
-            </a:r>
-          </a:p>
-        </p:txBody>
-      </p:sp>
-      <p:cxnSp>
-        <p:nvCxnSpPr>
-          <p:cNvPr id="33" name="Gerader Verbinder 32">
-            <a:extLst>
-              <a:ext uri="{FF2B5EF4-FFF2-40B4-BE49-F238E27FC236}">
-                <a16:creationId xmlns:a16="http://schemas.microsoft.com/office/drawing/2014/main" id="{CFB73687-D8C4-4731-AA25-63A0C9BDEC48}"/>
-              </a:ext>
-            </a:extLst>
-          </p:cNvPr>
-          <p:cNvCxnSpPr>
-            <a:cxnSpLocks/>
-          </p:cNvCxnSpPr>
-          <p:nvPr/>
-        </p:nvCxnSpPr>
-        <p:spPr>
-          <a:xfrm>
-            <a:off x="8779692" y="3462114"/>
-            <a:ext cx="0" cy="241419"/>
-          </a:xfrm>
-          <a:prstGeom prst="line">
-            <a:avLst/>
-          </a:prstGeom>
-          <a:ln w="19050">
-            <a:solidFill>
-              <a:schemeClr val="tx1"/>
-            </a:solidFill>
-          </a:ln>
-        </p:spPr>
-        <p:style>
-          <a:lnRef idx="1">
-            <a:schemeClr val="accent1"/>
-          </a:lnRef>
-          <a:fillRef idx="0">
-            <a:schemeClr val="accent1"/>
-          </a:fillRef>
-          <a:effectRef idx="0">
-            <a:schemeClr val="accent1"/>
-          </a:effectRef>
-          <a:fontRef idx="minor">
-            <a:schemeClr val="tx1"/>
-          </a:fontRef>
-        </p:style>
-      </p:cxnSp>
-      <p:sp>
-        <p:nvSpPr>
-          <p:cNvPr id="34" name="Textfeld 33">
-            <a:extLst>
-              <a:ext uri="{FF2B5EF4-FFF2-40B4-BE49-F238E27FC236}">
-                <a16:creationId xmlns:a16="http://schemas.microsoft.com/office/drawing/2014/main" id="{E264B5F4-9CD4-41D3-ACF2-784012E2A0AF}"/>
-              </a:ext>
-            </a:extLst>
-          </p:cNvPr>
-          <p:cNvSpPr txBox="1"/>
-          <p:nvPr/>
-        </p:nvSpPr>
-        <p:spPr>
-          <a:xfrm>
-            <a:off x="8578327" y="3697644"/>
-            <a:ext cx="418704" cy="369332"/>
-          </a:xfrm>
-          <a:prstGeom prst="rect">
-            <a:avLst/>
-          </a:prstGeom>
-          <a:noFill/>
-        </p:spPr>
-        <p:txBody>
-          <a:bodyPr wrap="none" rtlCol="0">
-            <a:spAutoFit/>
-          </a:bodyPr>
-          <a:lstStyle/>
-          <a:p>
-            <a:r>
-              <a:rPr lang="de-DE" dirty="0"/>
-              <a:t>10</a:t>
-            </a:r>
-          </a:p>
-        </p:txBody>
-      </p:sp>
-      <p:cxnSp>
-        <p:nvCxnSpPr>
-          <p:cNvPr id="35" name="Gerader Verbinder 34">
-            <a:extLst>
-              <a:ext uri="{FF2B5EF4-FFF2-40B4-BE49-F238E27FC236}">
-                <a16:creationId xmlns:a16="http://schemas.microsoft.com/office/drawing/2014/main" id="{F74DC8C8-AD78-42EB-B6E8-26881A4C5262}"/>
-              </a:ext>
-            </a:extLst>
-          </p:cNvPr>
-          <p:cNvCxnSpPr>
-            <a:cxnSpLocks/>
-          </p:cNvCxnSpPr>
-          <p:nvPr/>
-        </p:nvCxnSpPr>
-        <p:spPr>
-          <a:xfrm>
-            <a:off x="9295623" y="3462114"/>
-            <a:ext cx="0" cy="241419"/>
-          </a:xfrm>
-          <a:prstGeom prst="line">
-            <a:avLst/>
-          </a:prstGeom>
-          <a:ln w="19050">
-            <a:solidFill>
-              <a:schemeClr val="tx1"/>
-            </a:solidFill>
-          </a:ln>
-        </p:spPr>
-        <p:style>
-          <a:lnRef idx="1">
-            <a:schemeClr val="accent1"/>
-          </a:lnRef>
-          <a:fillRef idx="0">
-            <a:schemeClr val="accent1"/>
-          </a:fillRef>
-          <a:effectRef idx="0">
-            <a:schemeClr val="accent1"/>
-          </a:effectRef>
-          <a:fontRef idx="minor">
-            <a:schemeClr val="tx1"/>
-          </a:fontRef>
-        </p:style>
-      </p:cxnSp>
-      <p:sp>
-        <p:nvSpPr>
-          <p:cNvPr id="36" name="Textfeld 35">
-            <a:extLst>
-              <a:ext uri="{FF2B5EF4-FFF2-40B4-BE49-F238E27FC236}">
-                <a16:creationId xmlns:a16="http://schemas.microsoft.com/office/drawing/2014/main" id="{8F8C83E5-D19B-4CED-AAA8-32ACB71C0844}"/>
-              </a:ext>
-            </a:extLst>
-          </p:cNvPr>
-          <p:cNvSpPr txBox="1"/>
-          <p:nvPr/>
-        </p:nvSpPr>
-        <p:spPr>
-          <a:xfrm>
-            <a:off x="9094255" y="3696822"/>
-            <a:ext cx="418704" cy="369332"/>
-          </a:xfrm>
-          <a:prstGeom prst="rect">
-            <a:avLst/>
-          </a:prstGeom>
-          <a:noFill/>
-        </p:spPr>
-        <p:txBody>
-          <a:bodyPr wrap="none" rtlCol="0">
-            <a:spAutoFit/>
-          </a:bodyPr>
-          <a:lstStyle/>
-          <a:p>
-            <a:r>
-              <a:rPr lang="de-DE" dirty="0"/>
-              <a:t>12</a:t>
-            </a:r>
-          </a:p>
-        </p:txBody>
-      </p:sp>
-      <p:sp>
-        <p:nvSpPr>
-          <p:cNvPr id="53" name="Geschweifte Klammer links 52">
-            <a:extLst>
-              <a:ext uri="{FF2B5EF4-FFF2-40B4-BE49-F238E27FC236}">
-                <a16:creationId xmlns:a16="http://schemas.microsoft.com/office/drawing/2014/main" id="{E7D0473B-7C7D-47BD-9E51-92219D004A3C}"/>
-              </a:ext>
-            </a:extLst>
-          </p:cNvPr>
-          <p:cNvSpPr/>
-          <p:nvPr/>
-        </p:nvSpPr>
-        <p:spPr>
-          <a:xfrm rot="5400000">
-            <a:off x="4455618" y="823676"/>
-            <a:ext cx="284027" cy="2153534"/>
-          </a:xfrm>
-          <a:prstGeom prst="leftBrace">
-            <a:avLst/>
-          </a:prstGeom>
-          <a:noFill/>
-          <a:ln w="28575">
-            <a:solidFill>
-              <a:schemeClr val="accent6"/>
-            </a:solidFill>
-          </a:ln>
-        </p:spPr>
-        <p:style>
-          <a:lnRef idx="1">
-            <a:schemeClr val="accent1"/>
-          </a:lnRef>
-          <a:fillRef idx="0">
-            <a:schemeClr val="accent1"/>
-          </a:fillRef>
-          <a:effectRef idx="0">
-            <a:schemeClr val="accent1"/>
-          </a:effectRef>
-          <a:fontRef idx="minor">
-            <a:schemeClr val="tx1"/>
-          </a:fontRef>
-        </p:style>
-        <p:txBody>
-          <a:bodyPr rtlCol="0" anchor="ctr"/>
-          <a:lstStyle/>
-          <a:p>
-            <a:pPr algn="ctr"/>
-            <a:endParaRPr lang="de-DE"/>
-          </a:p>
-        </p:txBody>
-      </p:sp>
-      <p:sp>
-        <p:nvSpPr>
-          <p:cNvPr id="54" name="Geschweifte Klammer links 53">
-            <a:extLst>
-              <a:ext uri="{FF2B5EF4-FFF2-40B4-BE49-F238E27FC236}">
-                <a16:creationId xmlns:a16="http://schemas.microsoft.com/office/drawing/2014/main" id="{810A42CF-8CCC-4BAA-802C-63FE97B636CA}"/>
-              </a:ext>
-            </a:extLst>
-          </p:cNvPr>
-          <p:cNvSpPr/>
-          <p:nvPr/>
-        </p:nvSpPr>
-        <p:spPr>
-          <a:xfrm rot="5400000">
-            <a:off x="6078187" y="905218"/>
-            <a:ext cx="284027" cy="4370341"/>
-          </a:xfrm>
-          <a:prstGeom prst="leftBrace">
-            <a:avLst/>
-          </a:prstGeom>
-          <a:noFill/>
-          <a:ln w="28575">
-            <a:solidFill>
-              <a:srgbClr val="C00000"/>
-            </a:solidFill>
-          </a:ln>
-        </p:spPr>
-        <p:style>
-          <a:lnRef idx="1">
-            <a:schemeClr val="accent1"/>
-          </a:lnRef>
-          <a:fillRef idx="0">
-            <a:schemeClr val="accent1"/>
-          </a:fillRef>
-          <a:effectRef idx="0">
-            <a:schemeClr val="accent1"/>
-          </a:effectRef>
-          <a:fontRef idx="minor">
-            <a:schemeClr val="tx1"/>
-          </a:fontRef>
-        </p:style>
-        <p:txBody>
-          <a:bodyPr rtlCol="0" anchor="ctr"/>
-          <a:lstStyle/>
-          <a:p>
-            <a:pPr algn="ctr"/>
-            <a:endParaRPr lang="de-DE"/>
-          </a:p>
-        </p:txBody>
-      </p:sp>
-      <p:cxnSp>
-        <p:nvCxnSpPr>
-          <p:cNvPr id="56" name="Gerader Verbinder 55">
-            <a:extLst>
-              <a:ext uri="{FF2B5EF4-FFF2-40B4-BE49-F238E27FC236}">
-                <a16:creationId xmlns:a16="http://schemas.microsoft.com/office/drawing/2014/main" id="{84BCEBC4-A8BB-4C04-BF5D-093EC4F3B5F2}"/>
-              </a:ext>
-            </a:extLst>
-          </p:cNvPr>
-          <p:cNvCxnSpPr/>
-          <p:nvPr/>
-        </p:nvCxnSpPr>
-        <p:spPr>
-          <a:xfrm flipV="1">
-            <a:off x="3520864" y="1183728"/>
-            <a:ext cx="0" cy="4546363"/>
-          </a:xfrm>
-          <a:prstGeom prst="line">
-            <a:avLst/>
-          </a:prstGeom>
-          <a:ln w="28575">
-            <a:solidFill>
-              <a:schemeClr val="tx1">
-                <a:lumMod val="65000"/>
-                <a:lumOff val="35000"/>
-              </a:schemeClr>
-            </a:solidFill>
-          </a:ln>
-        </p:spPr>
-        <p:style>
-          <a:lnRef idx="1">
-            <a:schemeClr val="accent1"/>
-          </a:lnRef>
-          <a:fillRef idx="0">
-            <a:schemeClr val="accent1"/>
-          </a:fillRef>
-          <a:effectRef idx="0">
-            <a:schemeClr val="accent1"/>
-          </a:effectRef>
-          <a:fontRef idx="minor">
-            <a:schemeClr val="tx1"/>
-          </a:fontRef>
-        </p:style>
-      </p:cxnSp>
-      <p:sp>
-        <p:nvSpPr>
-          <p:cNvPr id="57" name="Textfeld 56">
-            <a:extLst>
-              <a:ext uri="{FF2B5EF4-FFF2-40B4-BE49-F238E27FC236}">
-                <a16:creationId xmlns:a16="http://schemas.microsoft.com/office/drawing/2014/main" id="{3A4AA01C-C171-4E42-8D74-76822AC95FF5}"/>
-              </a:ext>
-            </a:extLst>
-          </p:cNvPr>
-          <p:cNvSpPr txBox="1"/>
-          <p:nvPr/>
-        </p:nvSpPr>
-        <p:spPr>
-          <a:xfrm>
-            <a:off x="2967651" y="5775136"/>
-            <a:ext cx="1253384" cy="369332"/>
-          </a:xfrm>
-          <a:prstGeom prst="rect">
-            <a:avLst/>
-          </a:prstGeom>
-          <a:noFill/>
-        </p:spPr>
-        <p:txBody>
-          <a:bodyPr wrap="square" rtlCol="0">
-            <a:spAutoFit/>
-          </a:bodyPr>
-          <a:lstStyle/>
-          <a:p>
-            <a:r>
-              <a:rPr lang="de-DE" dirty="0"/>
-              <a:t>min_score</a:t>
-            </a:r>
-          </a:p>
-        </p:txBody>
-      </p:sp>
-      <p:sp>
-        <p:nvSpPr>
-          <p:cNvPr id="58" name="Textfeld 57">
-            <a:extLst>
-              <a:ext uri="{FF2B5EF4-FFF2-40B4-BE49-F238E27FC236}">
-                <a16:creationId xmlns:a16="http://schemas.microsoft.com/office/drawing/2014/main" id="{D104A0AE-BFD3-44BA-AEDB-630B4893CB76}"/>
-              </a:ext>
-            </a:extLst>
-          </p:cNvPr>
-          <p:cNvSpPr txBox="1"/>
-          <p:nvPr/>
-        </p:nvSpPr>
-        <p:spPr>
-          <a:xfrm>
-            <a:off x="7929545" y="5783998"/>
-            <a:ext cx="1253384" cy="369332"/>
-          </a:xfrm>
-          <a:prstGeom prst="rect">
-            <a:avLst/>
-          </a:prstGeom>
-          <a:noFill/>
-        </p:spPr>
-        <p:txBody>
-          <a:bodyPr wrap="square" rtlCol="0">
-            <a:spAutoFit/>
-          </a:bodyPr>
-          <a:lstStyle/>
-          <a:p>
-            <a:r>
-              <a:rPr lang="de-DE" dirty="0"/>
-              <a:t>max_score</a:t>
-            </a:r>
-          </a:p>
-        </p:txBody>
-      </p:sp>
-      <p:cxnSp>
-        <p:nvCxnSpPr>
-          <p:cNvPr id="59" name="Gerader Verbinder 58">
-            <a:extLst>
-              <a:ext uri="{FF2B5EF4-FFF2-40B4-BE49-F238E27FC236}">
-                <a16:creationId xmlns:a16="http://schemas.microsoft.com/office/drawing/2014/main" id="{74114C73-180A-4F17-9F02-C575B2AB4078}"/>
-              </a:ext>
-            </a:extLst>
-          </p:cNvPr>
-          <p:cNvCxnSpPr/>
-          <p:nvPr/>
-        </p:nvCxnSpPr>
-        <p:spPr>
-          <a:xfrm flipV="1">
-            <a:off x="8438968" y="1269802"/>
-            <a:ext cx="0" cy="4546363"/>
-          </a:xfrm>
-          <a:prstGeom prst="line">
-            <a:avLst/>
-          </a:prstGeom>
-          <a:ln w="28575">
-            <a:solidFill>
-              <a:schemeClr val="tx1">
-                <a:lumMod val="65000"/>
-                <a:lumOff val="35000"/>
-              </a:schemeClr>
-            </a:solidFill>
-          </a:ln>
-        </p:spPr>
-        <p:style>
-          <a:lnRef idx="1">
-            <a:schemeClr val="accent1"/>
-          </a:lnRef>
-          <a:fillRef idx="0">
-            <a:schemeClr val="accent1"/>
-          </a:fillRef>
-          <a:effectRef idx="0">
-            <a:schemeClr val="accent1"/>
-          </a:effectRef>
-          <a:fontRef idx="minor">
-            <a:schemeClr val="tx1"/>
-          </a:fontRef>
-        </p:style>
-      </p:cxnSp>
-      <p:cxnSp>
-        <p:nvCxnSpPr>
-          <p:cNvPr id="60" name="Gerader Verbinder 59">
-            <a:extLst>
-              <a:ext uri="{FF2B5EF4-FFF2-40B4-BE49-F238E27FC236}">
-                <a16:creationId xmlns:a16="http://schemas.microsoft.com/office/drawing/2014/main" id="{AB643EA7-3380-4F61-9CE1-0823E3991EDA}"/>
-              </a:ext>
-            </a:extLst>
-          </p:cNvPr>
-          <p:cNvCxnSpPr/>
-          <p:nvPr/>
-        </p:nvCxnSpPr>
-        <p:spPr>
-          <a:xfrm flipV="1">
-            <a:off x="5916534" y="1097201"/>
-            <a:ext cx="0" cy="4546363"/>
-          </a:xfrm>
-          <a:prstGeom prst="line">
-            <a:avLst/>
-          </a:prstGeom>
-          <a:ln w="28575">
-            <a:solidFill>
-              <a:schemeClr val="tx1">
-                <a:lumMod val="65000"/>
-                <a:lumOff val="35000"/>
-              </a:schemeClr>
-            </a:solidFill>
-            <a:prstDash val="sysDash"/>
-          </a:ln>
-        </p:spPr>
-        <p:style>
-          <a:lnRef idx="1">
-            <a:schemeClr val="accent1"/>
-          </a:lnRef>
-          <a:fillRef idx="0">
-            <a:schemeClr val="accent1"/>
-          </a:fillRef>
-          <a:effectRef idx="0">
-            <a:schemeClr val="accent1"/>
-          </a:effectRef>
-          <a:fontRef idx="minor">
-            <a:schemeClr val="tx1"/>
-          </a:fontRef>
-        </p:style>
-      </p:cxnSp>
-      <p:sp>
-        <p:nvSpPr>
-          <p:cNvPr id="61" name="Textfeld 60">
-            <a:extLst>
-              <a:ext uri="{FF2B5EF4-FFF2-40B4-BE49-F238E27FC236}">
-                <a16:creationId xmlns:a16="http://schemas.microsoft.com/office/drawing/2014/main" id="{BAC26B20-CD9A-4B64-B63C-1EA6B80B27D8}"/>
-              </a:ext>
-            </a:extLst>
-          </p:cNvPr>
-          <p:cNvSpPr txBox="1"/>
-          <p:nvPr/>
-        </p:nvSpPr>
-        <p:spPr>
-          <a:xfrm>
-            <a:off x="4953160" y="5624653"/>
-            <a:ext cx="2446810" cy="369332"/>
-          </a:xfrm>
-          <a:prstGeom prst="rect">
-            <a:avLst/>
-          </a:prstGeom>
-          <a:noFill/>
-        </p:spPr>
-        <p:txBody>
-          <a:bodyPr wrap="square" rtlCol="0">
-            <a:spAutoFit/>
-          </a:bodyPr>
-          <a:lstStyle/>
-          <a:p>
-            <a:r>
-              <a:rPr lang="de-DE" dirty="0"/>
-              <a:t>P(y = negative) = 0.5</a:t>
-            </a:r>
-          </a:p>
-        </p:txBody>
-      </p:sp>
-      <p:sp>
-        <p:nvSpPr>
-          <p:cNvPr id="62" name="Textfeld 61">
-            <a:extLst>
-              <a:ext uri="{FF2B5EF4-FFF2-40B4-BE49-F238E27FC236}">
-                <a16:creationId xmlns:a16="http://schemas.microsoft.com/office/drawing/2014/main" id="{09FB7557-25C2-423E-B721-EBEE0BDD0E8E}"/>
-              </a:ext>
-            </a:extLst>
-          </p:cNvPr>
-          <p:cNvSpPr txBox="1"/>
-          <p:nvPr/>
-        </p:nvSpPr>
-        <p:spPr>
-          <a:xfrm>
-            <a:off x="7636054" y="6016831"/>
-            <a:ext cx="2446810" cy="369332"/>
-          </a:xfrm>
-          <a:prstGeom prst="rect">
-            <a:avLst/>
-          </a:prstGeom>
-          <a:noFill/>
-        </p:spPr>
-        <p:txBody>
-          <a:bodyPr wrap="square" rtlCol="0">
-            <a:spAutoFit/>
-          </a:bodyPr>
-          <a:lstStyle/>
-          <a:p>
-            <a:r>
-              <a:rPr lang="de-DE" dirty="0"/>
-              <a:t>P(y = negative) = 1</a:t>
-            </a:r>
-          </a:p>
-        </p:txBody>
-      </p:sp>
-      <p:sp>
-        <p:nvSpPr>
-          <p:cNvPr id="63" name="Textfeld 62">
-            <a:extLst>
-              <a:ext uri="{FF2B5EF4-FFF2-40B4-BE49-F238E27FC236}">
-                <a16:creationId xmlns:a16="http://schemas.microsoft.com/office/drawing/2014/main" id="{1B5BEDCC-B764-419C-9FC5-044EE0A4B917}"/>
-              </a:ext>
-            </a:extLst>
-          </p:cNvPr>
-          <p:cNvSpPr txBox="1"/>
-          <p:nvPr/>
-        </p:nvSpPr>
-        <p:spPr>
-          <a:xfrm>
-            <a:off x="2689209" y="6050635"/>
-            <a:ext cx="2446810" cy="369332"/>
-          </a:xfrm>
-          <a:prstGeom prst="rect">
-            <a:avLst/>
-          </a:prstGeom>
-          <a:noFill/>
-        </p:spPr>
-        <p:txBody>
-          <a:bodyPr wrap="square" rtlCol="0">
-            <a:spAutoFit/>
-          </a:bodyPr>
-          <a:lstStyle/>
-          <a:p>
-            <a:r>
-              <a:rPr lang="de-DE" dirty="0"/>
-              <a:t>P(y = negative) = 0</a:t>
-            </a:r>
-          </a:p>
-        </p:txBody>
-      </p:sp>
-      <p:sp>
-        <p:nvSpPr>
-          <p:cNvPr id="64" name="Textfeld 63">
-            <a:extLst>
-              <a:ext uri="{FF2B5EF4-FFF2-40B4-BE49-F238E27FC236}">
-                <a16:creationId xmlns:a16="http://schemas.microsoft.com/office/drawing/2014/main" id="{E743B758-9649-469C-A7FB-B1E1D04358B5}"/>
-              </a:ext>
-            </a:extLst>
-          </p:cNvPr>
-          <p:cNvSpPr txBox="1"/>
-          <p:nvPr/>
-        </p:nvSpPr>
-        <p:spPr>
-          <a:xfrm>
-            <a:off x="4077891" y="1420286"/>
-            <a:ext cx="1138473" cy="369332"/>
-          </a:xfrm>
-          <a:prstGeom prst="rect">
-            <a:avLst/>
-          </a:prstGeom>
-          <a:noFill/>
-        </p:spPr>
-        <p:txBody>
-          <a:bodyPr wrap="square" rtlCol="0">
-            <a:spAutoFit/>
-          </a:bodyPr>
-          <a:lstStyle/>
-          <a:p>
-            <a:r>
-              <a:rPr lang="de-DE" dirty="0">
-                <a:solidFill>
-                  <a:schemeClr val="accent6">
-                    <a:lumMod val="75000"/>
-                  </a:schemeClr>
-                </a:solidFill>
-              </a:rPr>
-              <a:t>positives</a:t>
-            </a:r>
-          </a:p>
-        </p:txBody>
-      </p:sp>
-      <p:sp>
-        <p:nvSpPr>
-          <p:cNvPr id="65" name="Textfeld 64">
-            <a:extLst>
-              <a:ext uri="{FF2B5EF4-FFF2-40B4-BE49-F238E27FC236}">
-                <a16:creationId xmlns:a16="http://schemas.microsoft.com/office/drawing/2014/main" id="{6685FBF5-16C3-4B2F-BD4A-9B81A6624B44}"/>
-              </a:ext>
-            </a:extLst>
-          </p:cNvPr>
-          <p:cNvSpPr txBox="1"/>
-          <p:nvPr/>
-        </p:nvSpPr>
-        <p:spPr>
-          <a:xfrm>
-            <a:off x="5861721" y="2588220"/>
-            <a:ext cx="1138473" cy="369332"/>
-          </a:xfrm>
-          <a:prstGeom prst="rect">
-            <a:avLst/>
-          </a:prstGeom>
-          <a:noFill/>
-        </p:spPr>
-        <p:txBody>
-          <a:bodyPr wrap="square" rtlCol="0">
-            <a:spAutoFit/>
-          </a:bodyPr>
-          <a:lstStyle/>
-          <a:p>
-            <a:r>
-              <a:rPr lang="de-DE" dirty="0">
-                <a:solidFill>
-                  <a:srgbClr val="C00000"/>
-                </a:solidFill>
-              </a:rPr>
-              <a:t>negatives</a:t>
-            </a:r>
-          </a:p>
-        </p:txBody>
-      </p:sp>
-      <p:sp>
-        <p:nvSpPr>
-          <p:cNvPr id="40" name="Textfeld 39">
-            <a:extLst>
-              <a:ext uri="{FF2B5EF4-FFF2-40B4-BE49-F238E27FC236}">
-                <a16:creationId xmlns:a16="http://schemas.microsoft.com/office/drawing/2014/main" id="{56D228F6-127D-4ECB-A525-FC4AE0916C3A}"/>
-              </a:ext>
-            </a:extLst>
-          </p:cNvPr>
-          <p:cNvSpPr txBox="1"/>
-          <p:nvPr/>
-        </p:nvSpPr>
-        <p:spPr>
-          <a:xfrm>
-            <a:off x="2817971" y="3703533"/>
-            <a:ext cx="489236" cy="369332"/>
-          </a:xfrm>
-          <a:prstGeom prst="rect">
-            <a:avLst/>
-          </a:prstGeom>
-          <a:noFill/>
-        </p:spPr>
-        <p:txBody>
-          <a:bodyPr wrap="none" rtlCol="0">
-            <a:spAutoFit/>
-          </a:bodyPr>
-          <a:lstStyle/>
-          <a:p>
-            <a:r>
-              <a:rPr lang="de-DE" dirty="0"/>
-              <a:t>-12</a:t>
-            </a:r>
-          </a:p>
-        </p:txBody>
-      </p:sp>
-      <p:cxnSp>
-        <p:nvCxnSpPr>
-          <p:cNvPr id="41" name="Gerader Verbinder 40">
-            <a:extLst>
-              <a:ext uri="{FF2B5EF4-FFF2-40B4-BE49-F238E27FC236}">
-                <a16:creationId xmlns:a16="http://schemas.microsoft.com/office/drawing/2014/main" id="{0A51AD6A-7B1D-4D9E-8DC1-64CB8BEADD04}"/>
-              </a:ext>
-            </a:extLst>
-          </p:cNvPr>
-          <p:cNvCxnSpPr>
-            <a:cxnSpLocks/>
-          </p:cNvCxnSpPr>
-          <p:nvPr/>
-        </p:nvCxnSpPr>
-        <p:spPr>
-          <a:xfrm>
-            <a:off x="3058092" y="3467254"/>
-            <a:ext cx="0" cy="241419"/>
-          </a:xfrm>
-          <a:prstGeom prst="line">
-            <a:avLst/>
-          </a:prstGeom>
-          <a:ln w="19050">
-            <a:solidFill>
-              <a:schemeClr val="tx1"/>
-            </a:solidFill>
-          </a:ln>
-        </p:spPr>
-        <p:style>
-          <a:lnRef idx="1">
-            <a:schemeClr val="accent1"/>
-          </a:lnRef>
-          <a:fillRef idx="0">
-            <a:schemeClr val="accent1"/>
-          </a:fillRef>
-          <a:effectRef idx="0">
-            <a:schemeClr val="accent1"/>
-          </a:effectRef>
-          <a:fontRef idx="minor">
-            <a:schemeClr val="tx1"/>
-          </a:fontRef>
-        </p:style>
-      </p:cxnSp>
+              <a:rPr lang="de-DE" sz="1200" dirty="0"/>
+              <a:t>Mid </a:t>
+            </a:r>
+            <a:r>
+              <a:rPr lang="de-DE" sz="1200" dirty="0" err="1"/>
+              <a:t>is</a:t>
+            </a:r>
+            <a:r>
+              <a:rPr lang="de-DE" sz="1200" dirty="0"/>
+              <a:t> </a:t>
+            </a:r>
+            <a:r>
+              <a:rPr lang="de-DE" sz="1200" dirty="0" err="1"/>
+              <a:t>around</a:t>
+            </a:r>
+            <a:r>
+              <a:rPr lang="de-DE" sz="1200" dirty="0"/>
+              <a:t> -1.80732</a:t>
+            </a:r>
+          </a:p>
+        </p:txBody>
+      </p:sp>
     </p:spTree>
     <p:extLst>
       <p:ext uri="{BB962C8B-B14F-4D97-AF65-F5344CB8AC3E}">
-        <p14:creationId xmlns:p14="http://schemas.microsoft.com/office/powerpoint/2010/main" val="3162949285"/>
+        <p14:creationId xmlns:p14="http://schemas.microsoft.com/office/powerpoint/2010/main" val="2933675501"/>
       </p:ext>
     </p:extLst>
   </p:cSld>
@@ -8723,379 +9603,6 @@
           <a:chExt cx="0" cy="0"/>
         </a:xfrm>
       </p:grpSpPr>
-      <p:pic>
-        <p:nvPicPr>
-          <p:cNvPr id="4" name="Grafik 3">
-            <a:extLst>
-              <a:ext uri="{FF2B5EF4-FFF2-40B4-BE49-F238E27FC236}">
-                <a16:creationId xmlns:a16="http://schemas.microsoft.com/office/drawing/2014/main" id="{7BDD63E6-8771-410B-8D20-131A76CB0B6E}"/>
-              </a:ext>
-            </a:extLst>
-          </p:cNvPr>
-          <p:cNvPicPr>
-            <a:picLocks noChangeAspect="1"/>
-          </p:cNvPicPr>
-          <p:nvPr/>
-        </p:nvPicPr>
-        <p:blipFill>
-          <a:blip r:embed="rId2"/>
-          <a:stretch>
-            <a:fillRect/>
-          </a:stretch>
-        </p:blipFill>
-        <p:spPr>
-          <a:xfrm>
-            <a:off x="1293091" y="904465"/>
-            <a:ext cx="5668961" cy="5634447"/>
-          </a:xfrm>
-          <a:prstGeom prst="rect">
-            <a:avLst/>
-          </a:prstGeom>
-        </p:spPr>
-      </p:pic>
-      <p:sp>
-        <p:nvSpPr>
-          <p:cNvPr id="5" name="Rechteck 4">
-            <a:extLst>
-              <a:ext uri="{FF2B5EF4-FFF2-40B4-BE49-F238E27FC236}">
-                <a16:creationId xmlns:a16="http://schemas.microsoft.com/office/drawing/2014/main" id="{4E165C4D-DCBE-4ADB-A7DA-6C72BE52A55D}"/>
-              </a:ext>
-            </a:extLst>
-          </p:cNvPr>
-          <p:cNvSpPr/>
-          <p:nvPr/>
-        </p:nvSpPr>
-        <p:spPr>
-          <a:xfrm>
-            <a:off x="5500307" y="1840433"/>
-            <a:ext cx="845075" cy="173093"/>
-          </a:xfrm>
-          <a:prstGeom prst="rect">
-            <a:avLst/>
-          </a:prstGeom>
-          <a:solidFill>
-            <a:srgbClr val="FFFF00">
-              <a:alpha val="50000"/>
-            </a:srgbClr>
-          </a:solidFill>
-          <a:ln>
-            <a:noFill/>
-          </a:ln>
-        </p:spPr>
-        <p:style>
-          <a:lnRef idx="2">
-            <a:schemeClr val="accent1">
-              <a:shade val="50000"/>
-            </a:schemeClr>
-          </a:lnRef>
-          <a:fillRef idx="1">
-            <a:schemeClr val="accent1"/>
-          </a:fillRef>
-          <a:effectRef idx="0">
-            <a:schemeClr val="accent1"/>
-          </a:effectRef>
-          <a:fontRef idx="minor">
-            <a:schemeClr val="lt1"/>
-          </a:fontRef>
-        </p:style>
-        <p:txBody>
-          <a:bodyPr rtlCol="0" anchor="ctr"/>
-          <a:lstStyle/>
-          <a:p>
-            <a:pPr algn="ctr"/>
-            <a:endParaRPr lang="de-DE"/>
-          </a:p>
-        </p:txBody>
-      </p:sp>
-      <p:sp>
-        <p:nvSpPr>
-          <p:cNvPr id="6" name="Rechteck 5">
-            <a:extLst>
-              <a:ext uri="{FF2B5EF4-FFF2-40B4-BE49-F238E27FC236}">
-                <a16:creationId xmlns:a16="http://schemas.microsoft.com/office/drawing/2014/main" id="{DD628238-58D4-4D6A-BB9B-FC4468E28300}"/>
-              </a:ext>
-            </a:extLst>
-          </p:cNvPr>
-          <p:cNvSpPr/>
-          <p:nvPr/>
-        </p:nvSpPr>
-        <p:spPr>
-          <a:xfrm>
-            <a:off x="4700332" y="4180167"/>
-            <a:ext cx="435086" cy="160924"/>
-          </a:xfrm>
-          <a:prstGeom prst="rect">
-            <a:avLst/>
-          </a:prstGeom>
-          <a:solidFill>
-            <a:srgbClr val="FFFF00">
-              <a:alpha val="50000"/>
-            </a:srgbClr>
-          </a:solidFill>
-          <a:ln>
-            <a:noFill/>
-          </a:ln>
-        </p:spPr>
-        <p:style>
-          <a:lnRef idx="2">
-            <a:schemeClr val="accent1">
-              <a:shade val="50000"/>
-            </a:schemeClr>
-          </a:lnRef>
-          <a:fillRef idx="1">
-            <a:schemeClr val="accent1"/>
-          </a:fillRef>
-          <a:effectRef idx="0">
-            <a:schemeClr val="accent1"/>
-          </a:effectRef>
-          <a:fontRef idx="minor">
-            <a:schemeClr val="lt1"/>
-          </a:fontRef>
-        </p:style>
-        <p:txBody>
-          <a:bodyPr rtlCol="0" anchor="ctr"/>
-          <a:lstStyle/>
-          <a:p>
-            <a:pPr algn="ctr"/>
-            <a:endParaRPr lang="de-DE"/>
-          </a:p>
-        </p:txBody>
-      </p:sp>
-      <p:sp>
-        <p:nvSpPr>
-          <p:cNvPr id="7" name="Rechteck 6">
-            <a:extLst>
-              <a:ext uri="{FF2B5EF4-FFF2-40B4-BE49-F238E27FC236}">
-                <a16:creationId xmlns:a16="http://schemas.microsoft.com/office/drawing/2014/main" id="{E716070A-56DB-4374-A0DB-700838ABE61C}"/>
-              </a:ext>
-            </a:extLst>
-          </p:cNvPr>
-          <p:cNvSpPr/>
-          <p:nvPr/>
-        </p:nvSpPr>
-        <p:spPr>
-          <a:xfrm>
-            <a:off x="2275595" y="6040342"/>
-            <a:ext cx="288662" cy="148561"/>
-          </a:xfrm>
-          <a:prstGeom prst="rect">
-            <a:avLst/>
-          </a:prstGeom>
-          <a:solidFill>
-            <a:srgbClr val="FFFF00">
-              <a:alpha val="50000"/>
-            </a:srgbClr>
-          </a:solidFill>
-          <a:ln>
-            <a:noFill/>
-          </a:ln>
-        </p:spPr>
-        <p:style>
-          <a:lnRef idx="2">
-            <a:schemeClr val="accent1">
-              <a:shade val="50000"/>
-            </a:schemeClr>
-          </a:lnRef>
-          <a:fillRef idx="1">
-            <a:schemeClr val="accent1"/>
-          </a:fillRef>
-          <a:effectRef idx="0">
-            <a:schemeClr val="accent1"/>
-          </a:effectRef>
-          <a:fontRef idx="minor">
-            <a:schemeClr val="lt1"/>
-          </a:fontRef>
-        </p:style>
-        <p:txBody>
-          <a:bodyPr rtlCol="0" anchor="ctr"/>
-          <a:lstStyle/>
-          <a:p>
-            <a:pPr algn="ctr"/>
-            <a:endParaRPr lang="de-DE"/>
-          </a:p>
-        </p:txBody>
-      </p:sp>
-      <p:sp>
-        <p:nvSpPr>
-          <p:cNvPr id="8" name="Rechteck 7">
-            <a:extLst>
-              <a:ext uri="{FF2B5EF4-FFF2-40B4-BE49-F238E27FC236}">
-                <a16:creationId xmlns:a16="http://schemas.microsoft.com/office/drawing/2014/main" id="{645C727E-5E66-47CB-B45F-E7C831636597}"/>
-              </a:ext>
-            </a:extLst>
-          </p:cNvPr>
-          <p:cNvSpPr/>
-          <p:nvPr/>
-        </p:nvSpPr>
-        <p:spPr>
-          <a:xfrm>
-            <a:off x="2451764" y="6202983"/>
-            <a:ext cx="435086" cy="160924"/>
-          </a:xfrm>
-          <a:prstGeom prst="rect">
-            <a:avLst/>
-          </a:prstGeom>
-          <a:solidFill>
-            <a:srgbClr val="FFFF00">
-              <a:alpha val="50000"/>
-            </a:srgbClr>
-          </a:solidFill>
-          <a:ln>
-            <a:noFill/>
-          </a:ln>
-        </p:spPr>
-        <p:style>
-          <a:lnRef idx="2">
-            <a:schemeClr val="accent1">
-              <a:shade val="50000"/>
-            </a:schemeClr>
-          </a:lnRef>
-          <a:fillRef idx="1">
-            <a:schemeClr val="accent1"/>
-          </a:fillRef>
-          <a:effectRef idx="0">
-            <a:schemeClr val="accent1"/>
-          </a:effectRef>
-          <a:fontRef idx="minor">
-            <a:schemeClr val="lt1"/>
-          </a:fontRef>
-        </p:style>
-        <p:txBody>
-          <a:bodyPr rtlCol="0" anchor="ctr"/>
-          <a:lstStyle/>
-          <a:p>
-            <a:pPr algn="ctr"/>
-            <a:endParaRPr lang="de-DE"/>
-          </a:p>
-        </p:txBody>
-      </p:sp>
-      <p:sp>
-        <p:nvSpPr>
-          <p:cNvPr id="9" name="Textfeld 8">
-            <a:extLst>
-              <a:ext uri="{FF2B5EF4-FFF2-40B4-BE49-F238E27FC236}">
-                <a16:creationId xmlns:a16="http://schemas.microsoft.com/office/drawing/2014/main" id="{8773FFF6-6C8C-4022-8C91-2ED9B8EEB77B}"/>
-              </a:ext>
-            </a:extLst>
-          </p:cNvPr>
-          <p:cNvSpPr txBox="1"/>
-          <p:nvPr/>
-        </p:nvSpPr>
-        <p:spPr>
-          <a:xfrm>
-            <a:off x="311945" y="170927"/>
-            <a:ext cx="4215962" cy="646331"/>
-          </a:xfrm>
-          <a:prstGeom prst="rect">
-            <a:avLst/>
-          </a:prstGeom>
-          <a:noFill/>
-        </p:spPr>
-        <p:txBody>
-          <a:bodyPr wrap="none" rtlCol="0">
-            <a:spAutoFit/>
-          </a:bodyPr>
-          <a:lstStyle/>
-          <a:p>
-            <a:r>
-              <a:rPr lang="de-DE" dirty="0"/>
-              <a:t>Uncertainty Sampling </a:t>
-            </a:r>
-            <a:r>
-              <a:rPr lang="de-DE" dirty="0" err="1"/>
-              <a:t>Example</a:t>
-            </a:r>
-            <a:endParaRPr lang="de-DE" dirty="0"/>
-          </a:p>
-          <a:p>
-            <a:r>
-              <a:rPr lang="de-DE" dirty="0"/>
-              <a:t>Min Positive Score and Max Negative Score</a:t>
-            </a:r>
-          </a:p>
-        </p:txBody>
-      </p:sp>
-      <p:sp>
-        <p:nvSpPr>
-          <p:cNvPr id="10" name="Textfeld 9">
-            <a:extLst>
-              <a:ext uri="{FF2B5EF4-FFF2-40B4-BE49-F238E27FC236}">
-                <a16:creationId xmlns:a16="http://schemas.microsoft.com/office/drawing/2014/main" id="{7F23CF1A-FB53-444F-95D7-196C4B3896C6}"/>
-              </a:ext>
-            </a:extLst>
-          </p:cNvPr>
-          <p:cNvSpPr txBox="1"/>
-          <p:nvPr/>
-        </p:nvSpPr>
-        <p:spPr>
-          <a:xfrm>
-            <a:off x="5652655" y="956951"/>
-            <a:ext cx="1636089" cy="276999"/>
-          </a:xfrm>
-          <a:prstGeom prst="rect">
-            <a:avLst/>
-          </a:prstGeom>
-          <a:noFill/>
-        </p:spPr>
-        <p:txBody>
-          <a:bodyPr wrap="none" rtlCol="0">
-            <a:spAutoFit/>
-          </a:bodyPr>
-          <a:lstStyle/>
-          <a:p>
-            <a:r>
-              <a:rPr lang="de-DE" sz="1200" dirty="0"/>
-              <a:t>Mid </a:t>
-            </a:r>
-            <a:r>
-              <a:rPr lang="de-DE" sz="1200" dirty="0" err="1"/>
-              <a:t>is</a:t>
-            </a:r>
-            <a:r>
-              <a:rPr lang="de-DE" sz="1200" dirty="0"/>
-              <a:t> </a:t>
-            </a:r>
-            <a:r>
-              <a:rPr lang="de-DE" sz="1200" dirty="0" err="1"/>
-              <a:t>around</a:t>
-            </a:r>
-            <a:r>
-              <a:rPr lang="de-DE" sz="1200" dirty="0"/>
-              <a:t> -1.80732</a:t>
-            </a:r>
-          </a:p>
-        </p:txBody>
-      </p:sp>
-    </p:spTree>
-    <p:extLst>
-      <p:ext uri="{BB962C8B-B14F-4D97-AF65-F5344CB8AC3E}">
-        <p14:creationId xmlns:p14="http://schemas.microsoft.com/office/powerpoint/2010/main" val="2933675501"/>
-      </p:ext>
-    </p:extLst>
-  </p:cSld>
-  <p:clrMapOvr>
-    <a:masterClrMapping/>
-  </p:clrMapOvr>
-</p:sld>
-</file>
-
-<file path=ppt/slides/slide6.xml><?xml version="1.0" encoding="utf-8"?>
-<p:sld xmlns:a="http://schemas.openxmlformats.org/drawingml/2006/main" xmlns:r="http://schemas.openxmlformats.org/officeDocument/2006/relationships" xmlns:p="http://schemas.openxmlformats.org/presentationml/2006/main">
-  <p:cSld>
-    <p:spTree>
-      <p:nvGrpSpPr>
-        <p:cNvPr id="1" name=""/>
-        <p:cNvGrpSpPr/>
-        <p:nvPr/>
-      </p:nvGrpSpPr>
-      <p:grpSpPr>
-        <a:xfrm>
-          <a:off x="0" y="0"/>
-          <a:ext cx="0" cy="0"/>
-          <a:chOff x="0" y="0"/>
-          <a:chExt cx="0" cy="0"/>
-        </a:xfrm>
-      </p:grpSpPr>
       <p:cxnSp>
         <p:nvCxnSpPr>
           <p:cNvPr id="2" name="Gerade Verbindung mit Pfeil 1">
@@ -10662,7 +11169,7 @@
 </p:sld>
 </file>
 
-<file path=ppt/slides/slide7.xml><?xml version="1.0" encoding="utf-8"?>
+<file path=ppt/slides/slide6.xml><?xml version="1.0" encoding="utf-8"?>
 <p:sld xmlns:a="http://schemas.openxmlformats.org/drawingml/2006/main" xmlns:r="http://schemas.openxmlformats.org/officeDocument/2006/relationships" xmlns:p="http://schemas.openxmlformats.org/presentationml/2006/main">
   <p:cSld>
     <p:spTree>

</xml_diff>